<commit_message>
29/11/2023 Plots on Electrical Characterisation are done
</commit_message>
<xml_diff>
--- a/Mikhail Bandurist Transistors/X-Ray Measurements (22-11-2023)/X-Ray Measurements Report Batch2.pptx
+++ b/Mikhail Bandurist Transistors/X-Ray Measurements (22-11-2023)/X-Ray Measurements Report Batch2.pptx
@@ -40,6 +40,26 @@
     <p:sldId id="289" r:id="rId34"/>
     <p:sldId id="291" r:id="rId35"/>
     <p:sldId id="292" r:id="rId36"/>
+    <p:sldId id="293" r:id="rId37"/>
+    <p:sldId id="294" r:id="rId38"/>
+    <p:sldId id="295" r:id="rId39"/>
+    <p:sldId id="296" r:id="rId40"/>
+    <p:sldId id="297" r:id="rId41"/>
+    <p:sldId id="298" r:id="rId42"/>
+    <p:sldId id="299" r:id="rId43"/>
+    <p:sldId id="300" r:id="rId44"/>
+    <p:sldId id="301" r:id="rId45"/>
+    <p:sldId id="302" r:id="rId46"/>
+    <p:sldId id="303" r:id="rId47"/>
+    <p:sldId id="304" r:id="rId48"/>
+    <p:sldId id="305" r:id="rId49"/>
+    <p:sldId id="306" r:id="rId50"/>
+    <p:sldId id="307" r:id="rId51"/>
+    <p:sldId id="308" r:id="rId52"/>
+    <p:sldId id="309" r:id="rId53"/>
+    <p:sldId id="310" r:id="rId54"/>
+    <p:sldId id="311" r:id="rId55"/>
+    <p:sldId id="312" r:id="rId56"/>
   </p:sldIdLst>
   <p:sldSz cx="12192000" cy="6858000"/>
   <p:notesSz cx="6858000" cy="9144000"/>
@@ -138,6 +158,11 @@
       </a:defRPr>
     </a:lvl9pPr>
   </p:defaultTextStyle>
+  <p:extLst>
+    <p:ext uri="{EFAFB233-063F-42B5-8137-9DF3F51BA10A}">
+      <p15:sldGuideLst xmlns:p15="http://schemas.microsoft.com/office/powerpoint/2012/main"/>
+    </p:ext>
+  </p:extLst>
 </p:presentation>
 </file>
 
@@ -290,7 +315,7 @@
           <a:p>
             <a:fld id="{0D7AF3D4-FDB7-43B0-AE16-F3D25963A771}" type="datetimeFigureOut">
               <a:rPr lang="ru-RU" smtClean="0"/>
-              <a:t>22.11.2023</a:t>
+              <a:t>25.11.2023</a:t>
             </a:fld>
             <a:endParaRPr lang="ru-RU"/>
           </a:p>
@@ -490,7 +515,7 @@
           <a:p>
             <a:fld id="{0D7AF3D4-FDB7-43B0-AE16-F3D25963A771}" type="datetimeFigureOut">
               <a:rPr lang="ru-RU" smtClean="0"/>
-              <a:t>22.11.2023</a:t>
+              <a:t>25.11.2023</a:t>
             </a:fld>
             <a:endParaRPr lang="ru-RU"/>
           </a:p>
@@ -700,7 +725,7 @@
           <a:p>
             <a:fld id="{0D7AF3D4-FDB7-43B0-AE16-F3D25963A771}" type="datetimeFigureOut">
               <a:rPr lang="ru-RU" smtClean="0"/>
-              <a:t>22.11.2023</a:t>
+              <a:t>25.11.2023</a:t>
             </a:fld>
             <a:endParaRPr lang="ru-RU"/>
           </a:p>
@@ -900,7 +925,7 @@
           <a:p>
             <a:fld id="{0D7AF3D4-FDB7-43B0-AE16-F3D25963A771}" type="datetimeFigureOut">
               <a:rPr lang="ru-RU" smtClean="0"/>
-              <a:t>22.11.2023</a:t>
+              <a:t>25.11.2023</a:t>
             </a:fld>
             <a:endParaRPr lang="ru-RU"/>
           </a:p>
@@ -1176,7 +1201,7 @@
           <a:p>
             <a:fld id="{0D7AF3D4-FDB7-43B0-AE16-F3D25963A771}" type="datetimeFigureOut">
               <a:rPr lang="ru-RU" smtClean="0"/>
-              <a:t>22.11.2023</a:t>
+              <a:t>25.11.2023</a:t>
             </a:fld>
             <a:endParaRPr lang="ru-RU"/>
           </a:p>
@@ -1444,7 +1469,7 @@
           <a:p>
             <a:fld id="{0D7AF3D4-FDB7-43B0-AE16-F3D25963A771}" type="datetimeFigureOut">
               <a:rPr lang="ru-RU" smtClean="0"/>
-              <a:t>22.11.2023</a:t>
+              <a:t>25.11.2023</a:t>
             </a:fld>
             <a:endParaRPr lang="ru-RU"/>
           </a:p>
@@ -1859,7 +1884,7 @@
           <a:p>
             <a:fld id="{0D7AF3D4-FDB7-43B0-AE16-F3D25963A771}" type="datetimeFigureOut">
               <a:rPr lang="ru-RU" smtClean="0"/>
-              <a:t>22.11.2023</a:t>
+              <a:t>25.11.2023</a:t>
             </a:fld>
             <a:endParaRPr lang="ru-RU"/>
           </a:p>
@@ -2001,7 +2026,7 @@
           <a:p>
             <a:fld id="{0D7AF3D4-FDB7-43B0-AE16-F3D25963A771}" type="datetimeFigureOut">
               <a:rPr lang="ru-RU" smtClean="0"/>
-              <a:t>22.11.2023</a:t>
+              <a:t>25.11.2023</a:t>
             </a:fld>
             <a:endParaRPr lang="ru-RU"/>
           </a:p>
@@ -2114,7 +2139,7 @@
           <a:p>
             <a:fld id="{0D7AF3D4-FDB7-43B0-AE16-F3D25963A771}" type="datetimeFigureOut">
               <a:rPr lang="ru-RU" smtClean="0"/>
-              <a:t>22.11.2023</a:t>
+              <a:t>25.11.2023</a:t>
             </a:fld>
             <a:endParaRPr lang="ru-RU"/>
           </a:p>
@@ -2427,7 +2452,7 @@
           <a:p>
             <a:fld id="{0D7AF3D4-FDB7-43B0-AE16-F3D25963A771}" type="datetimeFigureOut">
               <a:rPr lang="ru-RU" smtClean="0"/>
-              <a:t>22.11.2023</a:t>
+              <a:t>25.11.2023</a:t>
             </a:fld>
             <a:endParaRPr lang="ru-RU"/>
           </a:p>
@@ -2716,7 +2741,7 @@
           <a:p>
             <a:fld id="{0D7AF3D4-FDB7-43B0-AE16-F3D25963A771}" type="datetimeFigureOut">
               <a:rPr lang="ru-RU" smtClean="0"/>
-              <a:t>22.11.2023</a:t>
+              <a:t>25.11.2023</a:t>
             </a:fld>
             <a:endParaRPr lang="ru-RU"/>
           </a:p>
@@ -2959,7 +2984,7 @@
           <a:p>
             <a:fld id="{0D7AF3D4-FDB7-43B0-AE16-F3D25963A771}" type="datetimeFigureOut">
               <a:rPr lang="ru-RU" smtClean="0"/>
-              <a:t>22.11.2023</a:t>
+              <a:t>25.11.2023</a:t>
             </a:fld>
             <a:endParaRPr lang="ru-RU"/>
           </a:p>
@@ -7011,10 +7036,712 @@
           </a:graphicData>
         </a:graphic>
       </p:graphicFrame>
+      <p:graphicFrame>
+        <p:nvGraphicFramePr>
+          <p:cNvPr id="2" name="Object 1">
+            <a:extLst>
+              <a:ext uri="{FF2B5EF4-FFF2-40B4-BE49-F238E27FC236}">
+                <a16:creationId xmlns:a16="http://schemas.microsoft.com/office/drawing/2014/main" id="{88C5BE11-BA70-C74E-D85A-640FC964CBF6}"/>
+              </a:ext>
+            </a:extLst>
+          </p:cNvPr>
+          <p:cNvGraphicFramePr>
+            <a:graphicFrameLocks noChangeAspect="1"/>
+          </p:cNvGraphicFramePr>
+          <p:nvPr>
+            <p:extLst>
+              <p:ext uri="{D42A27DB-BD31-4B8C-83A1-F6EECF244321}">
+                <p14:modId xmlns:p14="http://schemas.microsoft.com/office/powerpoint/2010/main" val="4082336924"/>
+              </p:ext>
+            </p:extLst>
+          </p:nvPr>
+        </p:nvGraphicFramePr>
+        <p:xfrm>
+          <a:off x="5915025" y="1690688"/>
+          <a:ext cx="6116638" cy="4679950"/>
+        </p:xfrm>
+        <a:graphic>
+          <a:graphicData uri="http://schemas.openxmlformats.org/presentationml/2006/ole">
+            <mc:AlternateContent xmlns:mc="http://schemas.openxmlformats.org/markup-compatibility/2006">
+              <mc:Choice xmlns:v="urn:schemas-microsoft-com:vml" Requires="v">
+                <p:oleObj name="Graph" r:id="rId4" imgW="3920760" imgH="3000960" progId="Origin95.Graph">
+                  <p:embed/>
+                </p:oleObj>
+              </mc:Choice>
+              <mc:Fallback>
+                <p:oleObj name="Graph" r:id="rId4" imgW="3920760" imgH="3000960" progId="Origin95.Graph">
+                  <p:embed/>
+                  <p:pic>
+                    <p:nvPicPr>
+                      <p:cNvPr id="0" name=""/>
+                      <p:cNvPicPr/>
+                      <p:nvPr/>
+                    </p:nvPicPr>
+                    <p:blipFill>
+                      <a:blip r:embed="rId5"/>
+                      <a:stretch>
+                        <a:fillRect/>
+                      </a:stretch>
+                    </p:blipFill>
+                    <p:spPr>
+                      <a:xfrm>
+                        <a:off x="5915025" y="1690688"/>
+                        <a:ext cx="6116638" cy="4679950"/>
+                      </a:xfrm>
+                      <a:prstGeom prst="rect">
+                        <a:avLst/>
+                      </a:prstGeom>
+                    </p:spPr>
+                  </p:pic>
+                </p:oleObj>
+              </mc:Fallback>
+            </mc:AlternateContent>
+          </a:graphicData>
+        </a:graphic>
+      </p:graphicFrame>
     </p:spTree>
     <p:extLst>
       <p:ext uri="{BB962C8B-B14F-4D97-AF65-F5344CB8AC3E}">
         <p14:creationId xmlns:p14="http://schemas.microsoft.com/office/powerpoint/2010/main" val="1562649969"/>
+      </p:ext>
+    </p:extLst>
+  </p:cSld>
+  <p:clrMapOvr>
+    <a:masterClrMapping/>
+  </p:clrMapOvr>
+</p:sld>
+</file>
+
+<file path=ppt/slides/slide36.xml><?xml version="1.0" encoding="utf-8"?>
+<p:sld xmlns:a="http://schemas.openxmlformats.org/drawingml/2006/main" xmlns:r="http://schemas.openxmlformats.org/officeDocument/2006/relationships" xmlns:p="http://schemas.openxmlformats.org/presentationml/2006/main">
+  <p:cSld>
+    <p:spTree>
+      <p:nvGrpSpPr>
+        <p:cNvPr id="1" name=""/>
+        <p:cNvGrpSpPr/>
+        <p:nvPr/>
+      </p:nvGrpSpPr>
+      <p:grpSpPr>
+        <a:xfrm>
+          <a:off x="0" y="0"/>
+          <a:ext cx="0" cy="0"/>
+          <a:chOff x="0" y="0"/>
+          <a:chExt cx="0" cy="0"/>
+        </a:xfrm>
+      </p:grpSpPr>
+      <p:sp>
+        <p:nvSpPr>
+          <p:cNvPr id="2" name="Title 1">
+            <a:extLst>
+              <a:ext uri="{FF2B5EF4-FFF2-40B4-BE49-F238E27FC236}">
+                <a16:creationId xmlns:a16="http://schemas.microsoft.com/office/drawing/2014/main" id="{90F41BAD-4165-913E-F860-03935090F273}"/>
+              </a:ext>
+            </a:extLst>
+          </p:cNvPr>
+          <p:cNvSpPr>
+            <a:spLocks noGrp="1"/>
+          </p:cNvSpPr>
+          <p:nvPr>
+            <p:ph type="title"/>
+          </p:nvPr>
+        </p:nvSpPr>
+        <p:spPr/>
+        <p:txBody>
+          <a:bodyPr/>
+          <a:lstStyle/>
+          <a:p>
+            <a:r>
+              <a:rPr lang="en-US" dirty="0"/>
+              <a:t>Sample12_device3</a:t>
+            </a:r>
+            <a:endParaRPr lang="ru-RU" dirty="0"/>
+          </a:p>
+        </p:txBody>
+      </p:sp>
+      <p:graphicFrame>
+        <p:nvGraphicFramePr>
+          <p:cNvPr id="3" name="Object 2">
+            <a:extLst>
+              <a:ext uri="{FF2B5EF4-FFF2-40B4-BE49-F238E27FC236}">
+                <a16:creationId xmlns:a16="http://schemas.microsoft.com/office/drawing/2014/main" id="{10ECDE32-402E-83C7-3B96-5B400065C8C7}"/>
+              </a:ext>
+            </a:extLst>
+          </p:cNvPr>
+          <p:cNvGraphicFramePr>
+            <a:graphicFrameLocks noChangeAspect="1"/>
+          </p:cNvGraphicFramePr>
+          <p:nvPr>
+            <p:extLst>
+              <p:ext uri="{D42A27DB-BD31-4B8C-83A1-F6EECF244321}">
+                <p14:modId xmlns:p14="http://schemas.microsoft.com/office/powerpoint/2010/main" val="3226038585"/>
+              </p:ext>
+            </p:extLst>
+          </p:nvPr>
+        </p:nvGraphicFramePr>
+        <p:xfrm>
+          <a:off x="0" y="1690688"/>
+          <a:ext cx="6116190" cy="4680000"/>
+        </p:xfrm>
+        <a:graphic>
+          <a:graphicData uri="http://schemas.openxmlformats.org/presentationml/2006/ole">
+            <mc:AlternateContent xmlns:mc="http://schemas.openxmlformats.org/markup-compatibility/2006">
+              <mc:Choice xmlns:v="urn:schemas-microsoft-com:vml" Requires="v">
+                <p:oleObj name="Graph" r:id="rId2" imgW="3920760" imgH="3000960" progId="Origin95.Graph">
+                  <p:embed/>
+                </p:oleObj>
+              </mc:Choice>
+              <mc:Fallback>
+                <p:oleObj name="Graph" r:id="rId2" imgW="3920760" imgH="3000960" progId="Origin95.Graph">
+                  <p:embed/>
+                  <p:pic>
+                    <p:nvPicPr>
+                      <p:cNvPr id="0" name=""/>
+                      <p:cNvPicPr/>
+                      <p:nvPr/>
+                    </p:nvPicPr>
+                    <p:blipFill>
+                      <a:blip r:embed="rId3"/>
+                      <a:stretch>
+                        <a:fillRect/>
+                      </a:stretch>
+                    </p:blipFill>
+                    <p:spPr>
+                      <a:xfrm>
+                        <a:off x="0" y="1690688"/>
+                        <a:ext cx="6116190" cy="4680000"/>
+                      </a:xfrm>
+                      <a:prstGeom prst="rect">
+                        <a:avLst/>
+                      </a:prstGeom>
+                    </p:spPr>
+                  </p:pic>
+                </p:oleObj>
+              </mc:Fallback>
+            </mc:AlternateContent>
+          </a:graphicData>
+        </a:graphic>
+      </p:graphicFrame>
+      <p:graphicFrame>
+        <p:nvGraphicFramePr>
+          <p:cNvPr id="5" name="Object 4">
+            <a:extLst>
+              <a:ext uri="{FF2B5EF4-FFF2-40B4-BE49-F238E27FC236}">
+                <a16:creationId xmlns:a16="http://schemas.microsoft.com/office/drawing/2014/main" id="{B5A20D93-38D5-DC6F-58ED-01DCFDE1E4D3}"/>
+              </a:ext>
+            </a:extLst>
+          </p:cNvPr>
+          <p:cNvGraphicFramePr>
+            <a:graphicFrameLocks noChangeAspect="1"/>
+          </p:cNvGraphicFramePr>
+          <p:nvPr>
+            <p:extLst>
+              <p:ext uri="{D42A27DB-BD31-4B8C-83A1-F6EECF244321}">
+                <p14:modId xmlns:p14="http://schemas.microsoft.com/office/powerpoint/2010/main" val="1326261247"/>
+              </p:ext>
+            </p:extLst>
+          </p:nvPr>
+        </p:nvGraphicFramePr>
+        <p:xfrm>
+          <a:off x="6075363" y="1690688"/>
+          <a:ext cx="6116637" cy="4679950"/>
+        </p:xfrm>
+        <a:graphic>
+          <a:graphicData uri="http://schemas.openxmlformats.org/presentationml/2006/ole">
+            <mc:AlternateContent xmlns:mc="http://schemas.openxmlformats.org/markup-compatibility/2006">
+              <mc:Choice xmlns:v="urn:schemas-microsoft-com:vml" Requires="v">
+                <p:oleObj name="Graph" r:id="rId4" imgW="3920760" imgH="3000960" progId="Origin95.Graph">
+                  <p:embed/>
+                </p:oleObj>
+              </mc:Choice>
+              <mc:Fallback>
+                <p:oleObj name="Graph" r:id="rId4" imgW="3920760" imgH="3000960" progId="Origin95.Graph">
+                  <p:embed/>
+                  <p:pic>
+                    <p:nvPicPr>
+                      <p:cNvPr id="0" name=""/>
+                      <p:cNvPicPr/>
+                      <p:nvPr/>
+                    </p:nvPicPr>
+                    <p:blipFill>
+                      <a:blip r:embed="rId5"/>
+                      <a:stretch>
+                        <a:fillRect/>
+                      </a:stretch>
+                    </p:blipFill>
+                    <p:spPr>
+                      <a:xfrm>
+                        <a:off x="6075363" y="1690688"/>
+                        <a:ext cx="6116637" cy="4679950"/>
+                      </a:xfrm>
+                      <a:prstGeom prst="rect">
+                        <a:avLst/>
+                      </a:prstGeom>
+                    </p:spPr>
+                  </p:pic>
+                </p:oleObj>
+              </mc:Fallback>
+            </mc:AlternateContent>
+          </a:graphicData>
+        </a:graphic>
+      </p:graphicFrame>
+    </p:spTree>
+    <p:extLst>
+      <p:ext uri="{BB962C8B-B14F-4D97-AF65-F5344CB8AC3E}">
+        <p14:creationId xmlns:p14="http://schemas.microsoft.com/office/powerpoint/2010/main" val="3661180264"/>
+      </p:ext>
+    </p:extLst>
+  </p:cSld>
+  <p:clrMapOvr>
+    <a:masterClrMapping/>
+  </p:clrMapOvr>
+</p:sld>
+</file>
+
+<file path=ppt/slides/slide37.xml><?xml version="1.0" encoding="utf-8"?>
+<p:sld xmlns:a="http://schemas.openxmlformats.org/drawingml/2006/main" xmlns:r="http://schemas.openxmlformats.org/officeDocument/2006/relationships" xmlns:p="http://schemas.openxmlformats.org/presentationml/2006/main">
+  <p:cSld>
+    <p:spTree>
+      <p:nvGrpSpPr>
+        <p:cNvPr id="1" name=""/>
+        <p:cNvGrpSpPr/>
+        <p:nvPr/>
+      </p:nvGrpSpPr>
+      <p:grpSpPr>
+        <a:xfrm>
+          <a:off x="0" y="0"/>
+          <a:ext cx="0" cy="0"/>
+          <a:chOff x="0" y="0"/>
+          <a:chExt cx="0" cy="0"/>
+        </a:xfrm>
+      </p:grpSpPr>
+      <p:sp>
+        <p:nvSpPr>
+          <p:cNvPr id="2" name="Title 1">
+            <a:extLst>
+              <a:ext uri="{FF2B5EF4-FFF2-40B4-BE49-F238E27FC236}">
+                <a16:creationId xmlns:a16="http://schemas.microsoft.com/office/drawing/2014/main" id="{622AAC78-EFD7-33BA-542F-ADDCED80C228}"/>
+              </a:ext>
+            </a:extLst>
+          </p:cNvPr>
+          <p:cNvSpPr>
+            <a:spLocks noGrp="1"/>
+          </p:cNvSpPr>
+          <p:nvPr>
+            <p:ph type="ctrTitle"/>
+          </p:nvPr>
+        </p:nvSpPr>
+        <p:spPr/>
+        <p:txBody>
+          <a:bodyPr/>
+          <a:lstStyle/>
+          <a:p>
+            <a:r>
+              <a:rPr lang="en-US" dirty="0"/>
+              <a:t>Sample12_device4</a:t>
+            </a:r>
+            <a:endParaRPr lang="ru-RU" dirty="0"/>
+          </a:p>
+        </p:txBody>
+      </p:sp>
+      <p:sp>
+        <p:nvSpPr>
+          <p:cNvPr id="3" name="Subtitle 2">
+            <a:extLst>
+              <a:ext uri="{FF2B5EF4-FFF2-40B4-BE49-F238E27FC236}">
+                <a16:creationId xmlns:a16="http://schemas.microsoft.com/office/drawing/2014/main" id="{BC230D7D-796D-038A-802B-4D11764391D3}"/>
+              </a:ext>
+            </a:extLst>
+          </p:cNvPr>
+          <p:cNvSpPr>
+            <a:spLocks noGrp="1"/>
+          </p:cNvSpPr>
+          <p:nvPr>
+            <p:ph type="subTitle" idx="1"/>
+          </p:nvPr>
+        </p:nvSpPr>
+        <p:spPr/>
+        <p:txBody>
+          <a:bodyPr/>
+          <a:lstStyle/>
+          <a:p>
+            <a:endParaRPr lang="ru-RU"/>
+          </a:p>
+        </p:txBody>
+      </p:sp>
+    </p:spTree>
+    <p:extLst>
+      <p:ext uri="{BB962C8B-B14F-4D97-AF65-F5344CB8AC3E}">
+        <p14:creationId xmlns:p14="http://schemas.microsoft.com/office/powerpoint/2010/main" val="1402321863"/>
+      </p:ext>
+    </p:extLst>
+  </p:cSld>
+  <p:clrMapOvr>
+    <a:masterClrMapping/>
+  </p:clrMapOvr>
+</p:sld>
+</file>
+
+<file path=ppt/slides/slide38.xml><?xml version="1.0" encoding="utf-8"?>
+<p:sld xmlns:a="http://schemas.openxmlformats.org/drawingml/2006/main" xmlns:r="http://schemas.openxmlformats.org/officeDocument/2006/relationships" xmlns:p="http://schemas.openxmlformats.org/presentationml/2006/main">
+  <p:cSld>
+    <p:spTree>
+      <p:nvGrpSpPr>
+        <p:cNvPr id="1" name=""/>
+        <p:cNvGrpSpPr/>
+        <p:nvPr/>
+      </p:nvGrpSpPr>
+      <p:grpSpPr>
+        <a:xfrm>
+          <a:off x="0" y="0"/>
+          <a:ext cx="0" cy="0"/>
+          <a:chOff x="0" y="0"/>
+          <a:chExt cx="0" cy="0"/>
+        </a:xfrm>
+      </p:grpSpPr>
+      <p:sp>
+        <p:nvSpPr>
+          <p:cNvPr id="4" name="Title 3">
+            <a:extLst>
+              <a:ext uri="{FF2B5EF4-FFF2-40B4-BE49-F238E27FC236}">
+                <a16:creationId xmlns:a16="http://schemas.microsoft.com/office/drawing/2014/main" id="{B4DC556C-363C-64F6-B140-DF9953C6D505}"/>
+              </a:ext>
+            </a:extLst>
+          </p:cNvPr>
+          <p:cNvSpPr>
+            <a:spLocks noGrp="1"/>
+          </p:cNvSpPr>
+          <p:nvPr>
+            <p:ph type="title"/>
+          </p:nvPr>
+        </p:nvSpPr>
+        <p:spPr/>
+        <p:txBody>
+          <a:bodyPr/>
+          <a:lstStyle/>
+          <a:p>
+            <a:r>
+              <a:rPr lang="en-US" dirty="0"/>
+              <a:t>Sample12_device4</a:t>
+            </a:r>
+            <a:endParaRPr lang="ru-RU" dirty="0"/>
+          </a:p>
+        </p:txBody>
+      </p:sp>
+      <p:graphicFrame>
+        <p:nvGraphicFramePr>
+          <p:cNvPr id="5" name="Object 4">
+            <a:extLst>
+              <a:ext uri="{FF2B5EF4-FFF2-40B4-BE49-F238E27FC236}">
+                <a16:creationId xmlns:a16="http://schemas.microsoft.com/office/drawing/2014/main" id="{22487730-E8EC-6068-84A1-A96298B382F5}"/>
+              </a:ext>
+            </a:extLst>
+          </p:cNvPr>
+          <p:cNvGraphicFramePr>
+            <a:graphicFrameLocks noChangeAspect="1"/>
+          </p:cNvGraphicFramePr>
+          <p:nvPr>
+            <p:extLst>
+              <p:ext uri="{D42A27DB-BD31-4B8C-83A1-F6EECF244321}">
+                <p14:modId xmlns:p14="http://schemas.microsoft.com/office/powerpoint/2010/main" val="3270014556"/>
+              </p:ext>
+            </p:extLst>
+          </p:nvPr>
+        </p:nvGraphicFramePr>
+        <p:xfrm>
+          <a:off x="-259583" y="1690688"/>
+          <a:ext cx="6116190" cy="4680000"/>
+        </p:xfrm>
+        <a:graphic>
+          <a:graphicData uri="http://schemas.openxmlformats.org/presentationml/2006/ole">
+            <mc:AlternateContent xmlns:mc="http://schemas.openxmlformats.org/markup-compatibility/2006">
+              <mc:Choice xmlns:v="urn:schemas-microsoft-com:vml" Requires="v">
+                <p:oleObj name="Graph" r:id="rId2" imgW="3920760" imgH="3000960" progId="Origin95.Graph">
+                  <p:embed/>
+                </p:oleObj>
+              </mc:Choice>
+              <mc:Fallback>
+                <p:oleObj name="Graph" r:id="rId2" imgW="3920760" imgH="3000960" progId="Origin95.Graph">
+                  <p:embed/>
+                  <p:pic>
+                    <p:nvPicPr>
+                      <p:cNvPr id="0" name=""/>
+                      <p:cNvPicPr/>
+                      <p:nvPr/>
+                    </p:nvPicPr>
+                    <p:blipFill>
+                      <a:blip r:embed="rId3"/>
+                      <a:stretch>
+                        <a:fillRect/>
+                      </a:stretch>
+                    </p:blipFill>
+                    <p:spPr>
+                      <a:xfrm>
+                        <a:off x="-259583" y="1690688"/>
+                        <a:ext cx="6116190" cy="4680000"/>
+                      </a:xfrm>
+                      <a:prstGeom prst="rect">
+                        <a:avLst/>
+                      </a:prstGeom>
+                    </p:spPr>
+                  </p:pic>
+                </p:oleObj>
+              </mc:Fallback>
+            </mc:AlternateContent>
+          </a:graphicData>
+        </a:graphic>
+      </p:graphicFrame>
+      <p:graphicFrame>
+        <p:nvGraphicFramePr>
+          <p:cNvPr id="6" name="Object 5">
+            <a:extLst>
+              <a:ext uri="{FF2B5EF4-FFF2-40B4-BE49-F238E27FC236}">
+                <a16:creationId xmlns:a16="http://schemas.microsoft.com/office/drawing/2014/main" id="{F68C8A14-302F-6BA7-4248-E400CE561ECB}"/>
+              </a:ext>
+            </a:extLst>
+          </p:cNvPr>
+          <p:cNvGraphicFramePr>
+            <a:graphicFrameLocks noChangeAspect="1"/>
+          </p:cNvGraphicFramePr>
+          <p:nvPr>
+            <p:extLst>
+              <p:ext uri="{D42A27DB-BD31-4B8C-83A1-F6EECF244321}">
+                <p14:modId xmlns:p14="http://schemas.microsoft.com/office/powerpoint/2010/main" val="2865239598"/>
+              </p:ext>
+            </p:extLst>
+          </p:nvPr>
+        </p:nvGraphicFramePr>
+        <p:xfrm>
+          <a:off x="5547109" y="1690688"/>
+          <a:ext cx="6116190" cy="4680000"/>
+        </p:xfrm>
+        <a:graphic>
+          <a:graphicData uri="http://schemas.openxmlformats.org/presentationml/2006/ole">
+            <mc:AlternateContent xmlns:mc="http://schemas.openxmlformats.org/markup-compatibility/2006">
+              <mc:Choice xmlns:v="urn:schemas-microsoft-com:vml" Requires="v">
+                <p:oleObj name="Graph" r:id="rId4" imgW="3920760" imgH="3000960" progId="Origin95.Graph">
+                  <p:embed/>
+                </p:oleObj>
+              </mc:Choice>
+              <mc:Fallback>
+                <p:oleObj name="Graph" r:id="rId4" imgW="3920760" imgH="3000960" progId="Origin95.Graph">
+                  <p:embed/>
+                  <p:pic>
+                    <p:nvPicPr>
+                      <p:cNvPr id="0" name=""/>
+                      <p:cNvPicPr/>
+                      <p:nvPr/>
+                    </p:nvPicPr>
+                    <p:blipFill>
+                      <a:blip r:embed="rId5"/>
+                      <a:stretch>
+                        <a:fillRect/>
+                      </a:stretch>
+                    </p:blipFill>
+                    <p:spPr>
+                      <a:xfrm>
+                        <a:off x="5547109" y="1690688"/>
+                        <a:ext cx="6116190" cy="4680000"/>
+                      </a:xfrm>
+                      <a:prstGeom prst="rect">
+                        <a:avLst/>
+                      </a:prstGeom>
+                    </p:spPr>
+                  </p:pic>
+                </p:oleObj>
+              </mc:Fallback>
+            </mc:AlternateContent>
+          </a:graphicData>
+        </a:graphic>
+      </p:graphicFrame>
+    </p:spTree>
+    <p:extLst>
+      <p:ext uri="{BB962C8B-B14F-4D97-AF65-F5344CB8AC3E}">
+        <p14:creationId xmlns:p14="http://schemas.microsoft.com/office/powerpoint/2010/main" val="3426910637"/>
+      </p:ext>
+    </p:extLst>
+  </p:cSld>
+  <p:clrMapOvr>
+    <a:masterClrMapping/>
+  </p:clrMapOvr>
+</p:sld>
+</file>
+
+<file path=ppt/slides/slide39.xml><?xml version="1.0" encoding="utf-8"?>
+<p:sld xmlns:a="http://schemas.openxmlformats.org/drawingml/2006/main" xmlns:r="http://schemas.openxmlformats.org/officeDocument/2006/relationships" xmlns:p="http://schemas.openxmlformats.org/presentationml/2006/main">
+  <p:cSld>
+    <p:spTree>
+      <p:nvGrpSpPr>
+        <p:cNvPr id="1" name=""/>
+        <p:cNvGrpSpPr/>
+        <p:nvPr/>
+      </p:nvGrpSpPr>
+      <p:grpSpPr>
+        <a:xfrm>
+          <a:off x="0" y="0"/>
+          <a:ext cx="0" cy="0"/>
+          <a:chOff x="0" y="0"/>
+          <a:chExt cx="0" cy="0"/>
+        </a:xfrm>
+      </p:grpSpPr>
+      <p:sp>
+        <p:nvSpPr>
+          <p:cNvPr id="2" name="Title 1">
+            <a:extLst>
+              <a:ext uri="{FF2B5EF4-FFF2-40B4-BE49-F238E27FC236}">
+                <a16:creationId xmlns:a16="http://schemas.microsoft.com/office/drawing/2014/main" id="{60765D6D-E758-5C95-4D8B-DCCFCDE7CA90}"/>
+              </a:ext>
+            </a:extLst>
+          </p:cNvPr>
+          <p:cNvSpPr>
+            <a:spLocks noGrp="1"/>
+          </p:cNvSpPr>
+          <p:nvPr>
+            <p:ph type="title"/>
+          </p:nvPr>
+        </p:nvSpPr>
+        <p:spPr/>
+        <p:txBody>
+          <a:bodyPr/>
+          <a:lstStyle/>
+          <a:p>
+            <a:r>
+              <a:rPr lang="en-US" dirty="0"/>
+              <a:t>Sample12_device4</a:t>
+            </a:r>
+            <a:endParaRPr lang="ru-RU" dirty="0"/>
+          </a:p>
+        </p:txBody>
+      </p:sp>
+      <p:graphicFrame>
+        <p:nvGraphicFramePr>
+          <p:cNvPr id="3" name="Object 2">
+            <a:extLst>
+              <a:ext uri="{FF2B5EF4-FFF2-40B4-BE49-F238E27FC236}">
+                <a16:creationId xmlns:a16="http://schemas.microsoft.com/office/drawing/2014/main" id="{440F6966-050F-40B2-10D2-24D0A29CD10D}"/>
+              </a:ext>
+            </a:extLst>
+          </p:cNvPr>
+          <p:cNvGraphicFramePr>
+            <a:graphicFrameLocks noChangeAspect="1"/>
+          </p:cNvGraphicFramePr>
+          <p:nvPr>
+            <p:extLst>
+              <p:ext uri="{D42A27DB-BD31-4B8C-83A1-F6EECF244321}">
+                <p14:modId xmlns:p14="http://schemas.microsoft.com/office/powerpoint/2010/main" val="2724312448"/>
+              </p:ext>
+            </p:extLst>
+          </p:nvPr>
+        </p:nvGraphicFramePr>
+        <p:xfrm>
+          <a:off x="94379" y="1690688"/>
+          <a:ext cx="6116190" cy="4680000"/>
+        </p:xfrm>
+        <a:graphic>
+          <a:graphicData uri="http://schemas.openxmlformats.org/presentationml/2006/ole">
+            <mc:AlternateContent xmlns:mc="http://schemas.openxmlformats.org/markup-compatibility/2006">
+              <mc:Choice xmlns:v="urn:schemas-microsoft-com:vml" Requires="v">
+                <p:oleObj name="Graph" r:id="rId2" imgW="3920760" imgH="3000960" progId="Origin95.Graph">
+                  <p:embed/>
+                </p:oleObj>
+              </mc:Choice>
+              <mc:Fallback>
+                <p:oleObj name="Graph" r:id="rId2" imgW="3920760" imgH="3000960" progId="Origin95.Graph">
+                  <p:embed/>
+                  <p:pic>
+                    <p:nvPicPr>
+                      <p:cNvPr id="0" name=""/>
+                      <p:cNvPicPr/>
+                      <p:nvPr/>
+                    </p:nvPicPr>
+                    <p:blipFill>
+                      <a:blip r:embed="rId3"/>
+                      <a:stretch>
+                        <a:fillRect/>
+                      </a:stretch>
+                    </p:blipFill>
+                    <p:spPr>
+                      <a:xfrm>
+                        <a:off x="94379" y="1690688"/>
+                        <a:ext cx="6116190" cy="4680000"/>
+                      </a:xfrm>
+                      <a:prstGeom prst="rect">
+                        <a:avLst/>
+                      </a:prstGeom>
+                    </p:spPr>
+                  </p:pic>
+                </p:oleObj>
+              </mc:Fallback>
+            </mc:AlternateContent>
+          </a:graphicData>
+        </a:graphic>
+      </p:graphicFrame>
+      <p:graphicFrame>
+        <p:nvGraphicFramePr>
+          <p:cNvPr id="4" name="Object 3">
+            <a:extLst>
+              <a:ext uri="{FF2B5EF4-FFF2-40B4-BE49-F238E27FC236}">
+                <a16:creationId xmlns:a16="http://schemas.microsoft.com/office/drawing/2014/main" id="{A6678958-CFD5-A95A-5288-F2BFA9FBB75F}"/>
+              </a:ext>
+            </a:extLst>
+          </p:cNvPr>
+          <p:cNvGraphicFramePr>
+            <a:graphicFrameLocks noChangeAspect="1"/>
+          </p:cNvGraphicFramePr>
+          <p:nvPr>
+            <p:extLst>
+              <p:ext uri="{D42A27DB-BD31-4B8C-83A1-F6EECF244321}">
+                <p14:modId xmlns:p14="http://schemas.microsoft.com/office/powerpoint/2010/main" val="3671730266"/>
+              </p:ext>
+            </p:extLst>
+          </p:nvPr>
+        </p:nvGraphicFramePr>
+        <p:xfrm>
+          <a:off x="6096000" y="1690688"/>
+          <a:ext cx="6116190" cy="4680000"/>
+        </p:xfrm>
+        <a:graphic>
+          <a:graphicData uri="http://schemas.openxmlformats.org/presentationml/2006/ole">
+            <mc:AlternateContent xmlns:mc="http://schemas.openxmlformats.org/markup-compatibility/2006">
+              <mc:Choice xmlns:v="urn:schemas-microsoft-com:vml" Requires="v">
+                <p:oleObj name="Graph" r:id="rId4" imgW="3920760" imgH="3000960" progId="Origin95.Graph">
+                  <p:embed/>
+                </p:oleObj>
+              </mc:Choice>
+              <mc:Fallback>
+                <p:oleObj name="Graph" r:id="rId4" imgW="3920760" imgH="3000960" progId="Origin95.Graph">
+                  <p:embed/>
+                  <p:pic>
+                    <p:nvPicPr>
+                      <p:cNvPr id="0" name=""/>
+                      <p:cNvPicPr/>
+                      <p:nvPr/>
+                    </p:nvPicPr>
+                    <p:blipFill>
+                      <a:blip r:embed="rId5"/>
+                      <a:stretch>
+                        <a:fillRect/>
+                      </a:stretch>
+                    </p:blipFill>
+                    <p:spPr>
+                      <a:xfrm>
+                        <a:off x="6096000" y="1690688"/>
+                        <a:ext cx="6116190" cy="4680000"/>
+                      </a:xfrm>
+                      <a:prstGeom prst="rect">
+                        <a:avLst/>
+                      </a:prstGeom>
+                    </p:spPr>
+                  </p:pic>
+                </p:oleObj>
+              </mc:Fallback>
+            </mc:AlternateContent>
+          </a:graphicData>
+        </a:graphic>
+      </p:graphicFrame>
+    </p:spTree>
+    <p:extLst>
+      <p:ext uri="{BB962C8B-B14F-4D97-AF65-F5344CB8AC3E}">
+        <p14:creationId xmlns:p14="http://schemas.microsoft.com/office/powerpoint/2010/main" val="2714252141"/>
       </p:ext>
     </p:extLst>
   </p:cSld>
@@ -7112,6 +7839,1384 @@
     <p:extLst>
       <p:ext uri="{BB962C8B-B14F-4D97-AF65-F5344CB8AC3E}">
         <p14:creationId xmlns:p14="http://schemas.microsoft.com/office/powerpoint/2010/main" val="718398661"/>
+      </p:ext>
+    </p:extLst>
+  </p:cSld>
+  <p:clrMapOvr>
+    <a:masterClrMapping/>
+  </p:clrMapOvr>
+</p:sld>
+</file>
+
+<file path=ppt/slides/slide40.xml><?xml version="1.0" encoding="utf-8"?>
+<p:sld xmlns:a="http://schemas.openxmlformats.org/drawingml/2006/main" xmlns:r="http://schemas.openxmlformats.org/officeDocument/2006/relationships" xmlns:p="http://schemas.openxmlformats.org/presentationml/2006/main">
+  <p:cSld>
+    <p:spTree>
+      <p:nvGrpSpPr>
+        <p:cNvPr id="1" name=""/>
+        <p:cNvGrpSpPr/>
+        <p:nvPr/>
+      </p:nvGrpSpPr>
+      <p:grpSpPr>
+        <a:xfrm>
+          <a:off x="0" y="0"/>
+          <a:ext cx="0" cy="0"/>
+          <a:chOff x="0" y="0"/>
+          <a:chExt cx="0" cy="0"/>
+        </a:xfrm>
+      </p:grpSpPr>
+      <p:sp>
+        <p:nvSpPr>
+          <p:cNvPr id="3" name="Title 2">
+            <a:extLst>
+              <a:ext uri="{FF2B5EF4-FFF2-40B4-BE49-F238E27FC236}">
+                <a16:creationId xmlns:a16="http://schemas.microsoft.com/office/drawing/2014/main" id="{47C3C4E5-F114-4979-CDFD-7D680CD38E14}"/>
+              </a:ext>
+            </a:extLst>
+          </p:cNvPr>
+          <p:cNvSpPr>
+            <a:spLocks noGrp="1"/>
+          </p:cNvSpPr>
+          <p:nvPr>
+            <p:ph type="ctrTitle"/>
+          </p:nvPr>
+        </p:nvSpPr>
+        <p:spPr/>
+        <p:txBody>
+          <a:bodyPr/>
+          <a:lstStyle/>
+          <a:p>
+            <a:r>
+              <a:rPr lang="en-US" dirty="0"/>
+              <a:t>Sample14_device1</a:t>
+            </a:r>
+            <a:endParaRPr lang="ru-RU" dirty="0"/>
+          </a:p>
+        </p:txBody>
+      </p:sp>
+      <p:sp>
+        <p:nvSpPr>
+          <p:cNvPr id="4" name="Subtitle 3">
+            <a:extLst>
+              <a:ext uri="{FF2B5EF4-FFF2-40B4-BE49-F238E27FC236}">
+                <a16:creationId xmlns:a16="http://schemas.microsoft.com/office/drawing/2014/main" id="{E50CEA5B-1BD8-40CA-0A7B-37574E1D2398}"/>
+              </a:ext>
+            </a:extLst>
+          </p:cNvPr>
+          <p:cNvSpPr>
+            <a:spLocks noGrp="1"/>
+          </p:cNvSpPr>
+          <p:nvPr>
+            <p:ph type="subTitle" idx="1"/>
+          </p:nvPr>
+        </p:nvSpPr>
+        <p:spPr/>
+        <p:txBody>
+          <a:bodyPr/>
+          <a:lstStyle/>
+          <a:p>
+            <a:endParaRPr lang="ru-RU"/>
+          </a:p>
+        </p:txBody>
+      </p:sp>
+    </p:spTree>
+    <p:extLst>
+      <p:ext uri="{BB962C8B-B14F-4D97-AF65-F5344CB8AC3E}">
+        <p14:creationId xmlns:p14="http://schemas.microsoft.com/office/powerpoint/2010/main" val="903338998"/>
+      </p:ext>
+    </p:extLst>
+  </p:cSld>
+  <p:clrMapOvr>
+    <a:masterClrMapping/>
+  </p:clrMapOvr>
+</p:sld>
+</file>
+
+<file path=ppt/slides/slide41.xml><?xml version="1.0" encoding="utf-8"?>
+<p:sld xmlns:a="http://schemas.openxmlformats.org/drawingml/2006/main" xmlns:r="http://schemas.openxmlformats.org/officeDocument/2006/relationships" xmlns:p="http://schemas.openxmlformats.org/presentationml/2006/main">
+  <p:cSld>
+    <p:spTree>
+      <p:nvGrpSpPr>
+        <p:cNvPr id="1" name=""/>
+        <p:cNvGrpSpPr/>
+        <p:nvPr/>
+      </p:nvGrpSpPr>
+      <p:grpSpPr>
+        <a:xfrm>
+          <a:off x="0" y="0"/>
+          <a:ext cx="0" cy="0"/>
+          <a:chOff x="0" y="0"/>
+          <a:chExt cx="0" cy="0"/>
+        </a:xfrm>
+      </p:grpSpPr>
+      <p:sp>
+        <p:nvSpPr>
+          <p:cNvPr id="4" name="Title 3">
+            <a:extLst>
+              <a:ext uri="{FF2B5EF4-FFF2-40B4-BE49-F238E27FC236}">
+                <a16:creationId xmlns:a16="http://schemas.microsoft.com/office/drawing/2014/main" id="{B2A0668B-8EAB-B0AB-C497-628E22161EB9}"/>
+              </a:ext>
+            </a:extLst>
+          </p:cNvPr>
+          <p:cNvSpPr>
+            <a:spLocks noGrp="1"/>
+          </p:cNvSpPr>
+          <p:nvPr>
+            <p:ph type="title"/>
+          </p:nvPr>
+        </p:nvSpPr>
+        <p:spPr/>
+        <p:txBody>
+          <a:bodyPr/>
+          <a:lstStyle/>
+          <a:p>
+            <a:r>
+              <a:rPr lang="en-US" dirty="0"/>
+              <a:t>Sample14_device1</a:t>
+            </a:r>
+            <a:endParaRPr lang="ru-RU" dirty="0"/>
+          </a:p>
+        </p:txBody>
+      </p:sp>
+      <p:graphicFrame>
+        <p:nvGraphicFramePr>
+          <p:cNvPr id="5" name="Object 4">
+            <a:extLst>
+              <a:ext uri="{FF2B5EF4-FFF2-40B4-BE49-F238E27FC236}">
+                <a16:creationId xmlns:a16="http://schemas.microsoft.com/office/drawing/2014/main" id="{E9E806C0-A93C-7066-FE78-52DE2ED592A4}"/>
+              </a:ext>
+            </a:extLst>
+          </p:cNvPr>
+          <p:cNvGraphicFramePr>
+            <a:graphicFrameLocks noChangeAspect="1"/>
+          </p:cNvGraphicFramePr>
+          <p:nvPr>
+            <p:extLst>
+              <p:ext uri="{D42A27DB-BD31-4B8C-83A1-F6EECF244321}">
+                <p14:modId xmlns:p14="http://schemas.microsoft.com/office/powerpoint/2010/main" val="170395572"/>
+              </p:ext>
+            </p:extLst>
+          </p:nvPr>
+        </p:nvGraphicFramePr>
+        <p:xfrm>
+          <a:off x="-367737" y="1690688"/>
+          <a:ext cx="6116190" cy="4680000"/>
+        </p:xfrm>
+        <a:graphic>
+          <a:graphicData uri="http://schemas.openxmlformats.org/presentationml/2006/ole">
+            <mc:AlternateContent xmlns:mc="http://schemas.openxmlformats.org/markup-compatibility/2006">
+              <mc:Choice xmlns:v="urn:schemas-microsoft-com:vml" Requires="v">
+                <p:oleObj name="Graph" r:id="rId2" imgW="3920760" imgH="3000960" progId="Origin95.Graph">
+                  <p:embed/>
+                </p:oleObj>
+              </mc:Choice>
+              <mc:Fallback>
+                <p:oleObj name="Graph" r:id="rId2" imgW="3920760" imgH="3000960" progId="Origin95.Graph">
+                  <p:embed/>
+                  <p:pic>
+                    <p:nvPicPr>
+                      <p:cNvPr id="0" name=""/>
+                      <p:cNvPicPr/>
+                      <p:nvPr/>
+                    </p:nvPicPr>
+                    <p:blipFill>
+                      <a:blip r:embed="rId3"/>
+                      <a:stretch>
+                        <a:fillRect/>
+                      </a:stretch>
+                    </p:blipFill>
+                    <p:spPr>
+                      <a:xfrm>
+                        <a:off x="-367737" y="1690688"/>
+                        <a:ext cx="6116190" cy="4680000"/>
+                      </a:xfrm>
+                      <a:prstGeom prst="rect">
+                        <a:avLst/>
+                      </a:prstGeom>
+                    </p:spPr>
+                  </p:pic>
+                </p:oleObj>
+              </mc:Fallback>
+            </mc:AlternateContent>
+          </a:graphicData>
+        </a:graphic>
+      </p:graphicFrame>
+      <p:graphicFrame>
+        <p:nvGraphicFramePr>
+          <p:cNvPr id="6" name="Object 5">
+            <a:extLst>
+              <a:ext uri="{FF2B5EF4-FFF2-40B4-BE49-F238E27FC236}">
+                <a16:creationId xmlns:a16="http://schemas.microsoft.com/office/drawing/2014/main" id="{D239600B-3673-843F-9198-FF3A69D82D4B}"/>
+              </a:ext>
+            </a:extLst>
+          </p:cNvPr>
+          <p:cNvGraphicFramePr>
+            <a:graphicFrameLocks noChangeAspect="1"/>
+          </p:cNvGraphicFramePr>
+          <p:nvPr>
+            <p:extLst>
+              <p:ext uri="{D42A27DB-BD31-4B8C-83A1-F6EECF244321}">
+                <p14:modId xmlns:p14="http://schemas.microsoft.com/office/powerpoint/2010/main" val="3996344128"/>
+              </p:ext>
+            </p:extLst>
+          </p:nvPr>
+        </p:nvGraphicFramePr>
+        <p:xfrm>
+          <a:off x="5748453" y="1690688"/>
+          <a:ext cx="6116190" cy="4680000"/>
+        </p:xfrm>
+        <a:graphic>
+          <a:graphicData uri="http://schemas.openxmlformats.org/presentationml/2006/ole">
+            <mc:AlternateContent xmlns:mc="http://schemas.openxmlformats.org/markup-compatibility/2006">
+              <mc:Choice xmlns:v="urn:schemas-microsoft-com:vml" Requires="v">
+                <p:oleObj name="Graph" r:id="rId4" imgW="3920760" imgH="3000960" progId="Origin95.Graph">
+                  <p:embed/>
+                </p:oleObj>
+              </mc:Choice>
+              <mc:Fallback>
+                <p:oleObj name="Graph" r:id="rId4" imgW="3920760" imgH="3000960" progId="Origin95.Graph">
+                  <p:embed/>
+                  <p:pic>
+                    <p:nvPicPr>
+                      <p:cNvPr id="0" name=""/>
+                      <p:cNvPicPr/>
+                      <p:nvPr/>
+                    </p:nvPicPr>
+                    <p:blipFill>
+                      <a:blip r:embed="rId5"/>
+                      <a:stretch>
+                        <a:fillRect/>
+                      </a:stretch>
+                    </p:blipFill>
+                    <p:spPr>
+                      <a:xfrm>
+                        <a:off x="5748453" y="1690688"/>
+                        <a:ext cx="6116190" cy="4680000"/>
+                      </a:xfrm>
+                      <a:prstGeom prst="rect">
+                        <a:avLst/>
+                      </a:prstGeom>
+                    </p:spPr>
+                  </p:pic>
+                </p:oleObj>
+              </mc:Fallback>
+            </mc:AlternateContent>
+          </a:graphicData>
+        </a:graphic>
+      </p:graphicFrame>
+    </p:spTree>
+    <p:extLst>
+      <p:ext uri="{BB962C8B-B14F-4D97-AF65-F5344CB8AC3E}">
+        <p14:creationId xmlns:p14="http://schemas.microsoft.com/office/powerpoint/2010/main" val="2683658009"/>
+      </p:ext>
+    </p:extLst>
+  </p:cSld>
+  <p:clrMapOvr>
+    <a:masterClrMapping/>
+  </p:clrMapOvr>
+</p:sld>
+</file>
+
+<file path=ppt/slides/slide42.xml><?xml version="1.0" encoding="utf-8"?>
+<p:sld xmlns:a="http://schemas.openxmlformats.org/drawingml/2006/main" xmlns:r="http://schemas.openxmlformats.org/officeDocument/2006/relationships" xmlns:p="http://schemas.openxmlformats.org/presentationml/2006/main">
+  <p:cSld>
+    <p:spTree>
+      <p:nvGrpSpPr>
+        <p:cNvPr id="1" name=""/>
+        <p:cNvGrpSpPr/>
+        <p:nvPr/>
+      </p:nvGrpSpPr>
+      <p:grpSpPr>
+        <a:xfrm>
+          <a:off x="0" y="0"/>
+          <a:ext cx="0" cy="0"/>
+          <a:chOff x="0" y="0"/>
+          <a:chExt cx="0" cy="0"/>
+        </a:xfrm>
+      </p:grpSpPr>
+      <p:sp>
+        <p:nvSpPr>
+          <p:cNvPr id="2" name="Title 1">
+            <a:extLst>
+              <a:ext uri="{FF2B5EF4-FFF2-40B4-BE49-F238E27FC236}">
+                <a16:creationId xmlns:a16="http://schemas.microsoft.com/office/drawing/2014/main" id="{0E6A5FB2-71C1-D984-F415-0893B69C2D8F}"/>
+              </a:ext>
+            </a:extLst>
+          </p:cNvPr>
+          <p:cNvSpPr>
+            <a:spLocks noGrp="1"/>
+          </p:cNvSpPr>
+          <p:nvPr>
+            <p:ph type="title"/>
+          </p:nvPr>
+        </p:nvSpPr>
+        <p:spPr/>
+        <p:txBody>
+          <a:bodyPr/>
+          <a:lstStyle/>
+          <a:p>
+            <a:r>
+              <a:rPr lang="en-US" dirty="0"/>
+              <a:t>Sample14_device1</a:t>
+            </a:r>
+            <a:endParaRPr lang="ru-RU" dirty="0"/>
+          </a:p>
+        </p:txBody>
+      </p:sp>
+      <p:graphicFrame>
+        <p:nvGraphicFramePr>
+          <p:cNvPr id="3" name="Object 2">
+            <a:extLst>
+              <a:ext uri="{FF2B5EF4-FFF2-40B4-BE49-F238E27FC236}">
+                <a16:creationId xmlns:a16="http://schemas.microsoft.com/office/drawing/2014/main" id="{55567EF9-0A1C-5CCE-BA55-699C6698DB5B}"/>
+              </a:ext>
+            </a:extLst>
+          </p:cNvPr>
+          <p:cNvGraphicFramePr>
+            <a:graphicFrameLocks noChangeAspect="1"/>
+          </p:cNvGraphicFramePr>
+          <p:nvPr>
+            <p:extLst>
+              <p:ext uri="{D42A27DB-BD31-4B8C-83A1-F6EECF244321}">
+                <p14:modId xmlns:p14="http://schemas.microsoft.com/office/powerpoint/2010/main" val="1612149439"/>
+              </p:ext>
+            </p:extLst>
+          </p:nvPr>
+        </p:nvGraphicFramePr>
+        <p:xfrm>
+          <a:off x="153374" y="1690688"/>
+          <a:ext cx="6586667" cy="5040000"/>
+        </p:xfrm>
+        <a:graphic>
+          <a:graphicData uri="http://schemas.openxmlformats.org/presentationml/2006/ole">
+            <mc:AlternateContent xmlns:mc="http://schemas.openxmlformats.org/markup-compatibility/2006">
+              <mc:Choice xmlns:v="urn:schemas-microsoft-com:vml" Requires="v">
+                <p:oleObj name="Graph" r:id="rId2" imgW="3920760" imgH="3000960" progId="Origin95.Graph">
+                  <p:embed/>
+                </p:oleObj>
+              </mc:Choice>
+              <mc:Fallback>
+                <p:oleObj name="Graph" r:id="rId2" imgW="3920760" imgH="3000960" progId="Origin95.Graph">
+                  <p:embed/>
+                  <p:pic>
+                    <p:nvPicPr>
+                      <p:cNvPr id="0" name=""/>
+                      <p:cNvPicPr/>
+                      <p:nvPr/>
+                    </p:nvPicPr>
+                    <p:blipFill>
+                      <a:blip r:embed="rId3"/>
+                      <a:stretch>
+                        <a:fillRect/>
+                      </a:stretch>
+                    </p:blipFill>
+                    <p:spPr>
+                      <a:xfrm>
+                        <a:off x="153374" y="1690688"/>
+                        <a:ext cx="6586667" cy="5040000"/>
+                      </a:xfrm>
+                      <a:prstGeom prst="rect">
+                        <a:avLst/>
+                      </a:prstGeom>
+                    </p:spPr>
+                  </p:pic>
+                </p:oleObj>
+              </mc:Fallback>
+            </mc:AlternateContent>
+          </a:graphicData>
+        </a:graphic>
+      </p:graphicFrame>
+    </p:spTree>
+    <p:extLst>
+      <p:ext uri="{BB962C8B-B14F-4D97-AF65-F5344CB8AC3E}">
+        <p14:creationId xmlns:p14="http://schemas.microsoft.com/office/powerpoint/2010/main" val="1663993832"/>
+      </p:ext>
+    </p:extLst>
+  </p:cSld>
+  <p:clrMapOvr>
+    <a:masterClrMapping/>
+  </p:clrMapOvr>
+</p:sld>
+</file>
+
+<file path=ppt/slides/slide43.xml><?xml version="1.0" encoding="utf-8"?>
+<p:sld xmlns:a="http://schemas.openxmlformats.org/drawingml/2006/main" xmlns:r="http://schemas.openxmlformats.org/officeDocument/2006/relationships" xmlns:p="http://schemas.openxmlformats.org/presentationml/2006/main">
+  <p:cSld>
+    <p:spTree>
+      <p:nvGrpSpPr>
+        <p:cNvPr id="1" name=""/>
+        <p:cNvGrpSpPr/>
+        <p:nvPr/>
+      </p:nvGrpSpPr>
+      <p:grpSpPr>
+        <a:xfrm>
+          <a:off x="0" y="0"/>
+          <a:ext cx="0" cy="0"/>
+          <a:chOff x="0" y="0"/>
+          <a:chExt cx="0" cy="0"/>
+        </a:xfrm>
+      </p:grpSpPr>
+      <p:sp>
+        <p:nvSpPr>
+          <p:cNvPr id="3" name="Title 2">
+            <a:extLst>
+              <a:ext uri="{FF2B5EF4-FFF2-40B4-BE49-F238E27FC236}">
+                <a16:creationId xmlns:a16="http://schemas.microsoft.com/office/drawing/2014/main" id="{1E865793-4948-7865-B3EA-E46C0C5FB954}"/>
+              </a:ext>
+            </a:extLst>
+          </p:cNvPr>
+          <p:cNvSpPr>
+            <a:spLocks noGrp="1"/>
+          </p:cNvSpPr>
+          <p:nvPr>
+            <p:ph type="ctrTitle"/>
+          </p:nvPr>
+        </p:nvSpPr>
+        <p:spPr/>
+        <p:txBody>
+          <a:bodyPr/>
+          <a:lstStyle/>
+          <a:p>
+            <a:r>
+              <a:rPr lang="en-US" dirty="0"/>
+              <a:t>Sample14_device2</a:t>
+            </a:r>
+            <a:endParaRPr lang="ru-RU" dirty="0"/>
+          </a:p>
+        </p:txBody>
+      </p:sp>
+      <p:sp>
+        <p:nvSpPr>
+          <p:cNvPr id="4" name="Subtitle 3">
+            <a:extLst>
+              <a:ext uri="{FF2B5EF4-FFF2-40B4-BE49-F238E27FC236}">
+                <a16:creationId xmlns:a16="http://schemas.microsoft.com/office/drawing/2014/main" id="{57E2CAB1-E7BA-C00D-BE50-6D7CB169A164}"/>
+              </a:ext>
+            </a:extLst>
+          </p:cNvPr>
+          <p:cNvSpPr>
+            <a:spLocks noGrp="1"/>
+          </p:cNvSpPr>
+          <p:nvPr>
+            <p:ph type="subTitle" idx="1"/>
+          </p:nvPr>
+        </p:nvSpPr>
+        <p:spPr/>
+        <p:txBody>
+          <a:bodyPr/>
+          <a:lstStyle/>
+          <a:p>
+            <a:endParaRPr lang="ru-RU"/>
+          </a:p>
+        </p:txBody>
+      </p:sp>
+    </p:spTree>
+    <p:extLst>
+      <p:ext uri="{BB962C8B-B14F-4D97-AF65-F5344CB8AC3E}">
+        <p14:creationId xmlns:p14="http://schemas.microsoft.com/office/powerpoint/2010/main" val="779254882"/>
+      </p:ext>
+    </p:extLst>
+  </p:cSld>
+  <p:clrMapOvr>
+    <a:masterClrMapping/>
+  </p:clrMapOvr>
+</p:sld>
+</file>
+
+<file path=ppt/slides/slide44.xml><?xml version="1.0" encoding="utf-8"?>
+<p:sld xmlns:a="http://schemas.openxmlformats.org/drawingml/2006/main" xmlns:r="http://schemas.openxmlformats.org/officeDocument/2006/relationships" xmlns:p="http://schemas.openxmlformats.org/presentationml/2006/main">
+  <p:cSld>
+    <p:spTree>
+      <p:nvGrpSpPr>
+        <p:cNvPr id="1" name=""/>
+        <p:cNvGrpSpPr/>
+        <p:nvPr/>
+      </p:nvGrpSpPr>
+      <p:grpSpPr>
+        <a:xfrm>
+          <a:off x="0" y="0"/>
+          <a:ext cx="0" cy="0"/>
+          <a:chOff x="0" y="0"/>
+          <a:chExt cx="0" cy="0"/>
+        </a:xfrm>
+      </p:grpSpPr>
+      <p:sp>
+        <p:nvSpPr>
+          <p:cNvPr id="4" name="Title 3">
+            <a:extLst>
+              <a:ext uri="{FF2B5EF4-FFF2-40B4-BE49-F238E27FC236}">
+                <a16:creationId xmlns:a16="http://schemas.microsoft.com/office/drawing/2014/main" id="{5FB16143-2A31-4809-705B-D4952D714739}"/>
+              </a:ext>
+            </a:extLst>
+          </p:cNvPr>
+          <p:cNvSpPr>
+            <a:spLocks noGrp="1"/>
+          </p:cNvSpPr>
+          <p:nvPr>
+            <p:ph type="title"/>
+          </p:nvPr>
+        </p:nvSpPr>
+        <p:spPr/>
+        <p:txBody>
+          <a:bodyPr/>
+          <a:lstStyle/>
+          <a:p>
+            <a:r>
+              <a:rPr lang="en-US" dirty="0"/>
+              <a:t>Sample14_device2</a:t>
+            </a:r>
+            <a:endParaRPr lang="ru-RU" dirty="0"/>
+          </a:p>
+        </p:txBody>
+      </p:sp>
+      <p:graphicFrame>
+        <p:nvGraphicFramePr>
+          <p:cNvPr id="5" name="Object 4">
+            <a:extLst>
+              <a:ext uri="{FF2B5EF4-FFF2-40B4-BE49-F238E27FC236}">
+                <a16:creationId xmlns:a16="http://schemas.microsoft.com/office/drawing/2014/main" id="{C62CFEC3-5D85-739C-F46E-B8FCC23E3060}"/>
+              </a:ext>
+            </a:extLst>
+          </p:cNvPr>
+          <p:cNvGraphicFramePr>
+            <a:graphicFrameLocks noChangeAspect="1"/>
+          </p:cNvGraphicFramePr>
+          <p:nvPr>
+            <p:extLst>
+              <p:ext uri="{D42A27DB-BD31-4B8C-83A1-F6EECF244321}">
+                <p14:modId xmlns:p14="http://schemas.microsoft.com/office/powerpoint/2010/main" val="484793057"/>
+              </p:ext>
+            </p:extLst>
+          </p:nvPr>
+        </p:nvGraphicFramePr>
+        <p:xfrm>
+          <a:off x="0" y="1690688"/>
+          <a:ext cx="6116190" cy="4680000"/>
+        </p:xfrm>
+        <a:graphic>
+          <a:graphicData uri="http://schemas.openxmlformats.org/presentationml/2006/ole">
+            <mc:AlternateContent xmlns:mc="http://schemas.openxmlformats.org/markup-compatibility/2006">
+              <mc:Choice xmlns:v="urn:schemas-microsoft-com:vml" Requires="v">
+                <p:oleObj name="Graph" r:id="rId2" imgW="3920760" imgH="3000960" progId="Origin95.Graph">
+                  <p:embed/>
+                </p:oleObj>
+              </mc:Choice>
+              <mc:Fallback>
+                <p:oleObj name="Graph" r:id="rId2" imgW="3920760" imgH="3000960" progId="Origin95.Graph">
+                  <p:embed/>
+                  <p:pic>
+                    <p:nvPicPr>
+                      <p:cNvPr id="0" name=""/>
+                      <p:cNvPicPr/>
+                      <p:nvPr/>
+                    </p:nvPicPr>
+                    <p:blipFill>
+                      <a:blip r:embed="rId3"/>
+                      <a:stretch>
+                        <a:fillRect/>
+                      </a:stretch>
+                    </p:blipFill>
+                    <p:spPr>
+                      <a:xfrm>
+                        <a:off x="0" y="1690688"/>
+                        <a:ext cx="6116190" cy="4680000"/>
+                      </a:xfrm>
+                      <a:prstGeom prst="rect">
+                        <a:avLst/>
+                      </a:prstGeom>
+                    </p:spPr>
+                  </p:pic>
+                </p:oleObj>
+              </mc:Fallback>
+            </mc:AlternateContent>
+          </a:graphicData>
+        </a:graphic>
+      </p:graphicFrame>
+      <p:graphicFrame>
+        <p:nvGraphicFramePr>
+          <p:cNvPr id="6" name="Object 5">
+            <a:extLst>
+              <a:ext uri="{FF2B5EF4-FFF2-40B4-BE49-F238E27FC236}">
+                <a16:creationId xmlns:a16="http://schemas.microsoft.com/office/drawing/2014/main" id="{DFED4D90-B3AE-10CD-7477-268B33548DD4}"/>
+              </a:ext>
+            </a:extLst>
+          </p:cNvPr>
+          <p:cNvGraphicFramePr>
+            <a:graphicFrameLocks noChangeAspect="1"/>
+          </p:cNvGraphicFramePr>
+          <p:nvPr>
+            <p:extLst>
+              <p:ext uri="{D42A27DB-BD31-4B8C-83A1-F6EECF244321}">
+                <p14:modId xmlns:p14="http://schemas.microsoft.com/office/powerpoint/2010/main" val="4135528908"/>
+              </p:ext>
+            </p:extLst>
+          </p:nvPr>
+        </p:nvGraphicFramePr>
+        <p:xfrm>
+          <a:off x="5954405" y="1690688"/>
+          <a:ext cx="6116190" cy="4680000"/>
+        </p:xfrm>
+        <a:graphic>
+          <a:graphicData uri="http://schemas.openxmlformats.org/presentationml/2006/ole">
+            <mc:AlternateContent xmlns:mc="http://schemas.openxmlformats.org/markup-compatibility/2006">
+              <mc:Choice xmlns:v="urn:schemas-microsoft-com:vml" Requires="v">
+                <p:oleObj name="Graph" r:id="rId4" imgW="3920760" imgH="3000960" progId="Origin95.Graph">
+                  <p:embed/>
+                </p:oleObj>
+              </mc:Choice>
+              <mc:Fallback>
+                <p:oleObj name="Graph" r:id="rId4" imgW="3920760" imgH="3000960" progId="Origin95.Graph">
+                  <p:embed/>
+                  <p:pic>
+                    <p:nvPicPr>
+                      <p:cNvPr id="0" name=""/>
+                      <p:cNvPicPr/>
+                      <p:nvPr/>
+                    </p:nvPicPr>
+                    <p:blipFill>
+                      <a:blip r:embed="rId5"/>
+                      <a:stretch>
+                        <a:fillRect/>
+                      </a:stretch>
+                    </p:blipFill>
+                    <p:spPr>
+                      <a:xfrm>
+                        <a:off x="5954405" y="1690688"/>
+                        <a:ext cx="6116190" cy="4680000"/>
+                      </a:xfrm>
+                      <a:prstGeom prst="rect">
+                        <a:avLst/>
+                      </a:prstGeom>
+                    </p:spPr>
+                  </p:pic>
+                </p:oleObj>
+              </mc:Fallback>
+            </mc:AlternateContent>
+          </a:graphicData>
+        </a:graphic>
+      </p:graphicFrame>
+    </p:spTree>
+    <p:extLst>
+      <p:ext uri="{BB962C8B-B14F-4D97-AF65-F5344CB8AC3E}">
+        <p14:creationId xmlns:p14="http://schemas.microsoft.com/office/powerpoint/2010/main" val="1414616555"/>
+      </p:ext>
+    </p:extLst>
+  </p:cSld>
+  <p:clrMapOvr>
+    <a:masterClrMapping/>
+  </p:clrMapOvr>
+</p:sld>
+</file>
+
+<file path=ppt/slides/slide45.xml><?xml version="1.0" encoding="utf-8"?>
+<p:sld xmlns:a="http://schemas.openxmlformats.org/drawingml/2006/main" xmlns:r="http://schemas.openxmlformats.org/officeDocument/2006/relationships" xmlns:p="http://schemas.openxmlformats.org/presentationml/2006/main">
+  <p:cSld>
+    <p:spTree>
+      <p:nvGrpSpPr>
+        <p:cNvPr id="1" name=""/>
+        <p:cNvGrpSpPr/>
+        <p:nvPr/>
+      </p:nvGrpSpPr>
+      <p:grpSpPr>
+        <a:xfrm>
+          <a:off x="0" y="0"/>
+          <a:ext cx="0" cy="0"/>
+          <a:chOff x="0" y="0"/>
+          <a:chExt cx="0" cy="0"/>
+        </a:xfrm>
+      </p:grpSpPr>
+      <p:sp>
+        <p:nvSpPr>
+          <p:cNvPr id="2" name="Title 1">
+            <a:extLst>
+              <a:ext uri="{FF2B5EF4-FFF2-40B4-BE49-F238E27FC236}">
+                <a16:creationId xmlns:a16="http://schemas.microsoft.com/office/drawing/2014/main" id="{48EDBA04-5338-8F32-42EC-0E4FB6861E7F}"/>
+              </a:ext>
+            </a:extLst>
+          </p:cNvPr>
+          <p:cNvSpPr>
+            <a:spLocks noGrp="1"/>
+          </p:cNvSpPr>
+          <p:nvPr>
+            <p:ph type="title"/>
+          </p:nvPr>
+        </p:nvSpPr>
+        <p:spPr/>
+        <p:txBody>
+          <a:bodyPr/>
+          <a:lstStyle/>
+          <a:p>
+            <a:r>
+              <a:rPr lang="en-US" dirty="0"/>
+              <a:t>Sample14_device2</a:t>
+            </a:r>
+            <a:endParaRPr lang="ru-RU" dirty="0"/>
+          </a:p>
+        </p:txBody>
+      </p:sp>
+      <p:graphicFrame>
+        <p:nvGraphicFramePr>
+          <p:cNvPr id="3" name="Object 2">
+            <a:extLst>
+              <a:ext uri="{FF2B5EF4-FFF2-40B4-BE49-F238E27FC236}">
+                <a16:creationId xmlns:a16="http://schemas.microsoft.com/office/drawing/2014/main" id="{92CD28C1-AA33-69A9-6552-4E521BD61508}"/>
+              </a:ext>
+            </a:extLst>
+          </p:cNvPr>
+          <p:cNvGraphicFramePr>
+            <a:graphicFrameLocks noChangeAspect="1"/>
+          </p:cNvGraphicFramePr>
+          <p:nvPr>
+            <p:extLst>
+              <p:ext uri="{D42A27DB-BD31-4B8C-83A1-F6EECF244321}">
+                <p14:modId xmlns:p14="http://schemas.microsoft.com/office/powerpoint/2010/main" val="1813878817"/>
+              </p:ext>
+            </p:extLst>
+          </p:nvPr>
+        </p:nvGraphicFramePr>
+        <p:xfrm>
+          <a:off x="114044" y="1690688"/>
+          <a:ext cx="6586667" cy="5040000"/>
+        </p:xfrm>
+        <a:graphic>
+          <a:graphicData uri="http://schemas.openxmlformats.org/presentationml/2006/ole">
+            <mc:AlternateContent xmlns:mc="http://schemas.openxmlformats.org/markup-compatibility/2006">
+              <mc:Choice xmlns:v="urn:schemas-microsoft-com:vml" Requires="v">
+                <p:oleObj name="Graph" r:id="rId2" imgW="3920760" imgH="3000960" progId="Origin95.Graph">
+                  <p:embed/>
+                </p:oleObj>
+              </mc:Choice>
+              <mc:Fallback>
+                <p:oleObj name="Graph" r:id="rId2" imgW="3920760" imgH="3000960" progId="Origin95.Graph">
+                  <p:embed/>
+                  <p:pic>
+                    <p:nvPicPr>
+                      <p:cNvPr id="0" name=""/>
+                      <p:cNvPicPr/>
+                      <p:nvPr/>
+                    </p:nvPicPr>
+                    <p:blipFill>
+                      <a:blip r:embed="rId3"/>
+                      <a:stretch>
+                        <a:fillRect/>
+                      </a:stretch>
+                    </p:blipFill>
+                    <p:spPr>
+                      <a:xfrm>
+                        <a:off x="114044" y="1690688"/>
+                        <a:ext cx="6586667" cy="5040000"/>
+                      </a:xfrm>
+                      <a:prstGeom prst="rect">
+                        <a:avLst/>
+                      </a:prstGeom>
+                    </p:spPr>
+                  </p:pic>
+                </p:oleObj>
+              </mc:Fallback>
+            </mc:AlternateContent>
+          </a:graphicData>
+        </a:graphic>
+      </p:graphicFrame>
+    </p:spTree>
+    <p:extLst>
+      <p:ext uri="{BB962C8B-B14F-4D97-AF65-F5344CB8AC3E}">
+        <p14:creationId xmlns:p14="http://schemas.microsoft.com/office/powerpoint/2010/main" val="262094917"/>
+      </p:ext>
+    </p:extLst>
+  </p:cSld>
+  <p:clrMapOvr>
+    <a:masterClrMapping/>
+  </p:clrMapOvr>
+</p:sld>
+</file>
+
+<file path=ppt/slides/slide46.xml><?xml version="1.0" encoding="utf-8"?>
+<p:sld xmlns:a="http://schemas.openxmlformats.org/drawingml/2006/main" xmlns:r="http://schemas.openxmlformats.org/officeDocument/2006/relationships" xmlns:p="http://schemas.openxmlformats.org/presentationml/2006/main">
+  <p:cSld>
+    <p:spTree>
+      <p:nvGrpSpPr>
+        <p:cNvPr id="1" name=""/>
+        <p:cNvGrpSpPr/>
+        <p:nvPr/>
+      </p:nvGrpSpPr>
+      <p:grpSpPr>
+        <a:xfrm>
+          <a:off x="0" y="0"/>
+          <a:ext cx="0" cy="0"/>
+          <a:chOff x="0" y="0"/>
+          <a:chExt cx="0" cy="0"/>
+        </a:xfrm>
+      </p:grpSpPr>
+      <p:sp>
+        <p:nvSpPr>
+          <p:cNvPr id="3" name="Title 2">
+            <a:extLst>
+              <a:ext uri="{FF2B5EF4-FFF2-40B4-BE49-F238E27FC236}">
+                <a16:creationId xmlns:a16="http://schemas.microsoft.com/office/drawing/2014/main" id="{D2D18937-45D1-737F-C0A1-64E9BE7CB2B5}"/>
+              </a:ext>
+            </a:extLst>
+          </p:cNvPr>
+          <p:cNvSpPr>
+            <a:spLocks noGrp="1"/>
+          </p:cNvSpPr>
+          <p:nvPr>
+            <p:ph type="ctrTitle"/>
+          </p:nvPr>
+        </p:nvSpPr>
+        <p:spPr/>
+        <p:txBody>
+          <a:bodyPr/>
+          <a:lstStyle/>
+          <a:p>
+            <a:r>
+              <a:rPr lang="en-US" dirty="0"/>
+              <a:t>Sample14_device3</a:t>
+            </a:r>
+            <a:endParaRPr lang="ru-RU" dirty="0"/>
+          </a:p>
+        </p:txBody>
+      </p:sp>
+      <p:sp>
+        <p:nvSpPr>
+          <p:cNvPr id="4" name="Subtitle 3">
+            <a:extLst>
+              <a:ext uri="{FF2B5EF4-FFF2-40B4-BE49-F238E27FC236}">
+                <a16:creationId xmlns:a16="http://schemas.microsoft.com/office/drawing/2014/main" id="{49A0BAE6-1A95-6CD3-C4C6-E8250CC350A3}"/>
+              </a:ext>
+            </a:extLst>
+          </p:cNvPr>
+          <p:cNvSpPr>
+            <a:spLocks noGrp="1"/>
+          </p:cNvSpPr>
+          <p:nvPr>
+            <p:ph type="subTitle" idx="1"/>
+          </p:nvPr>
+        </p:nvSpPr>
+        <p:spPr/>
+        <p:txBody>
+          <a:bodyPr/>
+          <a:lstStyle/>
+          <a:p>
+            <a:endParaRPr lang="ru-RU"/>
+          </a:p>
+        </p:txBody>
+      </p:sp>
+    </p:spTree>
+    <p:extLst>
+      <p:ext uri="{BB962C8B-B14F-4D97-AF65-F5344CB8AC3E}">
+        <p14:creationId xmlns:p14="http://schemas.microsoft.com/office/powerpoint/2010/main" val="3979510891"/>
+      </p:ext>
+    </p:extLst>
+  </p:cSld>
+  <p:clrMapOvr>
+    <a:masterClrMapping/>
+  </p:clrMapOvr>
+</p:sld>
+</file>
+
+<file path=ppt/slides/slide47.xml><?xml version="1.0" encoding="utf-8"?>
+<p:sld xmlns:a="http://schemas.openxmlformats.org/drawingml/2006/main" xmlns:r="http://schemas.openxmlformats.org/officeDocument/2006/relationships" xmlns:p="http://schemas.openxmlformats.org/presentationml/2006/main">
+  <p:cSld>
+    <p:spTree>
+      <p:nvGrpSpPr>
+        <p:cNvPr id="1" name=""/>
+        <p:cNvGrpSpPr/>
+        <p:nvPr/>
+      </p:nvGrpSpPr>
+      <p:grpSpPr>
+        <a:xfrm>
+          <a:off x="0" y="0"/>
+          <a:ext cx="0" cy="0"/>
+          <a:chOff x="0" y="0"/>
+          <a:chExt cx="0" cy="0"/>
+        </a:xfrm>
+      </p:grpSpPr>
+      <p:sp>
+        <p:nvSpPr>
+          <p:cNvPr id="4" name="Title 3">
+            <a:extLst>
+              <a:ext uri="{FF2B5EF4-FFF2-40B4-BE49-F238E27FC236}">
+                <a16:creationId xmlns:a16="http://schemas.microsoft.com/office/drawing/2014/main" id="{2F423800-2154-5C92-F26E-4E990A119747}"/>
+              </a:ext>
+            </a:extLst>
+          </p:cNvPr>
+          <p:cNvSpPr>
+            <a:spLocks noGrp="1"/>
+          </p:cNvSpPr>
+          <p:nvPr>
+            <p:ph type="title"/>
+          </p:nvPr>
+        </p:nvSpPr>
+        <p:spPr/>
+        <p:txBody>
+          <a:bodyPr/>
+          <a:lstStyle/>
+          <a:p>
+            <a:r>
+              <a:rPr lang="en-US" dirty="0"/>
+              <a:t>Sample14_device3</a:t>
+            </a:r>
+            <a:endParaRPr lang="ru-RU" dirty="0"/>
+          </a:p>
+        </p:txBody>
+      </p:sp>
+      <p:graphicFrame>
+        <p:nvGraphicFramePr>
+          <p:cNvPr id="5" name="Object 4">
+            <a:extLst>
+              <a:ext uri="{FF2B5EF4-FFF2-40B4-BE49-F238E27FC236}">
+                <a16:creationId xmlns:a16="http://schemas.microsoft.com/office/drawing/2014/main" id="{3FFA36B5-D356-4F1E-4603-93EA938008A6}"/>
+              </a:ext>
+            </a:extLst>
+          </p:cNvPr>
+          <p:cNvGraphicFramePr>
+            <a:graphicFrameLocks noChangeAspect="1"/>
+          </p:cNvGraphicFramePr>
+          <p:nvPr>
+            <p:extLst>
+              <p:ext uri="{D42A27DB-BD31-4B8C-83A1-F6EECF244321}">
+                <p14:modId xmlns:p14="http://schemas.microsoft.com/office/powerpoint/2010/main" val="625530913"/>
+              </p:ext>
+            </p:extLst>
+          </p:nvPr>
+        </p:nvGraphicFramePr>
+        <p:xfrm>
+          <a:off x="-20190" y="1690688"/>
+          <a:ext cx="6116190" cy="4680000"/>
+        </p:xfrm>
+        <a:graphic>
+          <a:graphicData uri="http://schemas.openxmlformats.org/presentationml/2006/ole">
+            <mc:AlternateContent xmlns:mc="http://schemas.openxmlformats.org/markup-compatibility/2006">
+              <mc:Choice xmlns:v="urn:schemas-microsoft-com:vml" Requires="v">
+                <p:oleObj name="Graph" r:id="rId2" imgW="3920760" imgH="3000960" progId="Origin95.Graph">
+                  <p:embed/>
+                </p:oleObj>
+              </mc:Choice>
+              <mc:Fallback>
+                <p:oleObj name="Graph" r:id="rId2" imgW="3920760" imgH="3000960" progId="Origin95.Graph">
+                  <p:embed/>
+                  <p:pic>
+                    <p:nvPicPr>
+                      <p:cNvPr id="0" name=""/>
+                      <p:cNvPicPr/>
+                      <p:nvPr/>
+                    </p:nvPicPr>
+                    <p:blipFill>
+                      <a:blip r:embed="rId3"/>
+                      <a:stretch>
+                        <a:fillRect/>
+                      </a:stretch>
+                    </p:blipFill>
+                    <p:spPr>
+                      <a:xfrm>
+                        <a:off x="-20190" y="1690688"/>
+                        <a:ext cx="6116190" cy="4680000"/>
+                      </a:xfrm>
+                      <a:prstGeom prst="rect">
+                        <a:avLst/>
+                      </a:prstGeom>
+                    </p:spPr>
+                  </p:pic>
+                </p:oleObj>
+              </mc:Fallback>
+            </mc:AlternateContent>
+          </a:graphicData>
+        </a:graphic>
+      </p:graphicFrame>
+      <p:graphicFrame>
+        <p:nvGraphicFramePr>
+          <p:cNvPr id="6" name="Object 5">
+            <a:extLst>
+              <a:ext uri="{FF2B5EF4-FFF2-40B4-BE49-F238E27FC236}">
+                <a16:creationId xmlns:a16="http://schemas.microsoft.com/office/drawing/2014/main" id="{28AF6768-0828-D74F-894C-328181D02EEE}"/>
+              </a:ext>
+            </a:extLst>
+          </p:cNvPr>
+          <p:cNvGraphicFramePr>
+            <a:graphicFrameLocks noChangeAspect="1"/>
+          </p:cNvGraphicFramePr>
+          <p:nvPr>
+            <p:extLst>
+              <p:ext uri="{D42A27DB-BD31-4B8C-83A1-F6EECF244321}">
+                <p14:modId xmlns:p14="http://schemas.microsoft.com/office/powerpoint/2010/main" val="2963746016"/>
+              </p:ext>
+            </p:extLst>
+          </p:nvPr>
+        </p:nvGraphicFramePr>
+        <p:xfrm>
+          <a:off x="6075810" y="1690688"/>
+          <a:ext cx="6116190" cy="4680000"/>
+        </p:xfrm>
+        <a:graphic>
+          <a:graphicData uri="http://schemas.openxmlformats.org/presentationml/2006/ole">
+            <mc:AlternateContent xmlns:mc="http://schemas.openxmlformats.org/markup-compatibility/2006">
+              <mc:Choice xmlns:v="urn:schemas-microsoft-com:vml" Requires="v">
+                <p:oleObj name="Graph" r:id="rId4" imgW="3920760" imgH="3000960" progId="Origin95.Graph">
+                  <p:embed/>
+                </p:oleObj>
+              </mc:Choice>
+              <mc:Fallback>
+                <p:oleObj name="Graph" r:id="rId4" imgW="3920760" imgH="3000960" progId="Origin95.Graph">
+                  <p:embed/>
+                  <p:pic>
+                    <p:nvPicPr>
+                      <p:cNvPr id="0" name=""/>
+                      <p:cNvPicPr/>
+                      <p:nvPr/>
+                    </p:nvPicPr>
+                    <p:blipFill>
+                      <a:blip r:embed="rId5"/>
+                      <a:stretch>
+                        <a:fillRect/>
+                      </a:stretch>
+                    </p:blipFill>
+                    <p:spPr>
+                      <a:xfrm>
+                        <a:off x="6075810" y="1690688"/>
+                        <a:ext cx="6116190" cy="4680000"/>
+                      </a:xfrm>
+                      <a:prstGeom prst="rect">
+                        <a:avLst/>
+                      </a:prstGeom>
+                    </p:spPr>
+                  </p:pic>
+                </p:oleObj>
+              </mc:Fallback>
+            </mc:AlternateContent>
+          </a:graphicData>
+        </a:graphic>
+      </p:graphicFrame>
+      <p:sp>
+        <p:nvSpPr>
+          <p:cNvPr id="7" name="TextBox 6">
+            <a:extLst>
+              <a:ext uri="{FF2B5EF4-FFF2-40B4-BE49-F238E27FC236}">
+                <a16:creationId xmlns:a16="http://schemas.microsoft.com/office/drawing/2014/main" id="{E23A2A8E-A0D4-2EC9-4FB7-201FD6A7658B}"/>
+              </a:ext>
+            </a:extLst>
+          </p:cNvPr>
+          <p:cNvSpPr txBox="1"/>
+          <p:nvPr/>
+        </p:nvSpPr>
+        <p:spPr>
+          <a:xfrm>
+            <a:off x="7046413" y="947576"/>
+            <a:ext cx="4726487" cy="646331"/>
+          </a:xfrm>
+          <a:prstGeom prst="rect">
+            <a:avLst/>
+          </a:prstGeom>
+          <a:noFill/>
+        </p:spPr>
+        <p:txBody>
+          <a:bodyPr wrap="none" rtlCol="0">
+            <a:spAutoFit/>
+          </a:bodyPr>
+          <a:lstStyle/>
+          <a:p>
+            <a:r>
+              <a:rPr lang="en-US" dirty="0"/>
+              <a:t>At 40 V peaks are very small already at 500 </a:t>
+            </a:r>
+            <a:r>
+              <a:rPr lang="en-US" dirty="0" err="1"/>
+              <a:t>uA</a:t>
+            </a:r>
+            <a:r>
+              <a:rPr lang="en-US" dirty="0"/>
+              <a:t>, </a:t>
+            </a:r>
+          </a:p>
+          <a:p>
+            <a:r>
+              <a:rPr lang="en-US" dirty="0"/>
+              <a:t>so I stopped here and increased </a:t>
+            </a:r>
+            <a:r>
+              <a:rPr lang="en-US" dirty="0" err="1"/>
+              <a:t>VGate</a:t>
+            </a:r>
+            <a:r>
+              <a:rPr lang="en-US" dirty="0"/>
+              <a:t> to 50 V</a:t>
+            </a:r>
+            <a:endParaRPr lang="ru-RU" dirty="0"/>
+          </a:p>
+        </p:txBody>
+      </p:sp>
+    </p:spTree>
+    <p:extLst>
+      <p:ext uri="{BB962C8B-B14F-4D97-AF65-F5344CB8AC3E}">
+        <p14:creationId xmlns:p14="http://schemas.microsoft.com/office/powerpoint/2010/main" val="1119084532"/>
+      </p:ext>
+    </p:extLst>
+  </p:cSld>
+  <p:clrMapOvr>
+    <a:masterClrMapping/>
+  </p:clrMapOvr>
+</p:sld>
+</file>
+
+<file path=ppt/slides/slide48.xml><?xml version="1.0" encoding="utf-8"?>
+<p:sld xmlns:a="http://schemas.openxmlformats.org/drawingml/2006/main" xmlns:r="http://schemas.openxmlformats.org/officeDocument/2006/relationships" xmlns:p="http://schemas.openxmlformats.org/presentationml/2006/main">
+  <p:cSld>
+    <p:spTree>
+      <p:nvGrpSpPr>
+        <p:cNvPr id="1" name=""/>
+        <p:cNvGrpSpPr/>
+        <p:nvPr/>
+      </p:nvGrpSpPr>
+      <p:grpSpPr>
+        <a:xfrm>
+          <a:off x="0" y="0"/>
+          <a:ext cx="0" cy="0"/>
+          <a:chOff x="0" y="0"/>
+          <a:chExt cx="0" cy="0"/>
+        </a:xfrm>
+      </p:grpSpPr>
+      <p:sp>
+        <p:nvSpPr>
+          <p:cNvPr id="2" name="Title 1">
+            <a:extLst>
+              <a:ext uri="{FF2B5EF4-FFF2-40B4-BE49-F238E27FC236}">
+                <a16:creationId xmlns:a16="http://schemas.microsoft.com/office/drawing/2014/main" id="{BBDB3F66-E4C8-68BB-1565-F97D2FD7F84B}"/>
+              </a:ext>
+            </a:extLst>
+          </p:cNvPr>
+          <p:cNvSpPr>
+            <a:spLocks noGrp="1"/>
+          </p:cNvSpPr>
+          <p:nvPr>
+            <p:ph type="title"/>
+          </p:nvPr>
+        </p:nvSpPr>
+        <p:spPr/>
+        <p:txBody>
+          <a:bodyPr/>
+          <a:lstStyle/>
+          <a:p>
+            <a:r>
+              <a:rPr lang="en-US" dirty="0"/>
+              <a:t>Sample14_device3</a:t>
+            </a:r>
+            <a:endParaRPr lang="ru-RU" dirty="0"/>
+          </a:p>
+        </p:txBody>
+      </p:sp>
+      <p:graphicFrame>
+        <p:nvGraphicFramePr>
+          <p:cNvPr id="3" name="Object 2">
+            <a:extLst>
+              <a:ext uri="{FF2B5EF4-FFF2-40B4-BE49-F238E27FC236}">
+                <a16:creationId xmlns:a16="http://schemas.microsoft.com/office/drawing/2014/main" id="{781A4AF6-0B70-63B7-E413-F001F920D243}"/>
+              </a:ext>
+            </a:extLst>
+          </p:cNvPr>
+          <p:cNvGraphicFramePr>
+            <a:graphicFrameLocks noChangeAspect="1"/>
+          </p:cNvGraphicFramePr>
+          <p:nvPr>
+            <p:extLst>
+              <p:ext uri="{D42A27DB-BD31-4B8C-83A1-F6EECF244321}">
+                <p14:modId xmlns:p14="http://schemas.microsoft.com/office/powerpoint/2010/main" val="107432726"/>
+              </p:ext>
+            </p:extLst>
+          </p:nvPr>
+        </p:nvGraphicFramePr>
+        <p:xfrm>
+          <a:off x="133708" y="1690688"/>
+          <a:ext cx="6116190" cy="4680000"/>
+        </p:xfrm>
+        <a:graphic>
+          <a:graphicData uri="http://schemas.openxmlformats.org/presentationml/2006/ole">
+            <mc:AlternateContent xmlns:mc="http://schemas.openxmlformats.org/markup-compatibility/2006">
+              <mc:Choice xmlns:v="urn:schemas-microsoft-com:vml" Requires="v">
+                <p:oleObj name="Graph" r:id="rId2" imgW="3920760" imgH="3000960" progId="Origin95.Graph">
+                  <p:embed/>
+                </p:oleObj>
+              </mc:Choice>
+              <mc:Fallback>
+                <p:oleObj name="Graph" r:id="rId2" imgW="3920760" imgH="3000960" progId="Origin95.Graph">
+                  <p:embed/>
+                  <p:pic>
+                    <p:nvPicPr>
+                      <p:cNvPr id="0" name=""/>
+                      <p:cNvPicPr/>
+                      <p:nvPr/>
+                    </p:nvPicPr>
+                    <p:blipFill>
+                      <a:blip r:embed="rId3"/>
+                      <a:stretch>
+                        <a:fillRect/>
+                      </a:stretch>
+                    </p:blipFill>
+                    <p:spPr>
+                      <a:xfrm>
+                        <a:off x="133708" y="1690688"/>
+                        <a:ext cx="6116190" cy="4680000"/>
+                      </a:xfrm>
+                      <a:prstGeom prst="rect">
+                        <a:avLst/>
+                      </a:prstGeom>
+                    </p:spPr>
+                  </p:pic>
+                </p:oleObj>
+              </mc:Fallback>
+            </mc:AlternateContent>
+          </a:graphicData>
+        </a:graphic>
+      </p:graphicFrame>
+      <p:graphicFrame>
+        <p:nvGraphicFramePr>
+          <p:cNvPr id="4" name="Object 3">
+            <a:extLst>
+              <a:ext uri="{FF2B5EF4-FFF2-40B4-BE49-F238E27FC236}">
+                <a16:creationId xmlns:a16="http://schemas.microsoft.com/office/drawing/2014/main" id="{A7DE46D0-CF28-8B49-68CE-D98A1547B684}"/>
+              </a:ext>
+            </a:extLst>
+          </p:cNvPr>
+          <p:cNvGraphicFramePr>
+            <a:graphicFrameLocks noChangeAspect="1"/>
+          </p:cNvGraphicFramePr>
+          <p:nvPr>
+            <p:extLst>
+              <p:ext uri="{D42A27DB-BD31-4B8C-83A1-F6EECF244321}">
+                <p14:modId xmlns:p14="http://schemas.microsoft.com/office/powerpoint/2010/main" val="1100298292"/>
+              </p:ext>
+            </p:extLst>
+          </p:nvPr>
+        </p:nvGraphicFramePr>
+        <p:xfrm>
+          <a:off x="6249898" y="1690688"/>
+          <a:ext cx="6116190" cy="4680000"/>
+        </p:xfrm>
+        <a:graphic>
+          <a:graphicData uri="http://schemas.openxmlformats.org/presentationml/2006/ole">
+            <mc:AlternateContent xmlns:mc="http://schemas.openxmlformats.org/markup-compatibility/2006">
+              <mc:Choice xmlns:v="urn:schemas-microsoft-com:vml" Requires="v">
+                <p:oleObj name="Graph" r:id="rId4" imgW="3920760" imgH="3000960" progId="Origin95.Graph">
+                  <p:embed/>
+                </p:oleObj>
+              </mc:Choice>
+              <mc:Fallback>
+                <p:oleObj name="Graph" r:id="rId4" imgW="3920760" imgH="3000960" progId="Origin95.Graph">
+                  <p:embed/>
+                  <p:pic>
+                    <p:nvPicPr>
+                      <p:cNvPr id="0" name=""/>
+                      <p:cNvPicPr/>
+                      <p:nvPr/>
+                    </p:nvPicPr>
+                    <p:blipFill>
+                      <a:blip r:embed="rId5"/>
+                      <a:stretch>
+                        <a:fillRect/>
+                      </a:stretch>
+                    </p:blipFill>
+                    <p:spPr>
+                      <a:xfrm>
+                        <a:off x="6249898" y="1690688"/>
+                        <a:ext cx="6116190" cy="4680000"/>
+                      </a:xfrm>
+                      <a:prstGeom prst="rect">
+                        <a:avLst/>
+                      </a:prstGeom>
+                    </p:spPr>
+                  </p:pic>
+                </p:oleObj>
+              </mc:Fallback>
+            </mc:AlternateContent>
+          </a:graphicData>
+        </a:graphic>
+      </p:graphicFrame>
+    </p:spTree>
+    <p:extLst>
+      <p:ext uri="{BB962C8B-B14F-4D97-AF65-F5344CB8AC3E}">
+        <p14:creationId xmlns:p14="http://schemas.microsoft.com/office/powerpoint/2010/main" val="2880023807"/>
+      </p:ext>
+    </p:extLst>
+  </p:cSld>
+  <p:clrMapOvr>
+    <a:masterClrMapping/>
+  </p:clrMapOvr>
+</p:sld>
+</file>
+
+<file path=ppt/slides/slide49.xml><?xml version="1.0" encoding="utf-8"?>
+<p:sld xmlns:a="http://schemas.openxmlformats.org/drawingml/2006/main" xmlns:r="http://schemas.openxmlformats.org/officeDocument/2006/relationships" xmlns:p="http://schemas.openxmlformats.org/presentationml/2006/main">
+  <p:cSld>
+    <p:spTree>
+      <p:nvGrpSpPr>
+        <p:cNvPr id="1" name=""/>
+        <p:cNvGrpSpPr/>
+        <p:nvPr/>
+      </p:nvGrpSpPr>
+      <p:grpSpPr>
+        <a:xfrm>
+          <a:off x="0" y="0"/>
+          <a:ext cx="0" cy="0"/>
+          <a:chOff x="0" y="0"/>
+          <a:chExt cx="0" cy="0"/>
+        </a:xfrm>
+      </p:grpSpPr>
+      <p:sp>
+        <p:nvSpPr>
+          <p:cNvPr id="3" name="Title 2">
+            <a:extLst>
+              <a:ext uri="{FF2B5EF4-FFF2-40B4-BE49-F238E27FC236}">
+                <a16:creationId xmlns:a16="http://schemas.microsoft.com/office/drawing/2014/main" id="{F50FADF1-16B9-3B4E-49B0-550342E793DB}"/>
+              </a:ext>
+            </a:extLst>
+          </p:cNvPr>
+          <p:cNvSpPr>
+            <a:spLocks noGrp="1"/>
+          </p:cNvSpPr>
+          <p:nvPr>
+            <p:ph type="ctrTitle"/>
+          </p:nvPr>
+        </p:nvSpPr>
+        <p:spPr/>
+        <p:txBody>
+          <a:bodyPr/>
+          <a:lstStyle/>
+          <a:p>
+            <a:r>
+              <a:rPr lang="en-US" dirty="0"/>
+              <a:t>Sample14_device4 (15/11)</a:t>
+            </a:r>
+            <a:endParaRPr lang="ru-RU" dirty="0"/>
+          </a:p>
+        </p:txBody>
+      </p:sp>
+      <p:sp>
+        <p:nvSpPr>
+          <p:cNvPr id="4" name="Subtitle 3">
+            <a:extLst>
+              <a:ext uri="{FF2B5EF4-FFF2-40B4-BE49-F238E27FC236}">
+                <a16:creationId xmlns:a16="http://schemas.microsoft.com/office/drawing/2014/main" id="{295FB6F0-E7C8-4F41-CEB8-5D03C07F6956}"/>
+              </a:ext>
+            </a:extLst>
+          </p:cNvPr>
+          <p:cNvSpPr>
+            <a:spLocks noGrp="1"/>
+          </p:cNvSpPr>
+          <p:nvPr>
+            <p:ph type="subTitle" idx="1"/>
+          </p:nvPr>
+        </p:nvSpPr>
+        <p:spPr/>
+        <p:txBody>
+          <a:bodyPr/>
+          <a:lstStyle/>
+          <a:p>
+            <a:endParaRPr lang="ru-RU"/>
+          </a:p>
+        </p:txBody>
+      </p:sp>
+    </p:spTree>
+    <p:extLst>
+      <p:ext uri="{BB962C8B-B14F-4D97-AF65-F5344CB8AC3E}">
+        <p14:creationId xmlns:p14="http://schemas.microsoft.com/office/powerpoint/2010/main" val="3496954596"/>
       </p:ext>
     </p:extLst>
   </p:cSld>
@@ -7234,6 +9339,952 @@
     <p:extLst>
       <p:ext uri="{BB962C8B-B14F-4D97-AF65-F5344CB8AC3E}">
         <p14:creationId xmlns:p14="http://schemas.microsoft.com/office/powerpoint/2010/main" val="3247603385"/>
+      </p:ext>
+    </p:extLst>
+  </p:cSld>
+  <p:clrMapOvr>
+    <a:masterClrMapping/>
+  </p:clrMapOvr>
+</p:sld>
+</file>
+
+<file path=ppt/slides/slide50.xml><?xml version="1.0" encoding="utf-8"?>
+<p:sld xmlns:a="http://schemas.openxmlformats.org/drawingml/2006/main" xmlns:r="http://schemas.openxmlformats.org/officeDocument/2006/relationships" xmlns:p="http://schemas.openxmlformats.org/presentationml/2006/main">
+  <p:cSld>
+    <p:spTree>
+      <p:nvGrpSpPr>
+        <p:cNvPr id="1" name=""/>
+        <p:cNvGrpSpPr/>
+        <p:nvPr/>
+      </p:nvGrpSpPr>
+      <p:grpSpPr>
+        <a:xfrm>
+          <a:off x="0" y="0"/>
+          <a:ext cx="0" cy="0"/>
+          <a:chOff x="0" y="0"/>
+          <a:chExt cx="0" cy="0"/>
+        </a:xfrm>
+      </p:grpSpPr>
+      <p:sp>
+        <p:nvSpPr>
+          <p:cNvPr id="4" name="Title 3">
+            <a:extLst>
+              <a:ext uri="{FF2B5EF4-FFF2-40B4-BE49-F238E27FC236}">
+                <a16:creationId xmlns:a16="http://schemas.microsoft.com/office/drawing/2014/main" id="{073CA65F-8654-8D4C-963C-AC3E60422F4C}"/>
+              </a:ext>
+            </a:extLst>
+          </p:cNvPr>
+          <p:cNvSpPr>
+            <a:spLocks noGrp="1"/>
+          </p:cNvSpPr>
+          <p:nvPr>
+            <p:ph type="title"/>
+          </p:nvPr>
+        </p:nvSpPr>
+        <p:spPr/>
+        <p:txBody>
+          <a:bodyPr/>
+          <a:lstStyle/>
+          <a:p>
+            <a:r>
+              <a:rPr lang="en-US" dirty="0"/>
+              <a:t>Sample14_device4 (15/11)</a:t>
+            </a:r>
+            <a:endParaRPr lang="ru-RU" dirty="0"/>
+          </a:p>
+        </p:txBody>
+      </p:sp>
+      <p:graphicFrame>
+        <p:nvGraphicFramePr>
+          <p:cNvPr id="5" name="Object 4">
+            <a:extLst>
+              <a:ext uri="{FF2B5EF4-FFF2-40B4-BE49-F238E27FC236}">
+                <a16:creationId xmlns:a16="http://schemas.microsoft.com/office/drawing/2014/main" id="{4FC7AC4F-76E5-60CE-C5FF-CA723FE5CDED}"/>
+              </a:ext>
+            </a:extLst>
+          </p:cNvPr>
+          <p:cNvGraphicFramePr>
+            <a:graphicFrameLocks noChangeAspect="1"/>
+          </p:cNvGraphicFramePr>
+          <p:nvPr>
+            <p:extLst>
+              <p:ext uri="{D42A27DB-BD31-4B8C-83A1-F6EECF244321}">
+                <p14:modId xmlns:p14="http://schemas.microsoft.com/office/powerpoint/2010/main" val="1146304704"/>
+              </p:ext>
+            </p:extLst>
+          </p:nvPr>
+        </p:nvGraphicFramePr>
+        <p:xfrm>
+          <a:off x="-161259" y="1690688"/>
+          <a:ext cx="6116190" cy="4680000"/>
+        </p:xfrm>
+        <a:graphic>
+          <a:graphicData uri="http://schemas.openxmlformats.org/presentationml/2006/ole">
+            <mc:AlternateContent xmlns:mc="http://schemas.openxmlformats.org/markup-compatibility/2006">
+              <mc:Choice xmlns:v="urn:schemas-microsoft-com:vml" Requires="v">
+                <p:oleObj name="Graph" r:id="rId2" imgW="3920760" imgH="3000960" progId="Origin95.Graph">
+                  <p:embed/>
+                </p:oleObj>
+              </mc:Choice>
+              <mc:Fallback>
+                <p:oleObj name="Graph" r:id="rId2" imgW="3920760" imgH="3000960" progId="Origin95.Graph">
+                  <p:embed/>
+                  <p:pic>
+                    <p:nvPicPr>
+                      <p:cNvPr id="0" name=""/>
+                      <p:cNvPicPr/>
+                      <p:nvPr/>
+                    </p:nvPicPr>
+                    <p:blipFill>
+                      <a:blip r:embed="rId3"/>
+                      <a:stretch>
+                        <a:fillRect/>
+                      </a:stretch>
+                    </p:blipFill>
+                    <p:spPr>
+                      <a:xfrm>
+                        <a:off x="-161259" y="1690688"/>
+                        <a:ext cx="6116190" cy="4680000"/>
+                      </a:xfrm>
+                      <a:prstGeom prst="rect">
+                        <a:avLst/>
+                      </a:prstGeom>
+                    </p:spPr>
+                  </p:pic>
+                </p:oleObj>
+              </mc:Fallback>
+            </mc:AlternateContent>
+          </a:graphicData>
+        </a:graphic>
+      </p:graphicFrame>
+      <p:graphicFrame>
+        <p:nvGraphicFramePr>
+          <p:cNvPr id="6" name="Object 5">
+            <a:extLst>
+              <a:ext uri="{FF2B5EF4-FFF2-40B4-BE49-F238E27FC236}">
+                <a16:creationId xmlns:a16="http://schemas.microsoft.com/office/drawing/2014/main" id="{C2259710-20BE-EBD2-CD0C-497BBA532C21}"/>
+              </a:ext>
+            </a:extLst>
+          </p:cNvPr>
+          <p:cNvGraphicFramePr>
+            <a:graphicFrameLocks noChangeAspect="1"/>
+          </p:cNvGraphicFramePr>
+          <p:nvPr>
+            <p:extLst>
+              <p:ext uri="{D42A27DB-BD31-4B8C-83A1-F6EECF244321}">
+                <p14:modId xmlns:p14="http://schemas.microsoft.com/office/powerpoint/2010/main" val="2652982864"/>
+              </p:ext>
+            </p:extLst>
+          </p:nvPr>
+        </p:nvGraphicFramePr>
+        <p:xfrm>
+          <a:off x="6096000" y="1690688"/>
+          <a:ext cx="6116190" cy="4680000"/>
+        </p:xfrm>
+        <a:graphic>
+          <a:graphicData uri="http://schemas.openxmlformats.org/presentationml/2006/ole">
+            <mc:AlternateContent xmlns:mc="http://schemas.openxmlformats.org/markup-compatibility/2006">
+              <mc:Choice xmlns:v="urn:schemas-microsoft-com:vml" Requires="v">
+                <p:oleObj name="Graph" r:id="rId4" imgW="3920760" imgH="3000960" progId="Origin95.Graph">
+                  <p:embed/>
+                </p:oleObj>
+              </mc:Choice>
+              <mc:Fallback>
+                <p:oleObj name="Graph" r:id="rId4" imgW="3920760" imgH="3000960" progId="Origin95.Graph">
+                  <p:embed/>
+                  <p:pic>
+                    <p:nvPicPr>
+                      <p:cNvPr id="0" name=""/>
+                      <p:cNvPicPr/>
+                      <p:nvPr/>
+                    </p:nvPicPr>
+                    <p:blipFill>
+                      <a:blip r:embed="rId5"/>
+                      <a:stretch>
+                        <a:fillRect/>
+                      </a:stretch>
+                    </p:blipFill>
+                    <p:spPr>
+                      <a:xfrm>
+                        <a:off x="6096000" y="1690688"/>
+                        <a:ext cx="6116190" cy="4680000"/>
+                      </a:xfrm>
+                      <a:prstGeom prst="rect">
+                        <a:avLst/>
+                      </a:prstGeom>
+                    </p:spPr>
+                  </p:pic>
+                </p:oleObj>
+              </mc:Fallback>
+            </mc:AlternateContent>
+          </a:graphicData>
+        </a:graphic>
+      </p:graphicFrame>
+    </p:spTree>
+    <p:extLst>
+      <p:ext uri="{BB962C8B-B14F-4D97-AF65-F5344CB8AC3E}">
+        <p14:creationId xmlns:p14="http://schemas.microsoft.com/office/powerpoint/2010/main" val="1569818478"/>
+      </p:ext>
+    </p:extLst>
+  </p:cSld>
+  <p:clrMapOvr>
+    <a:masterClrMapping/>
+  </p:clrMapOvr>
+</p:sld>
+</file>
+
+<file path=ppt/slides/slide51.xml><?xml version="1.0" encoding="utf-8"?>
+<p:sld xmlns:a="http://schemas.openxmlformats.org/drawingml/2006/main" xmlns:r="http://schemas.openxmlformats.org/officeDocument/2006/relationships" xmlns:p="http://schemas.openxmlformats.org/presentationml/2006/main">
+  <p:cSld>
+    <p:spTree>
+      <p:nvGrpSpPr>
+        <p:cNvPr id="1" name=""/>
+        <p:cNvGrpSpPr/>
+        <p:nvPr/>
+      </p:nvGrpSpPr>
+      <p:grpSpPr>
+        <a:xfrm>
+          <a:off x="0" y="0"/>
+          <a:ext cx="0" cy="0"/>
+          <a:chOff x="0" y="0"/>
+          <a:chExt cx="0" cy="0"/>
+        </a:xfrm>
+      </p:grpSpPr>
+      <p:sp>
+        <p:nvSpPr>
+          <p:cNvPr id="2" name="Title 1">
+            <a:extLst>
+              <a:ext uri="{FF2B5EF4-FFF2-40B4-BE49-F238E27FC236}">
+                <a16:creationId xmlns:a16="http://schemas.microsoft.com/office/drawing/2014/main" id="{3B89D2A1-3E87-4D80-985A-DBCC0C43C7C8}"/>
+              </a:ext>
+            </a:extLst>
+          </p:cNvPr>
+          <p:cNvSpPr>
+            <a:spLocks noGrp="1"/>
+          </p:cNvSpPr>
+          <p:nvPr>
+            <p:ph type="title"/>
+          </p:nvPr>
+        </p:nvSpPr>
+        <p:spPr/>
+        <p:txBody>
+          <a:bodyPr/>
+          <a:lstStyle/>
+          <a:p>
+            <a:r>
+              <a:rPr lang="en-US" dirty="0"/>
+              <a:t>Sample14_device4 (15/11)</a:t>
+            </a:r>
+            <a:endParaRPr lang="ru-RU" dirty="0"/>
+          </a:p>
+        </p:txBody>
+      </p:sp>
+      <p:graphicFrame>
+        <p:nvGraphicFramePr>
+          <p:cNvPr id="3" name="Object 2">
+            <a:extLst>
+              <a:ext uri="{FF2B5EF4-FFF2-40B4-BE49-F238E27FC236}">
+                <a16:creationId xmlns:a16="http://schemas.microsoft.com/office/drawing/2014/main" id="{E8223E85-21CB-0777-6774-DF61E76793FF}"/>
+              </a:ext>
+            </a:extLst>
+          </p:cNvPr>
+          <p:cNvGraphicFramePr>
+            <a:graphicFrameLocks noChangeAspect="1"/>
+          </p:cNvGraphicFramePr>
+          <p:nvPr>
+            <p:extLst>
+              <p:ext uri="{D42A27DB-BD31-4B8C-83A1-F6EECF244321}">
+                <p14:modId xmlns:p14="http://schemas.microsoft.com/office/powerpoint/2010/main" val="1375191828"/>
+              </p:ext>
+            </p:extLst>
+          </p:nvPr>
+        </p:nvGraphicFramePr>
+        <p:xfrm>
+          <a:off x="-20190" y="1690688"/>
+          <a:ext cx="6116190" cy="4680000"/>
+        </p:xfrm>
+        <a:graphic>
+          <a:graphicData uri="http://schemas.openxmlformats.org/presentationml/2006/ole">
+            <mc:AlternateContent xmlns:mc="http://schemas.openxmlformats.org/markup-compatibility/2006">
+              <mc:Choice xmlns:v="urn:schemas-microsoft-com:vml" Requires="v">
+                <p:oleObj name="Graph" r:id="rId2" imgW="3920760" imgH="3000960" progId="Origin95.Graph">
+                  <p:embed/>
+                </p:oleObj>
+              </mc:Choice>
+              <mc:Fallback>
+                <p:oleObj name="Graph" r:id="rId2" imgW="3920760" imgH="3000960" progId="Origin95.Graph">
+                  <p:embed/>
+                  <p:pic>
+                    <p:nvPicPr>
+                      <p:cNvPr id="0" name=""/>
+                      <p:cNvPicPr/>
+                      <p:nvPr/>
+                    </p:nvPicPr>
+                    <p:blipFill>
+                      <a:blip r:embed="rId3"/>
+                      <a:stretch>
+                        <a:fillRect/>
+                      </a:stretch>
+                    </p:blipFill>
+                    <p:spPr>
+                      <a:xfrm>
+                        <a:off x="-20190" y="1690688"/>
+                        <a:ext cx="6116190" cy="4680000"/>
+                      </a:xfrm>
+                      <a:prstGeom prst="rect">
+                        <a:avLst/>
+                      </a:prstGeom>
+                    </p:spPr>
+                  </p:pic>
+                </p:oleObj>
+              </mc:Fallback>
+            </mc:AlternateContent>
+          </a:graphicData>
+        </a:graphic>
+      </p:graphicFrame>
+      <p:graphicFrame>
+        <p:nvGraphicFramePr>
+          <p:cNvPr id="4" name="Object 3">
+            <a:extLst>
+              <a:ext uri="{FF2B5EF4-FFF2-40B4-BE49-F238E27FC236}">
+                <a16:creationId xmlns:a16="http://schemas.microsoft.com/office/drawing/2014/main" id="{B864DCE0-F81E-AA6E-6708-3AF24ADD1EE2}"/>
+              </a:ext>
+            </a:extLst>
+          </p:cNvPr>
+          <p:cNvGraphicFramePr>
+            <a:graphicFrameLocks noChangeAspect="1"/>
+          </p:cNvGraphicFramePr>
+          <p:nvPr>
+            <p:extLst>
+              <p:ext uri="{D42A27DB-BD31-4B8C-83A1-F6EECF244321}">
+                <p14:modId xmlns:p14="http://schemas.microsoft.com/office/powerpoint/2010/main" val="1632338673"/>
+              </p:ext>
+            </p:extLst>
+          </p:nvPr>
+        </p:nvGraphicFramePr>
+        <p:xfrm>
+          <a:off x="6034023" y="1690688"/>
+          <a:ext cx="6116190" cy="4680000"/>
+        </p:xfrm>
+        <a:graphic>
+          <a:graphicData uri="http://schemas.openxmlformats.org/presentationml/2006/ole">
+            <mc:AlternateContent xmlns:mc="http://schemas.openxmlformats.org/markup-compatibility/2006">
+              <mc:Choice xmlns:v="urn:schemas-microsoft-com:vml" Requires="v">
+                <p:oleObj name="Graph" r:id="rId4" imgW="3920760" imgH="3000960" progId="Origin95.Graph">
+                  <p:embed/>
+                </p:oleObj>
+              </mc:Choice>
+              <mc:Fallback>
+                <p:oleObj name="Graph" r:id="rId4" imgW="3920760" imgH="3000960" progId="Origin95.Graph">
+                  <p:embed/>
+                  <p:pic>
+                    <p:nvPicPr>
+                      <p:cNvPr id="0" name=""/>
+                      <p:cNvPicPr/>
+                      <p:nvPr/>
+                    </p:nvPicPr>
+                    <p:blipFill>
+                      <a:blip r:embed="rId5"/>
+                      <a:stretch>
+                        <a:fillRect/>
+                      </a:stretch>
+                    </p:blipFill>
+                    <p:spPr>
+                      <a:xfrm>
+                        <a:off x="6034023" y="1690688"/>
+                        <a:ext cx="6116190" cy="4680000"/>
+                      </a:xfrm>
+                      <a:prstGeom prst="rect">
+                        <a:avLst/>
+                      </a:prstGeom>
+                    </p:spPr>
+                  </p:pic>
+                </p:oleObj>
+              </mc:Fallback>
+            </mc:AlternateContent>
+          </a:graphicData>
+        </a:graphic>
+      </p:graphicFrame>
+    </p:spTree>
+    <p:extLst>
+      <p:ext uri="{BB962C8B-B14F-4D97-AF65-F5344CB8AC3E}">
+        <p14:creationId xmlns:p14="http://schemas.microsoft.com/office/powerpoint/2010/main" val="90399828"/>
+      </p:ext>
+    </p:extLst>
+  </p:cSld>
+  <p:clrMapOvr>
+    <a:masterClrMapping/>
+  </p:clrMapOvr>
+</p:sld>
+</file>
+
+<file path=ppt/slides/slide52.xml><?xml version="1.0" encoding="utf-8"?>
+<p:sld xmlns:a="http://schemas.openxmlformats.org/drawingml/2006/main" xmlns:r="http://schemas.openxmlformats.org/officeDocument/2006/relationships" xmlns:p="http://schemas.openxmlformats.org/presentationml/2006/main">
+  <p:cSld>
+    <p:spTree>
+      <p:nvGrpSpPr>
+        <p:cNvPr id="1" name=""/>
+        <p:cNvGrpSpPr/>
+        <p:nvPr/>
+      </p:nvGrpSpPr>
+      <p:grpSpPr>
+        <a:xfrm>
+          <a:off x="0" y="0"/>
+          <a:ext cx="0" cy="0"/>
+          <a:chOff x="0" y="0"/>
+          <a:chExt cx="0" cy="0"/>
+        </a:xfrm>
+      </p:grpSpPr>
+      <p:sp>
+        <p:nvSpPr>
+          <p:cNvPr id="2" name="Title 1">
+            <a:extLst>
+              <a:ext uri="{FF2B5EF4-FFF2-40B4-BE49-F238E27FC236}">
+                <a16:creationId xmlns:a16="http://schemas.microsoft.com/office/drawing/2014/main" id="{F577583D-BF9A-B95B-3AA1-E95746A72C51}"/>
+              </a:ext>
+            </a:extLst>
+          </p:cNvPr>
+          <p:cNvSpPr>
+            <a:spLocks noGrp="1"/>
+          </p:cNvSpPr>
+          <p:nvPr>
+            <p:ph type="title"/>
+          </p:nvPr>
+        </p:nvSpPr>
+        <p:spPr/>
+        <p:txBody>
+          <a:bodyPr/>
+          <a:lstStyle/>
+          <a:p>
+            <a:r>
+              <a:rPr lang="en-US" dirty="0"/>
+              <a:t>Sample14_device4 (15/11)</a:t>
+            </a:r>
+            <a:endParaRPr lang="ru-RU" dirty="0"/>
+          </a:p>
+        </p:txBody>
+      </p:sp>
+      <p:graphicFrame>
+        <p:nvGraphicFramePr>
+          <p:cNvPr id="3" name="Object 2">
+            <a:extLst>
+              <a:ext uri="{FF2B5EF4-FFF2-40B4-BE49-F238E27FC236}">
+                <a16:creationId xmlns:a16="http://schemas.microsoft.com/office/drawing/2014/main" id="{9B742585-6476-E71F-B923-FD45DB89CDBB}"/>
+              </a:ext>
+            </a:extLst>
+          </p:cNvPr>
+          <p:cNvGraphicFramePr>
+            <a:graphicFrameLocks noChangeAspect="1"/>
+          </p:cNvGraphicFramePr>
+          <p:nvPr>
+            <p:extLst>
+              <p:ext uri="{D42A27DB-BD31-4B8C-83A1-F6EECF244321}">
+                <p14:modId xmlns:p14="http://schemas.microsoft.com/office/powerpoint/2010/main" val="1339973336"/>
+              </p:ext>
+            </p:extLst>
+          </p:nvPr>
+        </p:nvGraphicFramePr>
+        <p:xfrm>
+          <a:off x="0" y="1690688"/>
+          <a:ext cx="6116190" cy="4680000"/>
+        </p:xfrm>
+        <a:graphic>
+          <a:graphicData uri="http://schemas.openxmlformats.org/presentationml/2006/ole">
+            <mc:AlternateContent xmlns:mc="http://schemas.openxmlformats.org/markup-compatibility/2006">
+              <mc:Choice xmlns:v="urn:schemas-microsoft-com:vml" Requires="v">
+                <p:oleObj name="Graph" r:id="rId2" imgW="3920760" imgH="3000960" progId="Origin95.Graph">
+                  <p:embed/>
+                </p:oleObj>
+              </mc:Choice>
+              <mc:Fallback>
+                <p:oleObj name="Graph" r:id="rId2" imgW="3920760" imgH="3000960" progId="Origin95.Graph">
+                  <p:embed/>
+                  <p:pic>
+                    <p:nvPicPr>
+                      <p:cNvPr id="0" name=""/>
+                      <p:cNvPicPr/>
+                      <p:nvPr/>
+                    </p:nvPicPr>
+                    <p:blipFill>
+                      <a:blip r:embed="rId3"/>
+                      <a:stretch>
+                        <a:fillRect/>
+                      </a:stretch>
+                    </p:blipFill>
+                    <p:spPr>
+                      <a:xfrm>
+                        <a:off x="0" y="1690688"/>
+                        <a:ext cx="6116190" cy="4680000"/>
+                      </a:xfrm>
+                      <a:prstGeom prst="rect">
+                        <a:avLst/>
+                      </a:prstGeom>
+                    </p:spPr>
+                  </p:pic>
+                </p:oleObj>
+              </mc:Fallback>
+            </mc:AlternateContent>
+          </a:graphicData>
+        </a:graphic>
+      </p:graphicFrame>
+      <p:graphicFrame>
+        <p:nvGraphicFramePr>
+          <p:cNvPr id="4" name="Object 3">
+            <a:extLst>
+              <a:ext uri="{FF2B5EF4-FFF2-40B4-BE49-F238E27FC236}">
+                <a16:creationId xmlns:a16="http://schemas.microsoft.com/office/drawing/2014/main" id="{C897E970-520D-D7C3-AC94-53B601AE1F1D}"/>
+              </a:ext>
+            </a:extLst>
+          </p:cNvPr>
+          <p:cNvGraphicFramePr>
+            <a:graphicFrameLocks noChangeAspect="1"/>
+          </p:cNvGraphicFramePr>
+          <p:nvPr>
+            <p:extLst>
+              <p:ext uri="{D42A27DB-BD31-4B8C-83A1-F6EECF244321}">
+                <p14:modId xmlns:p14="http://schemas.microsoft.com/office/powerpoint/2010/main" val="276710076"/>
+              </p:ext>
+            </p:extLst>
+          </p:nvPr>
+        </p:nvGraphicFramePr>
+        <p:xfrm>
+          <a:off x="6116190" y="1690688"/>
+          <a:ext cx="6116190" cy="4680000"/>
+        </p:xfrm>
+        <a:graphic>
+          <a:graphicData uri="http://schemas.openxmlformats.org/presentationml/2006/ole">
+            <mc:AlternateContent xmlns:mc="http://schemas.openxmlformats.org/markup-compatibility/2006">
+              <mc:Choice xmlns:v="urn:schemas-microsoft-com:vml" Requires="v">
+                <p:oleObj name="Graph" r:id="rId4" imgW="3920760" imgH="3000960" progId="Origin95.Graph">
+                  <p:embed/>
+                </p:oleObj>
+              </mc:Choice>
+              <mc:Fallback>
+                <p:oleObj name="Graph" r:id="rId4" imgW="3920760" imgH="3000960" progId="Origin95.Graph">
+                  <p:embed/>
+                  <p:pic>
+                    <p:nvPicPr>
+                      <p:cNvPr id="0" name=""/>
+                      <p:cNvPicPr/>
+                      <p:nvPr/>
+                    </p:nvPicPr>
+                    <p:blipFill>
+                      <a:blip r:embed="rId5"/>
+                      <a:stretch>
+                        <a:fillRect/>
+                      </a:stretch>
+                    </p:blipFill>
+                    <p:spPr>
+                      <a:xfrm>
+                        <a:off x="6116190" y="1690688"/>
+                        <a:ext cx="6116190" cy="4680000"/>
+                      </a:xfrm>
+                      <a:prstGeom prst="rect">
+                        <a:avLst/>
+                      </a:prstGeom>
+                    </p:spPr>
+                  </p:pic>
+                </p:oleObj>
+              </mc:Fallback>
+            </mc:AlternateContent>
+          </a:graphicData>
+        </a:graphic>
+      </p:graphicFrame>
+    </p:spTree>
+    <p:extLst>
+      <p:ext uri="{BB962C8B-B14F-4D97-AF65-F5344CB8AC3E}">
+        <p14:creationId xmlns:p14="http://schemas.microsoft.com/office/powerpoint/2010/main" val="3270381262"/>
+      </p:ext>
+    </p:extLst>
+  </p:cSld>
+  <p:clrMapOvr>
+    <a:masterClrMapping/>
+  </p:clrMapOvr>
+</p:sld>
+</file>
+
+<file path=ppt/slides/slide53.xml><?xml version="1.0" encoding="utf-8"?>
+<p:sld xmlns:a="http://schemas.openxmlformats.org/drawingml/2006/main" xmlns:r="http://schemas.openxmlformats.org/officeDocument/2006/relationships" xmlns:p="http://schemas.openxmlformats.org/presentationml/2006/main">
+  <p:cSld>
+    <p:spTree>
+      <p:nvGrpSpPr>
+        <p:cNvPr id="1" name=""/>
+        <p:cNvGrpSpPr/>
+        <p:nvPr/>
+      </p:nvGrpSpPr>
+      <p:grpSpPr>
+        <a:xfrm>
+          <a:off x="0" y="0"/>
+          <a:ext cx="0" cy="0"/>
+          <a:chOff x="0" y="0"/>
+          <a:chExt cx="0" cy="0"/>
+        </a:xfrm>
+      </p:grpSpPr>
+      <p:sp>
+        <p:nvSpPr>
+          <p:cNvPr id="3" name="Title 2">
+            <a:extLst>
+              <a:ext uri="{FF2B5EF4-FFF2-40B4-BE49-F238E27FC236}">
+                <a16:creationId xmlns:a16="http://schemas.microsoft.com/office/drawing/2014/main" id="{F08A5DCD-26A3-3149-9C4D-5387913C9B9A}"/>
+              </a:ext>
+            </a:extLst>
+          </p:cNvPr>
+          <p:cNvSpPr>
+            <a:spLocks noGrp="1"/>
+          </p:cNvSpPr>
+          <p:nvPr>
+            <p:ph type="ctrTitle"/>
+          </p:nvPr>
+        </p:nvSpPr>
+        <p:spPr/>
+        <p:txBody>
+          <a:bodyPr/>
+          <a:lstStyle/>
+          <a:p>
+            <a:r>
+              <a:rPr lang="en-US" dirty="0"/>
+              <a:t>Sample14_device4 (22/11)</a:t>
+            </a:r>
+            <a:endParaRPr lang="ru-RU" dirty="0"/>
+          </a:p>
+        </p:txBody>
+      </p:sp>
+      <p:sp>
+        <p:nvSpPr>
+          <p:cNvPr id="4" name="Subtitle 3">
+            <a:extLst>
+              <a:ext uri="{FF2B5EF4-FFF2-40B4-BE49-F238E27FC236}">
+                <a16:creationId xmlns:a16="http://schemas.microsoft.com/office/drawing/2014/main" id="{07C230DE-4BC8-0E92-8294-46E6747F3727}"/>
+              </a:ext>
+            </a:extLst>
+          </p:cNvPr>
+          <p:cNvSpPr>
+            <a:spLocks noGrp="1"/>
+          </p:cNvSpPr>
+          <p:nvPr>
+            <p:ph type="subTitle" idx="1"/>
+          </p:nvPr>
+        </p:nvSpPr>
+        <p:spPr/>
+        <p:txBody>
+          <a:bodyPr/>
+          <a:lstStyle/>
+          <a:p>
+            <a:endParaRPr lang="ru-RU"/>
+          </a:p>
+        </p:txBody>
+      </p:sp>
+    </p:spTree>
+    <p:extLst>
+      <p:ext uri="{BB962C8B-B14F-4D97-AF65-F5344CB8AC3E}">
+        <p14:creationId xmlns:p14="http://schemas.microsoft.com/office/powerpoint/2010/main" val="1990780494"/>
+      </p:ext>
+    </p:extLst>
+  </p:cSld>
+  <p:clrMapOvr>
+    <a:masterClrMapping/>
+  </p:clrMapOvr>
+</p:sld>
+</file>
+
+<file path=ppt/slides/slide54.xml><?xml version="1.0" encoding="utf-8"?>
+<p:sld xmlns:a="http://schemas.openxmlformats.org/drawingml/2006/main" xmlns:r="http://schemas.openxmlformats.org/officeDocument/2006/relationships" xmlns:p="http://schemas.openxmlformats.org/presentationml/2006/main">
+  <p:cSld>
+    <p:spTree>
+      <p:nvGrpSpPr>
+        <p:cNvPr id="1" name=""/>
+        <p:cNvGrpSpPr/>
+        <p:nvPr/>
+      </p:nvGrpSpPr>
+      <p:grpSpPr>
+        <a:xfrm>
+          <a:off x="0" y="0"/>
+          <a:ext cx="0" cy="0"/>
+          <a:chOff x="0" y="0"/>
+          <a:chExt cx="0" cy="0"/>
+        </a:xfrm>
+      </p:grpSpPr>
+      <p:sp>
+        <p:nvSpPr>
+          <p:cNvPr id="4" name="Title 3">
+            <a:extLst>
+              <a:ext uri="{FF2B5EF4-FFF2-40B4-BE49-F238E27FC236}">
+                <a16:creationId xmlns:a16="http://schemas.microsoft.com/office/drawing/2014/main" id="{EF53C6E8-E95F-1591-6FDB-5985E93EEFB5}"/>
+              </a:ext>
+            </a:extLst>
+          </p:cNvPr>
+          <p:cNvSpPr>
+            <a:spLocks noGrp="1"/>
+          </p:cNvSpPr>
+          <p:nvPr>
+            <p:ph type="title"/>
+          </p:nvPr>
+        </p:nvSpPr>
+        <p:spPr/>
+        <p:txBody>
+          <a:bodyPr/>
+          <a:lstStyle/>
+          <a:p>
+            <a:r>
+              <a:rPr lang="en-US" dirty="0"/>
+              <a:t>Sample14_device4 (22/11)</a:t>
+            </a:r>
+            <a:endParaRPr lang="ru-RU" dirty="0"/>
+          </a:p>
+        </p:txBody>
+      </p:sp>
+      <p:graphicFrame>
+        <p:nvGraphicFramePr>
+          <p:cNvPr id="5" name="Object 4">
+            <a:extLst>
+              <a:ext uri="{FF2B5EF4-FFF2-40B4-BE49-F238E27FC236}">
+                <a16:creationId xmlns:a16="http://schemas.microsoft.com/office/drawing/2014/main" id="{308A771B-DFCF-EBAC-C0C1-C2C5B20E905D}"/>
+              </a:ext>
+            </a:extLst>
+          </p:cNvPr>
+          <p:cNvGraphicFramePr>
+            <a:graphicFrameLocks noChangeAspect="1"/>
+          </p:cNvGraphicFramePr>
+          <p:nvPr>
+            <p:extLst>
+              <p:ext uri="{D42A27DB-BD31-4B8C-83A1-F6EECF244321}">
+                <p14:modId xmlns:p14="http://schemas.microsoft.com/office/powerpoint/2010/main" val="260463422"/>
+              </p:ext>
+            </p:extLst>
+          </p:nvPr>
+        </p:nvGraphicFramePr>
+        <p:xfrm>
+          <a:off x="-200589" y="1690688"/>
+          <a:ext cx="6116190" cy="4680000"/>
+        </p:xfrm>
+        <a:graphic>
+          <a:graphicData uri="http://schemas.openxmlformats.org/presentationml/2006/ole">
+            <mc:AlternateContent xmlns:mc="http://schemas.openxmlformats.org/markup-compatibility/2006">
+              <mc:Choice xmlns:v="urn:schemas-microsoft-com:vml" Requires="v">
+                <p:oleObj name="Graph" r:id="rId2" imgW="3920760" imgH="3000960" progId="Origin95.Graph">
+                  <p:embed/>
+                </p:oleObj>
+              </mc:Choice>
+              <mc:Fallback>
+                <p:oleObj name="Graph" r:id="rId2" imgW="3920760" imgH="3000960" progId="Origin95.Graph">
+                  <p:embed/>
+                  <p:pic>
+                    <p:nvPicPr>
+                      <p:cNvPr id="0" name=""/>
+                      <p:cNvPicPr/>
+                      <p:nvPr/>
+                    </p:nvPicPr>
+                    <p:blipFill>
+                      <a:blip r:embed="rId3"/>
+                      <a:stretch>
+                        <a:fillRect/>
+                      </a:stretch>
+                    </p:blipFill>
+                    <p:spPr>
+                      <a:xfrm>
+                        <a:off x="-200589" y="1690688"/>
+                        <a:ext cx="6116190" cy="4680000"/>
+                      </a:xfrm>
+                      <a:prstGeom prst="rect">
+                        <a:avLst/>
+                      </a:prstGeom>
+                    </p:spPr>
+                  </p:pic>
+                </p:oleObj>
+              </mc:Fallback>
+            </mc:AlternateContent>
+          </a:graphicData>
+        </a:graphic>
+      </p:graphicFrame>
+      <p:graphicFrame>
+        <p:nvGraphicFramePr>
+          <p:cNvPr id="6" name="Object 5">
+            <a:extLst>
+              <a:ext uri="{FF2B5EF4-FFF2-40B4-BE49-F238E27FC236}">
+                <a16:creationId xmlns:a16="http://schemas.microsoft.com/office/drawing/2014/main" id="{01FB2456-0B39-5828-E341-2FB9A08A1DD7}"/>
+              </a:ext>
+            </a:extLst>
+          </p:cNvPr>
+          <p:cNvGraphicFramePr>
+            <a:graphicFrameLocks noChangeAspect="1"/>
+          </p:cNvGraphicFramePr>
+          <p:nvPr>
+            <p:extLst>
+              <p:ext uri="{D42A27DB-BD31-4B8C-83A1-F6EECF244321}">
+                <p14:modId xmlns:p14="http://schemas.microsoft.com/office/powerpoint/2010/main" val="1928231141"/>
+              </p:ext>
+            </p:extLst>
+          </p:nvPr>
+        </p:nvGraphicFramePr>
+        <p:xfrm>
+          <a:off x="5915601" y="1690688"/>
+          <a:ext cx="6116190" cy="4680000"/>
+        </p:xfrm>
+        <a:graphic>
+          <a:graphicData uri="http://schemas.openxmlformats.org/presentationml/2006/ole">
+            <mc:AlternateContent xmlns:mc="http://schemas.openxmlformats.org/markup-compatibility/2006">
+              <mc:Choice xmlns:v="urn:schemas-microsoft-com:vml" Requires="v">
+                <p:oleObj name="Graph" r:id="rId4" imgW="3920760" imgH="3000960" progId="Origin95.Graph">
+                  <p:embed/>
+                </p:oleObj>
+              </mc:Choice>
+              <mc:Fallback>
+                <p:oleObj name="Graph" r:id="rId4" imgW="3920760" imgH="3000960" progId="Origin95.Graph">
+                  <p:embed/>
+                  <p:pic>
+                    <p:nvPicPr>
+                      <p:cNvPr id="0" name=""/>
+                      <p:cNvPicPr/>
+                      <p:nvPr/>
+                    </p:nvPicPr>
+                    <p:blipFill>
+                      <a:blip r:embed="rId5"/>
+                      <a:stretch>
+                        <a:fillRect/>
+                      </a:stretch>
+                    </p:blipFill>
+                    <p:spPr>
+                      <a:xfrm>
+                        <a:off x="5915601" y="1690688"/>
+                        <a:ext cx="6116190" cy="4680000"/>
+                      </a:xfrm>
+                      <a:prstGeom prst="rect">
+                        <a:avLst/>
+                      </a:prstGeom>
+                    </p:spPr>
+                  </p:pic>
+                </p:oleObj>
+              </mc:Fallback>
+            </mc:AlternateContent>
+          </a:graphicData>
+        </a:graphic>
+      </p:graphicFrame>
+    </p:spTree>
+    <p:extLst>
+      <p:ext uri="{BB962C8B-B14F-4D97-AF65-F5344CB8AC3E}">
+        <p14:creationId xmlns:p14="http://schemas.microsoft.com/office/powerpoint/2010/main" val="1487362869"/>
+      </p:ext>
+    </p:extLst>
+  </p:cSld>
+  <p:clrMapOvr>
+    <a:masterClrMapping/>
+  </p:clrMapOvr>
+</p:sld>
+</file>
+
+<file path=ppt/slides/slide55.xml><?xml version="1.0" encoding="utf-8"?>
+<p:sld xmlns:a="http://schemas.openxmlformats.org/drawingml/2006/main" xmlns:r="http://schemas.openxmlformats.org/officeDocument/2006/relationships" xmlns:p="http://schemas.openxmlformats.org/presentationml/2006/main">
+  <p:cSld>
+    <p:spTree>
+      <p:nvGrpSpPr>
+        <p:cNvPr id="1" name=""/>
+        <p:cNvGrpSpPr/>
+        <p:nvPr/>
+      </p:nvGrpSpPr>
+      <p:grpSpPr>
+        <a:xfrm>
+          <a:off x="0" y="0"/>
+          <a:ext cx="0" cy="0"/>
+          <a:chOff x="0" y="0"/>
+          <a:chExt cx="0" cy="0"/>
+        </a:xfrm>
+      </p:grpSpPr>
+      <p:sp>
+        <p:nvSpPr>
+          <p:cNvPr id="2" name="Title 1">
+            <a:extLst>
+              <a:ext uri="{FF2B5EF4-FFF2-40B4-BE49-F238E27FC236}">
+                <a16:creationId xmlns:a16="http://schemas.microsoft.com/office/drawing/2014/main" id="{6CD0F201-F167-B31A-6157-5A9ECB220A8B}"/>
+              </a:ext>
+            </a:extLst>
+          </p:cNvPr>
+          <p:cNvSpPr>
+            <a:spLocks noGrp="1"/>
+          </p:cNvSpPr>
+          <p:nvPr>
+            <p:ph type="title"/>
+          </p:nvPr>
+        </p:nvSpPr>
+        <p:spPr/>
+        <p:txBody>
+          <a:bodyPr/>
+          <a:lstStyle/>
+          <a:p>
+            <a:r>
+              <a:rPr lang="en-US" dirty="0"/>
+              <a:t>Sample14_device4 (22/11)</a:t>
+            </a:r>
+            <a:endParaRPr lang="ru-RU" dirty="0"/>
+          </a:p>
+        </p:txBody>
+      </p:sp>
+      <p:graphicFrame>
+        <p:nvGraphicFramePr>
+          <p:cNvPr id="4" name="Object 3">
+            <a:extLst>
+              <a:ext uri="{FF2B5EF4-FFF2-40B4-BE49-F238E27FC236}">
+                <a16:creationId xmlns:a16="http://schemas.microsoft.com/office/drawing/2014/main" id="{D5CBE92C-20D6-0A40-3A80-A5487944BF9B}"/>
+              </a:ext>
+            </a:extLst>
+          </p:cNvPr>
+          <p:cNvGraphicFramePr>
+            <a:graphicFrameLocks noChangeAspect="1"/>
+          </p:cNvGraphicFramePr>
+          <p:nvPr>
+            <p:extLst>
+              <p:ext uri="{D42A27DB-BD31-4B8C-83A1-F6EECF244321}">
+                <p14:modId xmlns:p14="http://schemas.microsoft.com/office/powerpoint/2010/main" val="2109473176"/>
+              </p:ext>
+            </p:extLst>
+          </p:nvPr>
+        </p:nvGraphicFramePr>
+        <p:xfrm>
+          <a:off x="212367" y="1690688"/>
+          <a:ext cx="6586667" cy="5040000"/>
+        </p:xfrm>
+        <a:graphic>
+          <a:graphicData uri="http://schemas.openxmlformats.org/presentationml/2006/ole">
+            <mc:AlternateContent xmlns:mc="http://schemas.openxmlformats.org/markup-compatibility/2006">
+              <mc:Choice xmlns:v="urn:schemas-microsoft-com:vml" Requires="v">
+                <p:oleObj name="Graph" r:id="rId2" imgW="3920760" imgH="3000960" progId="Origin95.Graph">
+                  <p:embed/>
+                </p:oleObj>
+              </mc:Choice>
+              <mc:Fallback>
+                <p:oleObj name="Graph" r:id="rId2" imgW="3920760" imgH="3000960" progId="Origin95.Graph">
+                  <p:embed/>
+                  <p:pic>
+                    <p:nvPicPr>
+                      <p:cNvPr id="0" name=""/>
+                      <p:cNvPicPr/>
+                      <p:nvPr/>
+                    </p:nvPicPr>
+                    <p:blipFill>
+                      <a:blip r:embed="rId3"/>
+                      <a:stretch>
+                        <a:fillRect/>
+                      </a:stretch>
+                    </p:blipFill>
+                    <p:spPr>
+                      <a:xfrm>
+                        <a:off x="212367" y="1690688"/>
+                        <a:ext cx="6586667" cy="5040000"/>
+                      </a:xfrm>
+                      <a:prstGeom prst="rect">
+                        <a:avLst/>
+                      </a:prstGeom>
+                    </p:spPr>
+                  </p:pic>
+                </p:oleObj>
+              </mc:Fallback>
+            </mc:AlternateContent>
+          </a:graphicData>
+        </a:graphic>
+      </p:graphicFrame>
+    </p:spTree>
+    <p:extLst>
+      <p:ext uri="{BB962C8B-B14F-4D97-AF65-F5344CB8AC3E}">
+        <p14:creationId xmlns:p14="http://schemas.microsoft.com/office/powerpoint/2010/main" val="2339942908"/>
       </p:ext>
     </p:extLst>
   </p:cSld>

</xml_diff>

<commit_message>
04/12 The sensitivity for S12_d3, S14_d3 and S14_d4_1511 is estimated, now I am finishing the Electrical Characterisation
</commit_message>
<xml_diff>
--- a/Mikhail Bandurist Transistors/X-Ray Measurements (22-11-2023)/X-Ray Measurements Report Batch2.pptx
+++ b/Mikhail Bandurist Transistors/X-Ray Measurements (22-11-2023)/X-Ray Measurements Report Batch2.pptx
@@ -315,7 +315,7 @@
           <a:p>
             <a:fld id="{0D7AF3D4-FDB7-43B0-AE16-F3D25963A771}" type="datetimeFigureOut">
               <a:rPr lang="ru-RU" smtClean="0"/>
-              <a:t>25.11.2023</a:t>
+              <a:t>03.12.2023</a:t>
             </a:fld>
             <a:endParaRPr lang="ru-RU"/>
           </a:p>
@@ -515,7 +515,7 @@
           <a:p>
             <a:fld id="{0D7AF3D4-FDB7-43B0-AE16-F3D25963A771}" type="datetimeFigureOut">
               <a:rPr lang="ru-RU" smtClean="0"/>
-              <a:t>25.11.2023</a:t>
+              <a:t>03.12.2023</a:t>
             </a:fld>
             <a:endParaRPr lang="ru-RU"/>
           </a:p>
@@ -725,7 +725,7 @@
           <a:p>
             <a:fld id="{0D7AF3D4-FDB7-43B0-AE16-F3D25963A771}" type="datetimeFigureOut">
               <a:rPr lang="ru-RU" smtClean="0"/>
-              <a:t>25.11.2023</a:t>
+              <a:t>03.12.2023</a:t>
             </a:fld>
             <a:endParaRPr lang="ru-RU"/>
           </a:p>
@@ -925,7 +925,7 @@
           <a:p>
             <a:fld id="{0D7AF3D4-FDB7-43B0-AE16-F3D25963A771}" type="datetimeFigureOut">
               <a:rPr lang="ru-RU" smtClean="0"/>
-              <a:t>25.11.2023</a:t>
+              <a:t>03.12.2023</a:t>
             </a:fld>
             <a:endParaRPr lang="ru-RU"/>
           </a:p>
@@ -1201,7 +1201,7 @@
           <a:p>
             <a:fld id="{0D7AF3D4-FDB7-43B0-AE16-F3D25963A771}" type="datetimeFigureOut">
               <a:rPr lang="ru-RU" smtClean="0"/>
-              <a:t>25.11.2023</a:t>
+              <a:t>03.12.2023</a:t>
             </a:fld>
             <a:endParaRPr lang="ru-RU"/>
           </a:p>
@@ -1469,7 +1469,7 @@
           <a:p>
             <a:fld id="{0D7AF3D4-FDB7-43B0-AE16-F3D25963A771}" type="datetimeFigureOut">
               <a:rPr lang="ru-RU" smtClean="0"/>
-              <a:t>25.11.2023</a:t>
+              <a:t>03.12.2023</a:t>
             </a:fld>
             <a:endParaRPr lang="ru-RU"/>
           </a:p>
@@ -1884,7 +1884,7 @@
           <a:p>
             <a:fld id="{0D7AF3D4-FDB7-43B0-AE16-F3D25963A771}" type="datetimeFigureOut">
               <a:rPr lang="ru-RU" smtClean="0"/>
-              <a:t>25.11.2023</a:t>
+              <a:t>03.12.2023</a:t>
             </a:fld>
             <a:endParaRPr lang="ru-RU"/>
           </a:p>
@@ -2026,7 +2026,7 @@
           <a:p>
             <a:fld id="{0D7AF3D4-FDB7-43B0-AE16-F3D25963A771}" type="datetimeFigureOut">
               <a:rPr lang="ru-RU" smtClean="0"/>
-              <a:t>25.11.2023</a:t>
+              <a:t>03.12.2023</a:t>
             </a:fld>
             <a:endParaRPr lang="ru-RU"/>
           </a:p>
@@ -2139,7 +2139,7 @@
           <a:p>
             <a:fld id="{0D7AF3D4-FDB7-43B0-AE16-F3D25963A771}" type="datetimeFigureOut">
               <a:rPr lang="ru-RU" smtClean="0"/>
-              <a:t>25.11.2023</a:t>
+              <a:t>03.12.2023</a:t>
             </a:fld>
             <a:endParaRPr lang="ru-RU"/>
           </a:p>
@@ -2452,7 +2452,7 @@
           <a:p>
             <a:fld id="{0D7AF3D4-FDB7-43B0-AE16-F3D25963A771}" type="datetimeFigureOut">
               <a:rPr lang="ru-RU" smtClean="0"/>
-              <a:t>25.11.2023</a:t>
+              <a:t>03.12.2023</a:t>
             </a:fld>
             <a:endParaRPr lang="ru-RU"/>
           </a:p>
@@ -2741,7 +2741,7 @@
           <a:p>
             <a:fld id="{0D7AF3D4-FDB7-43B0-AE16-F3D25963A771}" type="datetimeFigureOut">
               <a:rPr lang="ru-RU" smtClean="0"/>
-              <a:t>25.11.2023</a:t>
+              <a:t>03.12.2023</a:t>
             </a:fld>
             <a:endParaRPr lang="ru-RU"/>
           </a:p>
@@ -2984,7 +2984,7 @@
           <a:p>
             <a:fld id="{0D7AF3D4-FDB7-43B0-AE16-F3D25963A771}" type="datetimeFigureOut">
               <a:rPr lang="ru-RU" smtClean="0"/>
-              <a:t>25.11.2023</a:t>
+              <a:t>03.12.2023</a:t>
             </a:fld>
             <a:endParaRPr lang="ru-RU"/>
           </a:p>
@@ -4955,35 +4955,4284 @@
           <a:chExt cx="0" cy="0"/>
         </a:xfrm>
       </p:grpSpPr>
-      <p:sp>
-        <p:nvSpPr>
-          <p:cNvPr id="2" name="Title 1">
-            <a:extLst>
-              <a:ext uri="{FF2B5EF4-FFF2-40B4-BE49-F238E27FC236}">
-                <a16:creationId xmlns:a16="http://schemas.microsoft.com/office/drawing/2014/main" id="{7C542579-DF2C-F24B-D446-BD16A02084E8}"/>
-              </a:ext>
-            </a:extLst>
-          </p:cNvPr>
-          <p:cNvSpPr>
-            <a:spLocks noGrp="1"/>
-          </p:cNvSpPr>
-          <p:nvPr>
-            <p:ph type="title"/>
-          </p:nvPr>
-        </p:nvSpPr>
-        <p:spPr/>
-        <p:txBody>
-          <a:bodyPr/>
-          <a:lstStyle/>
-          <a:p>
-            <a:r>
-              <a:rPr lang="en-US" dirty="0"/>
-              <a:t>Table</a:t>
-            </a:r>
-            <a:endParaRPr lang="ru-RU" dirty="0"/>
-          </a:p>
-        </p:txBody>
-      </p:sp>
+      <p:graphicFrame>
+        <p:nvGraphicFramePr>
+          <p:cNvPr id="4" name="Table 3">
+            <a:extLst>
+              <a:ext uri="{FF2B5EF4-FFF2-40B4-BE49-F238E27FC236}">
+                <a16:creationId xmlns:a16="http://schemas.microsoft.com/office/drawing/2014/main" id="{F3A4CEAF-3601-2BB3-FA4B-DC09EDB16E55}"/>
+              </a:ext>
+            </a:extLst>
+          </p:cNvPr>
+          <p:cNvGraphicFramePr>
+            <a:graphicFrameLocks noGrp="1"/>
+          </p:cNvGraphicFramePr>
+          <p:nvPr>
+            <p:extLst>
+              <p:ext uri="{D42A27DB-BD31-4B8C-83A1-F6EECF244321}">
+                <p14:modId xmlns:p14="http://schemas.microsoft.com/office/powerpoint/2010/main" val="3889098042"/>
+              </p:ext>
+            </p:extLst>
+          </p:nvPr>
+        </p:nvGraphicFramePr>
+        <p:xfrm>
+          <a:off x="127820" y="91440"/>
+          <a:ext cx="11720052" cy="12979400"/>
+        </p:xfrm>
+        <a:graphic>
+          <a:graphicData uri="http://schemas.openxmlformats.org/drawingml/2006/table">
+            <a:tbl>
+              <a:tblPr firstRow="1" bandRow="1">
+                <a:tableStyleId>{5C22544A-7EE6-4342-B048-85BDC9FD1C3A}</a:tableStyleId>
+              </a:tblPr>
+              <a:tblGrid>
+                <a:gridCol w="737419">
+                  <a:extLst>
+                    <a:ext uri="{9D8B030D-6E8A-4147-A177-3AD203B41FA5}">
+                      <a16:colId xmlns:a16="http://schemas.microsoft.com/office/drawing/2014/main" val="361048714"/>
+                    </a:ext>
+                  </a:extLst>
+                </a:gridCol>
+                <a:gridCol w="963561">
+                  <a:extLst>
+                    <a:ext uri="{9D8B030D-6E8A-4147-A177-3AD203B41FA5}">
+                      <a16:colId xmlns:a16="http://schemas.microsoft.com/office/drawing/2014/main" val="1802322460"/>
+                    </a:ext>
+                  </a:extLst>
+                </a:gridCol>
+                <a:gridCol w="884903">
+                  <a:extLst>
+                    <a:ext uri="{9D8B030D-6E8A-4147-A177-3AD203B41FA5}">
+                      <a16:colId xmlns:a16="http://schemas.microsoft.com/office/drawing/2014/main" val="2013951204"/>
+                    </a:ext>
+                  </a:extLst>
+                </a:gridCol>
+                <a:gridCol w="1278194">
+                  <a:extLst>
+                    <a:ext uri="{9D8B030D-6E8A-4147-A177-3AD203B41FA5}">
+                      <a16:colId xmlns:a16="http://schemas.microsoft.com/office/drawing/2014/main" val="3394166461"/>
+                    </a:ext>
+                  </a:extLst>
+                </a:gridCol>
+                <a:gridCol w="1278193">
+                  <a:extLst>
+                    <a:ext uri="{9D8B030D-6E8A-4147-A177-3AD203B41FA5}">
+                      <a16:colId xmlns:a16="http://schemas.microsoft.com/office/drawing/2014/main" val="699321706"/>
+                    </a:ext>
+                  </a:extLst>
+                </a:gridCol>
+                <a:gridCol w="1238865">
+                  <a:extLst>
+                    <a:ext uri="{9D8B030D-6E8A-4147-A177-3AD203B41FA5}">
+                      <a16:colId xmlns:a16="http://schemas.microsoft.com/office/drawing/2014/main" val="2978720137"/>
+                    </a:ext>
+                  </a:extLst>
+                </a:gridCol>
+                <a:gridCol w="2133600">
+                  <a:extLst>
+                    <a:ext uri="{9D8B030D-6E8A-4147-A177-3AD203B41FA5}">
+                      <a16:colId xmlns:a16="http://schemas.microsoft.com/office/drawing/2014/main" val="833529779"/>
+                    </a:ext>
+                  </a:extLst>
+                </a:gridCol>
+                <a:gridCol w="1903089">
+                  <a:extLst>
+                    <a:ext uri="{9D8B030D-6E8A-4147-A177-3AD203B41FA5}">
+                      <a16:colId xmlns:a16="http://schemas.microsoft.com/office/drawing/2014/main" val="3649656589"/>
+                    </a:ext>
+                  </a:extLst>
+                </a:gridCol>
+                <a:gridCol w="1302228">
+                  <a:extLst>
+                    <a:ext uri="{9D8B030D-6E8A-4147-A177-3AD203B41FA5}">
+                      <a16:colId xmlns:a16="http://schemas.microsoft.com/office/drawing/2014/main" val="3455074906"/>
+                    </a:ext>
+                  </a:extLst>
+                </a:gridCol>
+              </a:tblGrid>
+              <a:tr h="370840">
+                <a:tc>
+                  <a:txBody>
+                    <a:bodyPr/>
+                    <a:lstStyle/>
+                    <a:p>
+                      <a:r>
+                        <a:rPr lang="en-US" dirty="0"/>
+                        <a:t>Batch</a:t>
+                      </a:r>
+                      <a:endParaRPr lang="ru-RU" dirty="0"/>
+                    </a:p>
+                  </a:txBody>
+                  <a:tcPr/>
+                </a:tc>
+                <a:tc>
+                  <a:txBody>
+                    <a:bodyPr/>
+                    <a:lstStyle/>
+                    <a:p>
+                      <a:r>
+                        <a:rPr lang="en-US" dirty="0"/>
+                        <a:t>Sample</a:t>
+                      </a:r>
+                      <a:endParaRPr lang="ru-RU" dirty="0"/>
+                    </a:p>
+                  </a:txBody>
+                  <a:tcPr/>
+                </a:tc>
+                <a:tc>
+                  <a:txBody>
+                    <a:bodyPr/>
+                    <a:lstStyle/>
+                    <a:p>
+                      <a:r>
+                        <a:rPr lang="en-US" dirty="0"/>
+                        <a:t>device</a:t>
+                      </a:r>
+                      <a:endParaRPr lang="ru-RU" dirty="0"/>
+                    </a:p>
+                  </a:txBody>
+                  <a:tcPr/>
+                </a:tc>
+                <a:tc>
+                  <a:txBody>
+                    <a:bodyPr/>
+                    <a:lstStyle/>
+                    <a:p>
+                      <a:r>
+                        <a:rPr lang="en-US" dirty="0"/>
+                        <a:t>ON/OFF</a:t>
+                      </a:r>
+                      <a:endParaRPr lang="ru-RU" dirty="0"/>
+                    </a:p>
+                  </a:txBody>
+                  <a:tcPr/>
+                </a:tc>
+                <a:tc>
+                  <a:txBody>
+                    <a:bodyPr/>
+                    <a:lstStyle/>
+                    <a:p>
+                      <a:r>
+                        <a:rPr lang="en-US" dirty="0"/>
+                        <a:t>SS (V/dec)</a:t>
+                      </a:r>
+                      <a:endParaRPr lang="ru-RU" dirty="0"/>
+                    </a:p>
+                  </a:txBody>
+                  <a:tcPr/>
+                </a:tc>
+                <a:tc>
+                  <a:txBody>
+                    <a:bodyPr/>
+                    <a:lstStyle/>
+                    <a:p>
+                      <a:r>
+                        <a:rPr lang="en-US" dirty="0"/>
+                        <a:t>Vth (V)</a:t>
+                      </a:r>
+                      <a:endParaRPr lang="ru-RU" dirty="0"/>
+                    </a:p>
+                  </a:txBody>
+                  <a:tcPr/>
+                </a:tc>
+                <a:tc>
+                  <a:txBody>
+                    <a:bodyPr/>
+                    <a:lstStyle/>
+                    <a:p>
+                      <a:r>
+                        <a:rPr lang="pl-PL" dirty="0"/>
+                        <a:t>mu</a:t>
+                      </a:r>
+                      <a:r>
+                        <a:rPr lang="en-US" dirty="0"/>
+                        <a:t> </a:t>
+                      </a:r>
+                      <a:r>
+                        <a:rPr lang="pl-PL" dirty="0"/>
+                        <a:t>(cm^2/(V*s)</a:t>
+                      </a:r>
+                      <a:endParaRPr lang="ru-RU" dirty="0"/>
+                    </a:p>
+                  </a:txBody>
+                  <a:tcPr/>
+                </a:tc>
+                <a:tc>
+                  <a:txBody>
+                    <a:bodyPr/>
+                    <a:lstStyle/>
+                    <a:p>
+                      <a:r>
+                        <a:rPr lang="en-US" dirty="0"/>
+                        <a:t>Sensitivity</a:t>
+                      </a:r>
+                      <a:endParaRPr lang="ru-RU" dirty="0"/>
+                    </a:p>
+                  </a:txBody>
+                  <a:tcPr/>
+                </a:tc>
+                <a:tc>
+                  <a:txBody>
+                    <a:bodyPr/>
+                    <a:lstStyle/>
+                    <a:p>
+                      <a:r>
+                        <a:rPr lang="en-US" dirty="0"/>
+                        <a:t>Comments</a:t>
+                      </a:r>
+                      <a:endParaRPr lang="ru-RU" dirty="0"/>
+                    </a:p>
+                  </a:txBody>
+                  <a:tcPr/>
+                </a:tc>
+                <a:extLst>
+                  <a:ext uri="{0D108BD9-81ED-4DB2-BD59-A6C34878D82A}">
+                    <a16:rowId xmlns:a16="http://schemas.microsoft.com/office/drawing/2014/main" val="438546057"/>
+                  </a:ext>
+                </a:extLst>
+              </a:tr>
+              <a:tr h="370840">
+                <a:tc>
+                  <a:txBody>
+                    <a:bodyPr/>
+                    <a:lstStyle/>
+                    <a:p>
+                      <a:pPr algn="ctr"/>
+                      <a:r>
+                        <a:rPr lang="en-US" sz="1100" dirty="0"/>
+                        <a:t>2</a:t>
+                      </a:r>
+                      <a:endParaRPr lang="ru-RU" sz="1100" dirty="0"/>
+                    </a:p>
+                  </a:txBody>
+                  <a:tcPr anchor="ctr"/>
+                </a:tc>
+                <a:tc>
+                  <a:txBody>
+                    <a:bodyPr/>
+                    <a:lstStyle/>
+                    <a:p>
+                      <a:pPr algn="ctr"/>
+                      <a:r>
+                        <a:rPr lang="en-US" sz="1100" dirty="0"/>
+                        <a:t>1</a:t>
+                      </a:r>
+                      <a:endParaRPr lang="ru-RU" sz="1100" dirty="0"/>
+                    </a:p>
+                  </a:txBody>
+                  <a:tcPr anchor="ctr"/>
+                </a:tc>
+                <a:tc>
+                  <a:txBody>
+                    <a:bodyPr/>
+                    <a:lstStyle/>
+                    <a:p>
+                      <a:pPr algn="ctr"/>
+                      <a:r>
+                        <a:rPr lang="en-US" sz="1100" dirty="0"/>
+                        <a:t>1</a:t>
+                      </a:r>
+                    </a:p>
+                  </a:txBody>
+                  <a:tcPr anchor="ctr"/>
+                </a:tc>
+                <a:tc>
+                  <a:txBody>
+                    <a:bodyPr/>
+                    <a:lstStyle/>
+                    <a:p>
+                      <a:endParaRPr lang="ru-RU"/>
+                    </a:p>
+                  </a:txBody>
+                  <a:tcPr/>
+                </a:tc>
+                <a:tc>
+                  <a:txBody>
+                    <a:bodyPr/>
+                    <a:lstStyle/>
+                    <a:p>
+                      <a:endParaRPr lang="ru-RU"/>
+                    </a:p>
+                  </a:txBody>
+                  <a:tcPr/>
+                </a:tc>
+                <a:tc>
+                  <a:txBody>
+                    <a:bodyPr/>
+                    <a:lstStyle/>
+                    <a:p>
+                      <a:endParaRPr lang="ru-RU"/>
+                    </a:p>
+                  </a:txBody>
+                  <a:tcPr/>
+                </a:tc>
+                <a:tc>
+                  <a:txBody>
+                    <a:bodyPr/>
+                    <a:lstStyle/>
+                    <a:p>
+                      <a:endParaRPr lang="ru-RU"/>
+                    </a:p>
+                  </a:txBody>
+                  <a:tcPr/>
+                </a:tc>
+                <a:tc>
+                  <a:txBody>
+                    <a:bodyPr/>
+                    <a:lstStyle/>
+                    <a:p>
+                      <a:endParaRPr lang="ru-RU"/>
+                    </a:p>
+                  </a:txBody>
+                  <a:tcPr/>
+                </a:tc>
+                <a:tc>
+                  <a:txBody>
+                    <a:bodyPr/>
+                    <a:lstStyle/>
+                    <a:p>
+                      <a:endParaRPr lang="ru-RU"/>
+                    </a:p>
+                  </a:txBody>
+                  <a:tcPr/>
+                </a:tc>
+                <a:extLst>
+                  <a:ext uri="{0D108BD9-81ED-4DB2-BD59-A6C34878D82A}">
+                    <a16:rowId xmlns:a16="http://schemas.microsoft.com/office/drawing/2014/main" val="1541236845"/>
+                  </a:ext>
+                </a:extLst>
+              </a:tr>
+              <a:tr h="370840">
+                <a:tc>
+                  <a:txBody>
+                    <a:bodyPr/>
+                    <a:lstStyle/>
+                    <a:p>
+                      <a:pPr algn="ctr"/>
+                      <a:endParaRPr lang="ru-RU" sz="1100" dirty="0"/>
+                    </a:p>
+                  </a:txBody>
+                  <a:tcPr anchor="ctr"/>
+                </a:tc>
+                <a:tc>
+                  <a:txBody>
+                    <a:bodyPr/>
+                    <a:lstStyle/>
+                    <a:p>
+                      <a:pPr algn="ctr"/>
+                      <a:endParaRPr lang="ru-RU" sz="1100" dirty="0"/>
+                    </a:p>
+                  </a:txBody>
+                  <a:tcPr anchor="ctr"/>
+                </a:tc>
+                <a:tc>
+                  <a:txBody>
+                    <a:bodyPr/>
+                    <a:lstStyle/>
+                    <a:p>
+                      <a:pPr algn="ctr"/>
+                      <a:r>
+                        <a:rPr lang="en-US" sz="1100" dirty="0"/>
+                        <a:t>2</a:t>
+                      </a:r>
+                      <a:endParaRPr lang="ru-RU" sz="1100" dirty="0"/>
+                    </a:p>
+                  </a:txBody>
+                  <a:tcPr anchor="ctr"/>
+                </a:tc>
+                <a:tc>
+                  <a:txBody>
+                    <a:bodyPr/>
+                    <a:lstStyle/>
+                    <a:p>
+                      <a:endParaRPr lang="ru-RU"/>
+                    </a:p>
+                  </a:txBody>
+                  <a:tcPr/>
+                </a:tc>
+                <a:tc>
+                  <a:txBody>
+                    <a:bodyPr/>
+                    <a:lstStyle/>
+                    <a:p>
+                      <a:endParaRPr lang="ru-RU"/>
+                    </a:p>
+                  </a:txBody>
+                  <a:tcPr/>
+                </a:tc>
+                <a:tc>
+                  <a:txBody>
+                    <a:bodyPr/>
+                    <a:lstStyle/>
+                    <a:p>
+                      <a:endParaRPr lang="ru-RU"/>
+                    </a:p>
+                  </a:txBody>
+                  <a:tcPr/>
+                </a:tc>
+                <a:tc>
+                  <a:txBody>
+                    <a:bodyPr/>
+                    <a:lstStyle/>
+                    <a:p>
+                      <a:endParaRPr lang="ru-RU"/>
+                    </a:p>
+                  </a:txBody>
+                  <a:tcPr/>
+                </a:tc>
+                <a:tc>
+                  <a:txBody>
+                    <a:bodyPr/>
+                    <a:lstStyle/>
+                    <a:p>
+                      <a:endParaRPr lang="ru-RU"/>
+                    </a:p>
+                  </a:txBody>
+                  <a:tcPr/>
+                </a:tc>
+                <a:tc>
+                  <a:txBody>
+                    <a:bodyPr/>
+                    <a:lstStyle/>
+                    <a:p>
+                      <a:endParaRPr lang="ru-RU"/>
+                    </a:p>
+                  </a:txBody>
+                  <a:tcPr/>
+                </a:tc>
+                <a:extLst>
+                  <a:ext uri="{0D108BD9-81ED-4DB2-BD59-A6C34878D82A}">
+                    <a16:rowId xmlns:a16="http://schemas.microsoft.com/office/drawing/2014/main" val="3458201032"/>
+                  </a:ext>
+                </a:extLst>
+              </a:tr>
+              <a:tr h="370840">
+                <a:tc>
+                  <a:txBody>
+                    <a:bodyPr/>
+                    <a:lstStyle/>
+                    <a:p>
+                      <a:pPr algn="ctr"/>
+                      <a:endParaRPr lang="ru-RU" sz="1100" dirty="0"/>
+                    </a:p>
+                  </a:txBody>
+                  <a:tcPr anchor="ctr"/>
+                </a:tc>
+                <a:tc>
+                  <a:txBody>
+                    <a:bodyPr/>
+                    <a:lstStyle/>
+                    <a:p>
+                      <a:pPr algn="ctr"/>
+                      <a:endParaRPr lang="ru-RU" sz="1100" dirty="0"/>
+                    </a:p>
+                  </a:txBody>
+                  <a:tcPr anchor="ctr"/>
+                </a:tc>
+                <a:tc>
+                  <a:txBody>
+                    <a:bodyPr/>
+                    <a:lstStyle/>
+                    <a:p>
+                      <a:pPr algn="ctr"/>
+                      <a:r>
+                        <a:rPr lang="en-US" sz="1100" dirty="0"/>
+                        <a:t>3</a:t>
+                      </a:r>
+                      <a:endParaRPr lang="ru-RU" sz="1100" dirty="0"/>
+                    </a:p>
+                  </a:txBody>
+                  <a:tcPr anchor="ctr"/>
+                </a:tc>
+                <a:tc>
+                  <a:txBody>
+                    <a:bodyPr/>
+                    <a:lstStyle/>
+                    <a:p>
+                      <a:endParaRPr lang="ru-RU"/>
+                    </a:p>
+                  </a:txBody>
+                  <a:tcPr/>
+                </a:tc>
+                <a:tc>
+                  <a:txBody>
+                    <a:bodyPr/>
+                    <a:lstStyle/>
+                    <a:p>
+                      <a:endParaRPr lang="ru-RU"/>
+                    </a:p>
+                  </a:txBody>
+                  <a:tcPr/>
+                </a:tc>
+                <a:tc>
+                  <a:txBody>
+                    <a:bodyPr/>
+                    <a:lstStyle/>
+                    <a:p>
+                      <a:endParaRPr lang="ru-RU"/>
+                    </a:p>
+                  </a:txBody>
+                  <a:tcPr/>
+                </a:tc>
+                <a:tc>
+                  <a:txBody>
+                    <a:bodyPr/>
+                    <a:lstStyle/>
+                    <a:p>
+                      <a:endParaRPr lang="ru-RU"/>
+                    </a:p>
+                  </a:txBody>
+                  <a:tcPr/>
+                </a:tc>
+                <a:tc>
+                  <a:txBody>
+                    <a:bodyPr/>
+                    <a:lstStyle/>
+                    <a:p>
+                      <a:endParaRPr lang="ru-RU"/>
+                    </a:p>
+                  </a:txBody>
+                  <a:tcPr/>
+                </a:tc>
+                <a:tc>
+                  <a:txBody>
+                    <a:bodyPr/>
+                    <a:lstStyle/>
+                    <a:p>
+                      <a:endParaRPr lang="ru-RU"/>
+                    </a:p>
+                  </a:txBody>
+                  <a:tcPr/>
+                </a:tc>
+                <a:extLst>
+                  <a:ext uri="{0D108BD9-81ED-4DB2-BD59-A6C34878D82A}">
+                    <a16:rowId xmlns:a16="http://schemas.microsoft.com/office/drawing/2014/main" val="4259595126"/>
+                  </a:ext>
+                </a:extLst>
+              </a:tr>
+              <a:tr h="370840">
+                <a:tc>
+                  <a:txBody>
+                    <a:bodyPr/>
+                    <a:lstStyle/>
+                    <a:p>
+                      <a:pPr algn="ctr"/>
+                      <a:endParaRPr lang="ru-RU" sz="1100" dirty="0"/>
+                    </a:p>
+                  </a:txBody>
+                  <a:tcPr anchor="ctr"/>
+                </a:tc>
+                <a:tc>
+                  <a:txBody>
+                    <a:bodyPr/>
+                    <a:lstStyle/>
+                    <a:p>
+                      <a:pPr algn="ctr"/>
+                      <a:endParaRPr lang="ru-RU" sz="1100" dirty="0"/>
+                    </a:p>
+                  </a:txBody>
+                  <a:tcPr anchor="ctr"/>
+                </a:tc>
+                <a:tc>
+                  <a:txBody>
+                    <a:bodyPr/>
+                    <a:lstStyle/>
+                    <a:p>
+                      <a:pPr algn="ctr"/>
+                      <a:r>
+                        <a:rPr lang="en-US" sz="1100" dirty="0"/>
+                        <a:t>4</a:t>
+                      </a:r>
+                      <a:endParaRPr lang="ru-RU" sz="1100" dirty="0"/>
+                    </a:p>
+                  </a:txBody>
+                  <a:tcPr anchor="ctr"/>
+                </a:tc>
+                <a:tc>
+                  <a:txBody>
+                    <a:bodyPr/>
+                    <a:lstStyle/>
+                    <a:p>
+                      <a:endParaRPr lang="ru-RU" dirty="0"/>
+                    </a:p>
+                  </a:txBody>
+                  <a:tcPr/>
+                </a:tc>
+                <a:tc>
+                  <a:txBody>
+                    <a:bodyPr/>
+                    <a:lstStyle/>
+                    <a:p>
+                      <a:endParaRPr lang="ru-RU"/>
+                    </a:p>
+                  </a:txBody>
+                  <a:tcPr/>
+                </a:tc>
+                <a:tc>
+                  <a:txBody>
+                    <a:bodyPr/>
+                    <a:lstStyle/>
+                    <a:p>
+                      <a:endParaRPr lang="ru-RU"/>
+                    </a:p>
+                  </a:txBody>
+                  <a:tcPr/>
+                </a:tc>
+                <a:tc>
+                  <a:txBody>
+                    <a:bodyPr/>
+                    <a:lstStyle/>
+                    <a:p>
+                      <a:endParaRPr lang="ru-RU"/>
+                    </a:p>
+                  </a:txBody>
+                  <a:tcPr/>
+                </a:tc>
+                <a:tc>
+                  <a:txBody>
+                    <a:bodyPr/>
+                    <a:lstStyle/>
+                    <a:p>
+                      <a:endParaRPr lang="ru-RU"/>
+                    </a:p>
+                  </a:txBody>
+                  <a:tcPr/>
+                </a:tc>
+                <a:tc>
+                  <a:txBody>
+                    <a:bodyPr/>
+                    <a:lstStyle/>
+                    <a:p>
+                      <a:endParaRPr lang="ru-RU"/>
+                    </a:p>
+                  </a:txBody>
+                  <a:tcPr/>
+                </a:tc>
+                <a:extLst>
+                  <a:ext uri="{0D108BD9-81ED-4DB2-BD59-A6C34878D82A}">
+                    <a16:rowId xmlns:a16="http://schemas.microsoft.com/office/drawing/2014/main" val="543567752"/>
+                  </a:ext>
+                </a:extLst>
+              </a:tr>
+              <a:tr h="370840">
+                <a:tc>
+                  <a:txBody>
+                    <a:bodyPr/>
+                    <a:lstStyle/>
+                    <a:p>
+                      <a:pPr algn="ctr"/>
+                      <a:endParaRPr lang="ru-RU" sz="1100" dirty="0"/>
+                    </a:p>
+                  </a:txBody>
+                  <a:tcPr anchor="ctr"/>
+                </a:tc>
+                <a:tc>
+                  <a:txBody>
+                    <a:bodyPr/>
+                    <a:lstStyle/>
+                    <a:p>
+                      <a:pPr algn="ctr"/>
+                      <a:endParaRPr lang="ru-RU" sz="1100" dirty="0"/>
+                    </a:p>
+                  </a:txBody>
+                  <a:tcPr anchor="ctr">
+                    <a:lnB w="12700" cap="flat" cmpd="sng" algn="ctr">
+                      <a:solidFill>
+                        <a:schemeClr val="tx1"/>
+                      </a:solidFill>
+                      <a:prstDash val="solid"/>
+                      <a:round/>
+                      <a:headEnd type="none" w="med" len="med"/>
+                      <a:tailEnd type="none" w="med" len="med"/>
+                    </a:lnB>
+                  </a:tcPr>
+                </a:tc>
+                <a:tc>
+                  <a:txBody>
+                    <a:bodyPr/>
+                    <a:lstStyle/>
+                    <a:p>
+                      <a:pPr algn="ctr"/>
+                      <a:r>
+                        <a:rPr lang="en-US" sz="1100" dirty="0"/>
+                        <a:t>5</a:t>
+                      </a:r>
+                      <a:endParaRPr lang="ru-RU" sz="1100" dirty="0"/>
+                    </a:p>
+                  </a:txBody>
+                  <a:tcPr anchor="ctr">
+                    <a:lnB w="12700" cap="flat" cmpd="sng" algn="ctr">
+                      <a:solidFill>
+                        <a:schemeClr val="tx1"/>
+                      </a:solidFill>
+                      <a:prstDash val="solid"/>
+                      <a:round/>
+                      <a:headEnd type="none" w="med" len="med"/>
+                      <a:tailEnd type="none" w="med" len="med"/>
+                    </a:lnB>
+                  </a:tcPr>
+                </a:tc>
+                <a:tc>
+                  <a:txBody>
+                    <a:bodyPr/>
+                    <a:lstStyle/>
+                    <a:p>
+                      <a:endParaRPr lang="ru-RU"/>
+                    </a:p>
+                  </a:txBody>
+                  <a:tcPr>
+                    <a:lnB w="12700" cap="flat" cmpd="sng" algn="ctr">
+                      <a:solidFill>
+                        <a:schemeClr val="tx1"/>
+                      </a:solidFill>
+                      <a:prstDash val="solid"/>
+                      <a:round/>
+                      <a:headEnd type="none" w="med" len="med"/>
+                      <a:tailEnd type="none" w="med" len="med"/>
+                    </a:lnB>
+                  </a:tcPr>
+                </a:tc>
+                <a:tc>
+                  <a:txBody>
+                    <a:bodyPr/>
+                    <a:lstStyle/>
+                    <a:p>
+                      <a:endParaRPr lang="ru-RU" dirty="0"/>
+                    </a:p>
+                  </a:txBody>
+                  <a:tcPr>
+                    <a:lnB w="12700" cap="flat" cmpd="sng" algn="ctr">
+                      <a:solidFill>
+                        <a:schemeClr val="tx1"/>
+                      </a:solidFill>
+                      <a:prstDash val="solid"/>
+                      <a:round/>
+                      <a:headEnd type="none" w="med" len="med"/>
+                      <a:tailEnd type="none" w="med" len="med"/>
+                    </a:lnB>
+                  </a:tcPr>
+                </a:tc>
+                <a:tc>
+                  <a:txBody>
+                    <a:bodyPr/>
+                    <a:lstStyle/>
+                    <a:p>
+                      <a:endParaRPr lang="ru-RU"/>
+                    </a:p>
+                  </a:txBody>
+                  <a:tcPr>
+                    <a:lnB w="12700" cap="flat" cmpd="sng" algn="ctr">
+                      <a:solidFill>
+                        <a:schemeClr val="tx1"/>
+                      </a:solidFill>
+                      <a:prstDash val="solid"/>
+                      <a:round/>
+                      <a:headEnd type="none" w="med" len="med"/>
+                      <a:tailEnd type="none" w="med" len="med"/>
+                    </a:lnB>
+                  </a:tcPr>
+                </a:tc>
+                <a:tc>
+                  <a:txBody>
+                    <a:bodyPr/>
+                    <a:lstStyle/>
+                    <a:p>
+                      <a:endParaRPr lang="ru-RU" dirty="0"/>
+                    </a:p>
+                  </a:txBody>
+                  <a:tcPr>
+                    <a:lnB w="12700" cap="flat" cmpd="sng" algn="ctr">
+                      <a:solidFill>
+                        <a:schemeClr val="tx1"/>
+                      </a:solidFill>
+                      <a:prstDash val="solid"/>
+                      <a:round/>
+                      <a:headEnd type="none" w="med" len="med"/>
+                      <a:tailEnd type="none" w="med" len="med"/>
+                    </a:lnB>
+                  </a:tcPr>
+                </a:tc>
+                <a:tc>
+                  <a:txBody>
+                    <a:bodyPr/>
+                    <a:lstStyle/>
+                    <a:p>
+                      <a:endParaRPr lang="ru-RU" dirty="0"/>
+                    </a:p>
+                  </a:txBody>
+                  <a:tcPr>
+                    <a:lnB w="12700" cap="flat" cmpd="sng" algn="ctr">
+                      <a:solidFill>
+                        <a:schemeClr val="tx1"/>
+                      </a:solidFill>
+                      <a:prstDash val="solid"/>
+                      <a:round/>
+                      <a:headEnd type="none" w="med" len="med"/>
+                      <a:tailEnd type="none" w="med" len="med"/>
+                    </a:lnB>
+                  </a:tcPr>
+                </a:tc>
+                <a:tc>
+                  <a:txBody>
+                    <a:bodyPr/>
+                    <a:lstStyle/>
+                    <a:p>
+                      <a:endParaRPr lang="ru-RU" dirty="0"/>
+                    </a:p>
+                  </a:txBody>
+                  <a:tcPr>
+                    <a:lnB w="12700" cap="flat" cmpd="sng" algn="ctr">
+                      <a:solidFill>
+                        <a:schemeClr val="tx1"/>
+                      </a:solidFill>
+                      <a:prstDash val="solid"/>
+                      <a:round/>
+                      <a:headEnd type="none" w="med" len="med"/>
+                      <a:tailEnd type="none" w="med" len="med"/>
+                    </a:lnB>
+                  </a:tcPr>
+                </a:tc>
+                <a:extLst>
+                  <a:ext uri="{0D108BD9-81ED-4DB2-BD59-A6C34878D82A}">
+                    <a16:rowId xmlns:a16="http://schemas.microsoft.com/office/drawing/2014/main" val="1729260913"/>
+                  </a:ext>
+                </a:extLst>
+              </a:tr>
+              <a:tr h="370840">
+                <a:tc>
+                  <a:txBody>
+                    <a:bodyPr/>
+                    <a:lstStyle/>
+                    <a:p>
+                      <a:pPr algn="ctr"/>
+                      <a:endParaRPr lang="ru-RU" sz="1100" dirty="0"/>
+                    </a:p>
+                  </a:txBody>
+                  <a:tcPr anchor="ctr"/>
+                </a:tc>
+                <a:tc>
+                  <a:txBody>
+                    <a:bodyPr/>
+                    <a:lstStyle/>
+                    <a:p>
+                      <a:pPr algn="ctr"/>
+                      <a:r>
+                        <a:rPr lang="en-US" sz="1100" dirty="0"/>
+                        <a:t>4</a:t>
+                      </a:r>
+                      <a:endParaRPr lang="ru-RU" sz="1100" dirty="0"/>
+                    </a:p>
+                  </a:txBody>
+                  <a:tcPr anchor="ctr">
+                    <a:lnT w="12700" cap="flat" cmpd="sng" algn="ctr">
+                      <a:solidFill>
+                        <a:schemeClr val="tx1"/>
+                      </a:solidFill>
+                      <a:prstDash val="solid"/>
+                      <a:round/>
+                      <a:headEnd type="none" w="med" len="med"/>
+                      <a:tailEnd type="none" w="med" len="med"/>
+                    </a:lnT>
+                  </a:tcPr>
+                </a:tc>
+                <a:tc>
+                  <a:txBody>
+                    <a:bodyPr/>
+                    <a:lstStyle/>
+                    <a:p>
+                      <a:pPr algn="ctr"/>
+                      <a:r>
+                        <a:rPr lang="en-US" sz="1100" dirty="0"/>
+                        <a:t>1</a:t>
+                      </a:r>
+                      <a:endParaRPr lang="ru-RU" sz="1100" dirty="0"/>
+                    </a:p>
+                  </a:txBody>
+                  <a:tcPr anchor="ctr">
+                    <a:lnT w="12700" cap="flat" cmpd="sng" algn="ctr">
+                      <a:solidFill>
+                        <a:schemeClr val="tx1"/>
+                      </a:solidFill>
+                      <a:prstDash val="solid"/>
+                      <a:round/>
+                      <a:headEnd type="none" w="med" len="med"/>
+                      <a:tailEnd type="none" w="med" len="med"/>
+                    </a:lnT>
+                  </a:tcPr>
+                </a:tc>
+                <a:tc>
+                  <a:txBody>
+                    <a:bodyPr/>
+                    <a:lstStyle/>
+                    <a:p>
+                      <a:endParaRPr lang="ru-RU"/>
+                    </a:p>
+                  </a:txBody>
+                  <a:tcPr>
+                    <a:lnT w="12700" cap="flat" cmpd="sng" algn="ctr">
+                      <a:solidFill>
+                        <a:schemeClr val="tx1"/>
+                      </a:solidFill>
+                      <a:prstDash val="solid"/>
+                      <a:round/>
+                      <a:headEnd type="none" w="med" len="med"/>
+                      <a:tailEnd type="none" w="med" len="med"/>
+                    </a:lnT>
+                  </a:tcPr>
+                </a:tc>
+                <a:tc>
+                  <a:txBody>
+                    <a:bodyPr/>
+                    <a:lstStyle/>
+                    <a:p>
+                      <a:endParaRPr lang="ru-RU"/>
+                    </a:p>
+                  </a:txBody>
+                  <a:tcPr>
+                    <a:lnT w="12700" cap="flat" cmpd="sng" algn="ctr">
+                      <a:solidFill>
+                        <a:schemeClr val="tx1"/>
+                      </a:solidFill>
+                      <a:prstDash val="solid"/>
+                      <a:round/>
+                      <a:headEnd type="none" w="med" len="med"/>
+                      <a:tailEnd type="none" w="med" len="med"/>
+                    </a:lnT>
+                  </a:tcPr>
+                </a:tc>
+                <a:tc>
+                  <a:txBody>
+                    <a:bodyPr/>
+                    <a:lstStyle/>
+                    <a:p>
+                      <a:endParaRPr lang="ru-RU"/>
+                    </a:p>
+                  </a:txBody>
+                  <a:tcPr>
+                    <a:lnT w="12700" cap="flat" cmpd="sng" algn="ctr">
+                      <a:solidFill>
+                        <a:schemeClr val="tx1"/>
+                      </a:solidFill>
+                      <a:prstDash val="solid"/>
+                      <a:round/>
+                      <a:headEnd type="none" w="med" len="med"/>
+                      <a:tailEnd type="none" w="med" len="med"/>
+                    </a:lnT>
+                  </a:tcPr>
+                </a:tc>
+                <a:tc>
+                  <a:txBody>
+                    <a:bodyPr/>
+                    <a:lstStyle/>
+                    <a:p>
+                      <a:endParaRPr lang="ru-RU"/>
+                    </a:p>
+                  </a:txBody>
+                  <a:tcPr>
+                    <a:lnT w="12700" cap="flat" cmpd="sng" algn="ctr">
+                      <a:solidFill>
+                        <a:schemeClr val="tx1"/>
+                      </a:solidFill>
+                      <a:prstDash val="solid"/>
+                      <a:round/>
+                      <a:headEnd type="none" w="med" len="med"/>
+                      <a:tailEnd type="none" w="med" len="med"/>
+                    </a:lnT>
+                  </a:tcPr>
+                </a:tc>
+                <a:tc>
+                  <a:txBody>
+                    <a:bodyPr/>
+                    <a:lstStyle/>
+                    <a:p>
+                      <a:endParaRPr lang="ru-RU"/>
+                    </a:p>
+                  </a:txBody>
+                  <a:tcPr>
+                    <a:lnT w="12700" cap="flat" cmpd="sng" algn="ctr">
+                      <a:solidFill>
+                        <a:schemeClr val="tx1"/>
+                      </a:solidFill>
+                      <a:prstDash val="solid"/>
+                      <a:round/>
+                      <a:headEnd type="none" w="med" len="med"/>
+                      <a:tailEnd type="none" w="med" len="med"/>
+                    </a:lnT>
+                  </a:tcPr>
+                </a:tc>
+                <a:tc>
+                  <a:txBody>
+                    <a:bodyPr/>
+                    <a:lstStyle/>
+                    <a:p>
+                      <a:endParaRPr lang="ru-RU"/>
+                    </a:p>
+                  </a:txBody>
+                  <a:tcPr>
+                    <a:lnT w="12700" cap="flat" cmpd="sng" algn="ctr">
+                      <a:solidFill>
+                        <a:schemeClr val="tx1"/>
+                      </a:solidFill>
+                      <a:prstDash val="solid"/>
+                      <a:round/>
+                      <a:headEnd type="none" w="med" len="med"/>
+                      <a:tailEnd type="none" w="med" len="med"/>
+                    </a:lnT>
+                  </a:tcPr>
+                </a:tc>
+                <a:extLst>
+                  <a:ext uri="{0D108BD9-81ED-4DB2-BD59-A6C34878D82A}">
+                    <a16:rowId xmlns:a16="http://schemas.microsoft.com/office/drawing/2014/main" val="3713939177"/>
+                  </a:ext>
+                </a:extLst>
+              </a:tr>
+              <a:tr h="370840">
+                <a:tc>
+                  <a:txBody>
+                    <a:bodyPr/>
+                    <a:lstStyle/>
+                    <a:p>
+                      <a:endParaRPr lang="ru-RU" dirty="0"/>
+                    </a:p>
+                  </a:txBody>
+                  <a:tcPr/>
+                </a:tc>
+                <a:tc>
+                  <a:txBody>
+                    <a:bodyPr/>
+                    <a:lstStyle/>
+                    <a:p>
+                      <a:pPr algn="ctr" fontAlgn="ctr"/>
+                      <a:r>
+                        <a:rPr lang="ru-RU" sz="1100" b="1" i="0" u="none" strike="noStrike" dirty="0">
+                          <a:solidFill>
+                            <a:srgbClr val="000000"/>
+                          </a:solidFill>
+                          <a:effectLst/>
+                          <a:latin typeface="Calibri" panose="020F0502020204030204" pitchFamily="34" charset="0"/>
+                        </a:rPr>
+                        <a:t>5</a:t>
+                      </a:r>
+                    </a:p>
+                  </a:txBody>
+                  <a:tcPr marL="7620" marR="7620" marT="7620" marB="0" anchor="ctr"/>
+                </a:tc>
+                <a:tc>
+                  <a:txBody>
+                    <a:bodyPr/>
+                    <a:lstStyle/>
+                    <a:p>
+                      <a:pPr algn="ctr" fontAlgn="ctr"/>
+                      <a:r>
+                        <a:rPr lang="ru-RU" sz="1100" b="0" i="0" u="none" strike="noStrike" dirty="0">
+                          <a:solidFill>
+                            <a:srgbClr val="000000"/>
+                          </a:solidFill>
+                          <a:effectLst/>
+                          <a:latin typeface="Calibri" panose="020F0502020204030204" pitchFamily="34" charset="0"/>
+                        </a:rPr>
+                        <a:t>1</a:t>
+                      </a:r>
+                    </a:p>
+                  </a:txBody>
+                  <a:tcPr marL="7620" marR="7620" marT="7620" marB="0" anchor="ctr"/>
+                </a:tc>
+                <a:tc>
+                  <a:txBody>
+                    <a:bodyPr/>
+                    <a:lstStyle/>
+                    <a:p>
+                      <a:endParaRPr lang="ru-RU" dirty="0"/>
+                    </a:p>
+                  </a:txBody>
+                  <a:tcPr/>
+                </a:tc>
+                <a:tc>
+                  <a:txBody>
+                    <a:bodyPr/>
+                    <a:lstStyle/>
+                    <a:p>
+                      <a:endParaRPr lang="ru-RU"/>
+                    </a:p>
+                  </a:txBody>
+                  <a:tcPr/>
+                </a:tc>
+                <a:tc>
+                  <a:txBody>
+                    <a:bodyPr/>
+                    <a:lstStyle/>
+                    <a:p>
+                      <a:endParaRPr lang="ru-RU"/>
+                    </a:p>
+                  </a:txBody>
+                  <a:tcPr/>
+                </a:tc>
+                <a:tc>
+                  <a:txBody>
+                    <a:bodyPr/>
+                    <a:lstStyle/>
+                    <a:p>
+                      <a:endParaRPr lang="ru-RU"/>
+                    </a:p>
+                  </a:txBody>
+                  <a:tcPr/>
+                </a:tc>
+                <a:tc>
+                  <a:txBody>
+                    <a:bodyPr/>
+                    <a:lstStyle/>
+                    <a:p>
+                      <a:endParaRPr lang="ru-RU"/>
+                    </a:p>
+                  </a:txBody>
+                  <a:tcPr/>
+                </a:tc>
+                <a:tc>
+                  <a:txBody>
+                    <a:bodyPr/>
+                    <a:lstStyle/>
+                    <a:p>
+                      <a:endParaRPr lang="ru-RU" dirty="0"/>
+                    </a:p>
+                  </a:txBody>
+                  <a:tcPr/>
+                </a:tc>
+                <a:extLst>
+                  <a:ext uri="{0D108BD9-81ED-4DB2-BD59-A6C34878D82A}">
+                    <a16:rowId xmlns:a16="http://schemas.microsoft.com/office/drawing/2014/main" val="312869308"/>
+                  </a:ext>
+                </a:extLst>
+              </a:tr>
+              <a:tr h="370840">
+                <a:tc>
+                  <a:txBody>
+                    <a:bodyPr/>
+                    <a:lstStyle/>
+                    <a:p>
+                      <a:endParaRPr lang="ru-RU" dirty="0"/>
+                    </a:p>
+                  </a:txBody>
+                  <a:tcPr/>
+                </a:tc>
+                <a:tc>
+                  <a:txBody>
+                    <a:bodyPr/>
+                    <a:lstStyle/>
+                    <a:p>
+                      <a:pPr algn="ctr" fontAlgn="ctr"/>
+                      <a:endParaRPr lang="ru-RU" sz="1100" b="1" i="0" u="none" strike="noStrike">
+                        <a:solidFill>
+                          <a:srgbClr val="000000"/>
+                        </a:solidFill>
+                        <a:effectLst/>
+                        <a:latin typeface="Calibri" panose="020F0502020204030204" pitchFamily="34" charset="0"/>
+                      </a:endParaRPr>
+                    </a:p>
+                  </a:txBody>
+                  <a:tcPr marL="7620" marR="7620" marT="7620" marB="0" anchor="ctr"/>
+                </a:tc>
+                <a:tc>
+                  <a:txBody>
+                    <a:bodyPr/>
+                    <a:lstStyle/>
+                    <a:p>
+                      <a:pPr algn="ctr" fontAlgn="ctr"/>
+                      <a:r>
+                        <a:rPr lang="ru-RU" sz="1100" b="0" i="0" u="none" strike="noStrike">
+                          <a:solidFill>
+                            <a:srgbClr val="000000"/>
+                          </a:solidFill>
+                          <a:effectLst/>
+                          <a:latin typeface="Calibri" panose="020F0502020204030204" pitchFamily="34" charset="0"/>
+                        </a:rPr>
+                        <a:t>2</a:t>
+                      </a:r>
+                    </a:p>
+                  </a:txBody>
+                  <a:tcPr marL="7620" marR="7620" marT="7620" marB="0" anchor="ctr"/>
+                </a:tc>
+                <a:tc>
+                  <a:txBody>
+                    <a:bodyPr/>
+                    <a:lstStyle/>
+                    <a:p>
+                      <a:endParaRPr lang="ru-RU"/>
+                    </a:p>
+                  </a:txBody>
+                  <a:tcPr/>
+                </a:tc>
+                <a:tc>
+                  <a:txBody>
+                    <a:bodyPr/>
+                    <a:lstStyle/>
+                    <a:p>
+                      <a:endParaRPr lang="ru-RU"/>
+                    </a:p>
+                  </a:txBody>
+                  <a:tcPr/>
+                </a:tc>
+                <a:tc>
+                  <a:txBody>
+                    <a:bodyPr/>
+                    <a:lstStyle/>
+                    <a:p>
+                      <a:endParaRPr lang="ru-RU"/>
+                    </a:p>
+                  </a:txBody>
+                  <a:tcPr/>
+                </a:tc>
+                <a:tc>
+                  <a:txBody>
+                    <a:bodyPr/>
+                    <a:lstStyle/>
+                    <a:p>
+                      <a:endParaRPr lang="ru-RU"/>
+                    </a:p>
+                  </a:txBody>
+                  <a:tcPr/>
+                </a:tc>
+                <a:tc>
+                  <a:txBody>
+                    <a:bodyPr/>
+                    <a:lstStyle/>
+                    <a:p>
+                      <a:endParaRPr lang="ru-RU"/>
+                    </a:p>
+                  </a:txBody>
+                  <a:tcPr/>
+                </a:tc>
+                <a:tc>
+                  <a:txBody>
+                    <a:bodyPr/>
+                    <a:lstStyle/>
+                    <a:p>
+                      <a:endParaRPr lang="ru-RU" dirty="0"/>
+                    </a:p>
+                  </a:txBody>
+                  <a:tcPr/>
+                </a:tc>
+                <a:extLst>
+                  <a:ext uri="{0D108BD9-81ED-4DB2-BD59-A6C34878D82A}">
+                    <a16:rowId xmlns:a16="http://schemas.microsoft.com/office/drawing/2014/main" val="1758763019"/>
+                  </a:ext>
+                </a:extLst>
+              </a:tr>
+              <a:tr h="370840">
+                <a:tc>
+                  <a:txBody>
+                    <a:bodyPr/>
+                    <a:lstStyle/>
+                    <a:p>
+                      <a:endParaRPr lang="ru-RU" dirty="0"/>
+                    </a:p>
+                  </a:txBody>
+                  <a:tcPr/>
+                </a:tc>
+                <a:tc>
+                  <a:txBody>
+                    <a:bodyPr/>
+                    <a:lstStyle/>
+                    <a:p>
+                      <a:pPr algn="ctr" fontAlgn="ctr"/>
+                      <a:endParaRPr lang="ru-RU" sz="1100" b="1" i="0" u="none" strike="noStrike">
+                        <a:solidFill>
+                          <a:srgbClr val="000000"/>
+                        </a:solidFill>
+                        <a:effectLst/>
+                        <a:latin typeface="Calibri" panose="020F0502020204030204" pitchFamily="34" charset="0"/>
+                      </a:endParaRPr>
+                    </a:p>
+                  </a:txBody>
+                  <a:tcPr marL="7620" marR="7620" marT="7620" marB="0" anchor="ctr"/>
+                </a:tc>
+                <a:tc>
+                  <a:txBody>
+                    <a:bodyPr/>
+                    <a:lstStyle/>
+                    <a:p>
+                      <a:pPr algn="ctr" fontAlgn="ctr"/>
+                      <a:r>
+                        <a:rPr lang="ru-RU" sz="1100" b="0" i="0" u="none" strike="noStrike">
+                          <a:solidFill>
+                            <a:srgbClr val="000000"/>
+                          </a:solidFill>
+                          <a:effectLst/>
+                          <a:latin typeface="Calibri" panose="020F0502020204030204" pitchFamily="34" charset="0"/>
+                        </a:rPr>
+                        <a:t>3</a:t>
+                      </a:r>
+                    </a:p>
+                  </a:txBody>
+                  <a:tcPr marL="7620" marR="7620" marT="7620" marB="0" anchor="ctr"/>
+                </a:tc>
+                <a:tc>
+                  <a:txBody>
+                    <a:bodyPr/>
+                    <a:lstStyle/>
+                    <a:p>
+                      <a:endParaRPr lang="ru-RU"/>
+                    </a:p>
+                  </a:txBody>
+                  <a:tcPr/>
+                </a:tc>
+                <a:tc>
+                  <a:txBody>
+                    <a:bodyPr/>
+                    <a:lstStyle/>
+                    <a:p>
+                      <a:endParaRPr lang="ru-RU"/>
+                    </a:p>
+                  </a:txBody>
+                  <a:tcPr/>
+                </a:tc>
+                <a:tc>
+                  <a:txBody>
+                    <a:bodyPr/>
+                    <a:lstStyle/>
+                    <a:p>
+                      <a:endParaRPr lang="ru-RU"/>
+                    </a:p>
+                  </a:txBody>
+                  <a:tcPr/>
+                </a:tc>
+                <a:tc>
+                  <a:txBody>
+                    <a:bodyPr/>
+                    <a:lstStyle/>
+                    <a:p>
+                      <a:endParaRPr lang="ru-RU"/>
+                    </a:p>
+                  </a:txBody>
+                  <a:tcPr/>
+                </a:tc>
+                <a:tc>
+                  <a:txBody>
+                    <a:bodyPr/>
+                    <a:lstStyle/>
+                    <a:p>
+                      <a:endParaRPr lang="ru-RU"/>
+                    </a:p>
+                  </a:txBody>
+                  <a:tcPr/>
+                </a:tc>
+                <a:tc>
+                  <a:txBody>
+                    <a:bodyPr/>
+                    <a:lstStyle/>
+                    <a:p>
+                      <a:endParaRPr lang="ru-RU" dirty="0"/>
+                    </a:p>
+                  </a:txBody>
+                  <a:tcPr/>
+                </a:tc>
+                <a:extLst>
+                  <a:ext uri="{0D108BD9-81ED-4DB2-BD59-A6C34878D82A}">
+                    <a16:rowId xmlns:a16="http://schemas.microsoft.com/office/drawing/2014/main" val="2135635359"/>
+                  </a:ext>
+                </a:extLst>
+              </a:tr>
+              <a:tr h="370840">
+                <a:tc>
+                  <a:txBody>
+                    <a:bodyPr/>
+                    <a:lstStyle/>
+                    <a:p>
+                      <a:endParaRPr lang="ru-RU" dirty="0"/>
+                    </a:p>
+                  </a:txBody>
+                  <a:tcPr/>
+                </a:tc>
+                <a:tc>
+                  <a:txBody>
+                    <a:bodyPr/>
+                    <a:lstStyle/>
+                    <a:p>
+                      <a:pPr algn="ctr" fontAlgn="ctr"/>
+                      <a:r>
+                        <a:rPr lang="ru-RU" sz="1100" b="1" i="0" u="none" strike="noStrike">
+                          <a:solidFill>
+                            <a:srgbClr val="000000"/>
+                          </a:solidFill>
+                          <a:effectLst/>
+                          <a:latin typeface="Calibri" panose="020F0502020204030204" pitchFamily="34" charset="0"/>
+                        </a:rPr>
+                        <a:t> </a:t>
+                      </a:r>
+                    </a:p>
+                  </a:txBody>
+                  <a:tcPr marL="7620" marR="7620" marT="7620" marB="0" anchor="ctr"/>
+                </a:tc>
+                <a:tc>
+                  <a:txBody>
+                    <a:bodyPr/>
+                    <a:lstStyle/>
+                    <a:p>
+                      <a:pPr algn="ctr" fontAlgn="ctr"/>
+                      <a:r>
+                        <a:rPr lang="ru-RU" sz="1100" b="0" i="0" u="none" strike="noStrike">
+                          <a:solidFill>
+                            <a:srgbClr val="000000"/>
+                          </a:solidFill>
+                          <a:effectLst/>
+                          <a:latin typeface="Calibri" panose="020F0502020204030204" pitchFamily="34" charset="0"/>
+                        </a:rPr>
+                        <a:t>4</a:t>
+                      </a:r>
+                    </a:p>
+                  </a:txBody>
+                  <a:tcPr marL="7620" marR="7620" marT="7620" marB="0" anchor="ctr"/>
+                </a:tc>
+                <a:tc>
+                  <a:txBody>
+                    <a:bodyPr/>
+                    <a:lstStyle/>
+                    <a:p>
+                      <a:endParaRPr lang="ru-RU"/>
+                    </a:p>
+                  </a:txBody>
+                  <a:tcPr/>
+                </a:tc>
+                <a:tc>
+                  <a:txBody>
+                    <a:bodyPr/>
+                    <a:lstStyle/>
+                    <a:p>
+                      <a:endParaRPr lang="ru-RU"/>
+                    </a:p>
+                  </a:txBody>
+                  <a:tcPr/>
+                </a:tc>
+                <a:tc>
+                  <a:txBody>
+                    <a:bodyPr/>
+                    <a:lstStyle/>
+                    <a:p>
+                      <a:endParaRPr lang="ru-RU"/>
+                    </a:p>
+                  </a:txBody>
+                  <a:tcPr/>
+                </a:tc>
+                <a:tc>
+                  <a:txBody>
+                    <a:bodyPr/>
+                    <a:lstStyle/>
+                    <a:p>
+                      <a:endParaRPr lang="ru-RU"/>
+                    </a:p>
+                  </a:txBody>
+                  <a:tcPr/>
+                </a:tc>
+                <a:tc>
+                  <a:txBody>
+                    <a:bodyPr/>
+                    <a:lstStyle/>
+                    <a:p>
+                      <a:endParaRPr lang="ru-RU"/>
+                    </a:p>
+                  </a:txBody>
+                  <a:tcPr/>
+                </a:tc>
+                <a:tc>
+                  <a:txBody>
+                    <a:bodyPr/>
+                    <a:lstStyle/>
+                    <a:p>
+                      <a:endParaRPr lang="ru-RU" dirty="0"/>
+                    </a:p>
+                  </a:txBody>
+                  <a:tcPr/>
+                </a:tc>
+                <a:extLst>
+                  <a:ext uri="{0D108BD9-81ED-4DB2-BD59-A6C34878D82A}">
+                    <a16:rowId xmlns:a16="http://schemas.microsoft.com/office/drawing/2014/main" val="1530562939"/>
+                  </a:ext>
+                </a:extLst>
+              </a:tr>
+              <a:tr h="370840">
+                <a:tc>
+                  <a:txBody>
+                    <a:bodyPr/>
+                    <a:lstStyle/>
+                    <a:p>
+                      <a:endParaRPr lang="ru-RU" dirty="0"/>
+                    </a:p>
+                  </a:txBody>
+                  <a:tcPr/>
+                </a:tc>
+                <a:tc>
+                  <a:txBody>
+                    <a:bodyPr/>
+                    <a:lstStyle/>
+                    <a:p>
+                      <a:pPr algn="ctr" fontAlgn="ctr"/>
+                      <a:r>
+                        <a:rPr lang="ru-RU" sz="1100" b="1" i="0" u="none" strike="noStrike">
+                          <a:solidFill>
+                            <a:srgbClr val="000000"/>
+                          </a:solidFill>
+                          <a:effectLst/>
+                          <a:latin typeface="Calibri" panose="020F0502020204030204" pitchFamily="34" charset="0"/>
+                        </a:rPr>
+                        <a:t>6</a:t>
+                      </a:r>
+                    </a:p>
+                  </a:txBody>
+                  <a:tcPr marL="7620" marR="7620" marT="7620" marB="0" anchor="ctr"/>
+                </a:tc>
+                <a:tc>
+                  <a:txBody>
+                    <a:bodyPr/>
+                    <a:lstStyle/>
+                    <a:p>
+                      <a:pPr algn="ctr" fontAlgn="ctr"/>
+                      <a:r>
+                        <a:rPr lang="ru-RU" sz="1100" b="0" i="0" u="none" strike="noStrike">
+                          <a:solidFill>
+                            <a:srgbClr val="000000"/>
+                          </a:solidFill>
+                          <a:effectLst/>
+                          <a:latin typeface="Calibri" panose="020F0502020204030204" pitchFamily="34" charset="0"/>
+                        </a:rPr>
+                        <a:t>1</a:t>
+                      </a:r>
+                    </a:p>
+                  </a:txBody>
+                  <a:tcPr marL="7620" marR="7620" marT="7620" marB="0" anchor="ctr"/>
+                </a:tc>
+                <a:tc>
+                  <a:txBody>
+                    <a:bodyPr/>
+                    <a:lstStyle/>
+                    <a:p>
+                      <a:endParaRPr lang="ru-RU"/>
+                    </a:p>
+                  </a:txBody>
+                  <a:tcPr/>
+                </a:tc>
+                <a:tc>
+                  <a:txBody>
+                    <a:bodyPr/>
+                    <a:lstStyle/>
+                    <a:p>
+                      <a:endParaRPr lang="ru-RU"/>
+                    </a:p>
+                  </a:txBody>
+                  <a:tcPr/>
+                </a:tc>
+                <a:tc>
+                  <a:txBody>
+                    <a:bodyPr/>
+                    <a:lstStyle/>
+                    <a:p>
+                      <a:endParaRPr lang="ru-RU"/>
+                    </a:p>
+                  </a:txBody>
+                  <a:tcPr/>
+                </a:tc>
+                <a:tc>
+                  <a:txBody>
+                    <a:bodyPr/>
+                    <a:lstStyle/>
+                    <a:p>
+                      <a:endParaRPr lang="ru-RU"/>
+                    </a:p>
+                  </a:txBody>
+                  <a:tcPr/>
+                </a:tc>
+                <a:tc>
+                  <a:txBody>
+                    <a:bodyPr/>
+                    <a:lstStyle/>
+                    <a:p>
+                      <a:endParaRPr lang="ru-RU"/>
+                    </a:p>
+                  </a:txBody>
+                  <a:tcPr/>
+                </a:tc>
+                <a:tc>
+                  <a:txBody>
+                    <a:bodyPr/>
+                    <a:lstStyle/>
+                    <a:p>
+                      <a:endParaRPr lang="ru-RU" dirty="0"/>
+                    </a:p>
+                  </a:txBody>
+                  <a:tcPr/>
+                </a:tc>
+                <a:extLst>
+                  <a:ext uri="{0D108BD9-81ED-4DB2-BD59-A6C34878D82A}">
+                    <a16:rowId xmlns:a16="http://schemas.microsoft.com/office/drawing/2014/main" val="867368809"/>
+                  </a:ext>
+                </a:extLst>
+              </a:tr>
+              <a:tr h="370840">
+                <a:tc>
+                  <a:txBody>
+                    <a:bodyPr/>
+                    <a:lstStyle/>
+                    <a:p>
+                      <a:endParaRPr lang="ru-RU" dirty="0"/>
+                    </a:p>
+                  </a:txBody>
+                  <a:tcPr/>
+                </a:tc>
+                <a:tc>
+                  <a:txBody>
+                    <a:bodyPr/>
+                    <a:lstStyle/>
+                    <a:p>
+                      <a:pPr algn="ctr" fontAlgn="ctr"/>
+                      <a:endParaRPr lang="ru-RU" sz="1100" b="1" i="0" u="none" strike="noStrike">
+                        <a:solidFill>
+                          <a:srgbClr val="000000"/>
+                        </a:solidFill>
+                        <a:effectLst/>
+                        <a:latin typeface="Calibri" panose="020F0502020204030204" pitchFamily="34" charset="0"/>
+                      </a:endParaRPr>
+                    </a:p>
+                  </a:txBody>
+                  <a:tcPr marL="7620" marR="7620" marT="7620" marB="0" anchor="ctr"/>
+                </a:tc>
+                <a:tc>
+                  <a:txBody>
+                    <a:bodyPr/>
+                    <a:lstStyle/>
+                    <a:p>
+                      <a:pPr algn="ctr" fontAlgn="ctr"/>
+                      <a:r>
+                        <a:rPr lang="ru-RU" sz="1100" b="0" i="0" u="none" strike="noStrike">
+                          <a:solidFill>
+                            <a:srgbClr val="000000"/>
+                          </a:solidFill>
+                          <a:effectLst/>
+                          <a:latin typeface="Calibri" panose="020F0502020204030204" pitchFamily="34" charset="0"/>
+                        </a:rPr>
+                        <a:t>3</a:t>
+                      </a:r>
+                    </a:p>
+                  </a:txBody>
+                  <a:tcPr marL="7620" marR="7620" marT="7620" marB="0" anchor="ctr"/>
+                </a:tc>
+                <a:tc>
+                  <a:txBody>
+                    <a:bodyPr/>
+                    <a:lstStyle/>
+                    <a:p>
+                      <a:endParaRPr lang="ru-RU"/>
+                    </a:p>
+                  </a:txBody>
+                  <a:tcPr/>
+                </a:tc>
+                <a:tc>
+                  <a:txBody>
+                    <a:bodyPr/>
+                    <a:lstStyle/>
+                    <a:p>
+                      <a:endParaRPr lang="ru-RU"/>
+                    </a:p>
+                  </a:txBody>
+                  <a:tcPr/>
+                </a:tc>
+                <a:tc>
+                  <a:txBody>
+                    <a:bodyPr/>
+                    <a:lstStyle/>
+                    <a:p>
+                      <a:endParaRPr lang="ru-RU"/>
+                    </a:p>
+                  </a:txBody>
+                  <a:tcPr/>
+                </a:tc>
+                <a:tc>
+                  <a:txBody>
+                    <a:bodyPr/>
+                    <a:lstStyle/>
+                    <a:p>
+                      <a:endParaRPr lang="ru-RU"/>
+                    </a:p>
+                  </a:txBody>
+                  <a:tcPr/>
+                </a:tc>
+                <a:tc>
+                  <a:txBody>
+                    <a:bodyPr/>
+                    <a:lstStyle/>
+                    <a:p>
+                      <a:endParaRPr lang="ru-RU"/>
+                    </a:p>
+                  </a:txBody>
+                  <a:tcPr/>
+                </a:tc>
+                <a:tc>
+                  <a:txBody>
+                    <a:bodyPr/>
+                    <a:lstStyle/>
+                    <a:p>
+                      <a:endParaRPr lang="ru-RU" dirty="0"/>
+                    </a:p>
+                  </a:txBody>
+                  <a:tcPr/>
+                </a:tc>
+                <a:extLst>
+                  <a:ext uri="{0D108BD9-81ED-4DB2-BD59-A6C34878D82A}">
+                    <a16:rowId xmlns:a16="http://schemas.microsoft.com/office/drawing/2014/main" val="694581055"/>
+                  </a:ext>
+                </a:extLst>
+              </a:tr>
+              <a:tr h="370840">
+                <a:tc>
+                  <a:txBody>
+                    <a:bodyPr/>
+                    <a:lstStyle/>
+                    <a:p>
+                      <a:endParaRPr lang="ru-RU" dirty="0"/>
+                    </a:p>
+                  </a:txBody>
+                  <a:tcPr/>
+                </a:tc>
+                <a:tc>
+                  <a:txBody>
+                    <a:bodyPr/>
+                    <a:lstStyle/>
+                    <a:p>
+                      <a:pPr algn="ctr" fontAlgn="ctr"/>
+                      <a:r>
+                        <a:rPr lang="ru-RU" sz="1100" b="1" i="0" u="none" strike="noStrike">
+                          <a:solidFill>
+                            <a:srgbClr val="000000"/>
+                          </a:solidFill>
+                          <a:effectLst/>
+                          <a:latin typeface="Calibri" panose="020F0502020204030204" pitchFamily="34" charset="0"/>
+                        </a:rPr>
+                        <a:t> </a:t>
+                      </a:r>
+                    </a:p>
+                  </a:txBody>
+                  <a:tcPr marL="7620" marR="7620" marT="7620" marB="0" anchor="ctr"/>
+                </a:tc>
+                <a:tc>
+                  <a:txBody>
+                    <a:bodyPr/>
+                    <a:lstStyle/>
+                    <a:p>
+                      <a:pPr algn="ctr" fontAlgn="ctr"/>
+                      <a:r>
+                        <a:rPr lang="ru-RU" sz="1100" b="0" i="0" u="none" strike="noStrike">
+                          <a:solidFill>
+                            <a:srgbClr val="000000"/>
+                          </a:solidFill>
+                          <a:effectLst/>
+                          <a:latin typeface="Calibri" panose="020F0502020204030204" pitchFamily="34" charset="0"/>
+                        </a:rPr>
+                        <a:t>5</a:t>
+                      </a:r>
+                    </a:p>
+                  </a:txBody>
+                  <a:tcPr marL="7620" marR="7620" marT="7620" marB="0" anchor="ctr"/>
+                </a:tc>
+                <a:tc>
+                  <a:txBody>
+                    <a:bodyPr/>
+                    <a:lstStyle/>
+                    <a:p>
+                      <a:endParaRPr lang="ru-RU"/>
+                    </a:p>
+                  </a:txBody>
+                  <a:tcPr/>
+                </a:tc>
+                <a:tc>
+                  <a:txBody>
+                    <a:bodyPr/>
+                    <a:lstStyle/>
+                    <a:p>
+                      <a:endParaRPr lang="ru-RU"/>
+                    </a:p>
+                  </a:txBody>
+                  <a:tcPr/>
+                </a:tc>
+                <a:tc>
+                  <a:txBody>
+                    <a:bodyPr/>
+                    <a:lstStyle/>
+                    <a:p>
+                      <a:endParaRPr lang="ru-RU"/>
+                    </a:p>
+                  </a:txBody>
+                  <a:tcPr/>
+                </a:tc>
+                <a:tc>
+                  <a:txBody>
+                    <a:bodyPr/>
+                    <a:lstStyle/>
+                    <a:p>
+                      <a:endParaRPr lang="ru-RU"/>
+                    </a:p>
+                  </a:txBody>
+                  <a:tcPr/>
+                </a:tc>
+                <a:tc>
+                  <a:txBody>
+                    <a:bodyPr/>
+                    <a:lstStyle/>
+                    <a:p>
+                      <a:endParaRPr lang="ru-RU"/>
+                    </a:p>
+                  </a:txBody>
+                  <a:tcPr/>
+                </a:tc>
+                <a:tc>
+                  <a:txBody>
+                    <a:bodyPr/>
+                    <a:lstStyle/>
+                    <a:p>
+                      <a:endParaRPr lang="ru-RU" dirty="0"/>
+                    </a:p>
+                  </a:txBody>
+                  <a:tcPr/>
+                </a:tc>
+                <a:extLst>
+                  <a:ext uri="{0D108BD9-81ED-4DB2-BD59-A6C34878D82A}">
+                    <a16:rowId xmlns:a16="http://schemas.microsoft.com/office/drawing/2014/main" val="2733367438"/>
+                  </a:ext>
+                </a:extLst>
+              </a:tr>
+              <a:tr h="370840">
+                <a:tc>
+                  <a:txBody>
+                    <a:bodyPr/>
+                    <a:lstStyle/>
+                    <a:p>
+                      <a:endParaRPr lang="ru-RU" dirty="0"/>
+                    </a:p>
+                  </a:txBody>
+                  <a:tcPr/>
+                </a:tc>
+                <a:tc>
+                  <a:txBody>
+                    <a:bodyPr/>
+                    <a:lstStyle/>
+                    <a:p>
+                      <a:pPr algn="ctr" fontAlgn="ctr"/>
+                      <a:r>
+                        <a:rPr lang="ru-RU" sz="1100" b="1" i="0" u="none" strike="noStrike">
+                          <a:solidFill>
+                            <a:srgbClr val="000000"/>
+                          </a:solidFill>
+                          <a:effectLst/>
+                          <a:latin typeface="Calibri" panose="020F0502020204030204" pitchFamily="34" charset="0"/>
+                        </a:rPr>
+                        <a:t>7</a:t>
+                      </a:r>
+                    </a:p>
+                  </a:txBody>
+                  <a:tcPr marL="7620" marR="7620" marT="7620" marB="0" anchor="ctr"/>
+                </a:tc>
+                <a:tc>
+                  <a:txBody>
+                    <a:bodyPr/>
+                    <a:lstStyle/>
+                    <a:p>
+                      <a:pPr algn="ctr" fontAlgn="ctr"/>
+                      <a:r>
+                        <a:rPr lang="ru-RU" sz="1100" b="0" i="0" u="none" strike="noStrike">
+                          <a:solidFill>
+                            <a:srgbClr val="000000"/>
+                          </a:solidFill>
+                          <a:effectLst/>
+                          <a:latin typeface="Calibri" panose="020F0502020204030204" pitchFamily="34" charset="0"/>
+                        </a:rPr>
+                        <a:t>1</a:t>
+                      </a:r>
+                    </a:p>
+                  </a:txBody>
+                  <a:tcPr marL="7620" marR="7620" marT="7620" marB="0" anchor="ctr"/>
+                </a:tc>
+                <a:tc>
+                  <a:txBody>
+                    <a:bodyPr/>
+                    <a:lstStyle/>
+                    <a:p>
+                      <a:endParaRPr lang="ru-RU"/>
+                    </a:p>
+                  </a:txBody>
+                  <a:tcPr/>
+                </a:tc>
+                <a:tc>
+                  <a:txBody>
+                    <a:bodyPr/>
+                    <a:lstStyle/>
+                    <a:p>
+                      <a:endParaRPr lang="ru-RU"/>
+                    </a:p>
+                  </a:txBody>
+                  <a:tcPr/>
+                </a:tc>
+                <a:tc>
+                  <a:txBody>
+                    <a:bodyPr/>
+                    <a:lstStyle/>
+                    <a:p>
+                      <a:endParaRPr lang="ru-RU"/>
+                    </a:p>
+                  </a:txBody>
+                  <a:tcPr/>
+                </a:tc>
+                <a:tc>
+                  <a:txBody>
+                    <a:bodyPr/>
+                    <a:lstStyle/>
+                    <a:p>
+                      <a:endParaRPr lang="ru-RU"/>
+                    </a:p>
+                  </a:txBody>
+                  <a:tcPr/>
+                </a:tc>
+                <a:tc>
+                  <a:txBody>
+                    <a:bodyPr/>
+                    <a:lstStyle/>
+                    <a:p>
+                      <a:endParaRPr lang="ru-RU"/>
+                    </a:p>
+                  </a:txBody>
+                  <a:tcPr/>
+                </a:tc>
+                <a:tc>
+                  <a:txBody>
+                    <a:bodyPr/>
+                    <a:lstStyle/>
+                    <a:p>
+                      <a:endParaRPr lang="ru-RU" dirty="0"/>
+                    </a:p>
+                  </a:txBody>
+                  <a:tcPr/>
+                </a:tc>
+                <a:extLst>
+                  <a:ext uri="{0D108BD9-81ED-4DB2-BD59-A6C34878D82A}">
+                    <a16:rowId xmlns:a16="http://schemas.microsoft.com/office/drawing/2014/main" val="3064148532"/>
+                  </a:ext>
+                </a:extLst>
+              </a:tr>
+              <a:tr h="370840">
+                <a:tc>
+                  <a:txBody>
+                    <a:bodyPr/>
+                    <a:lstStyle/>
+                    <a:p>
+                      <a:endParaRPr lang="ru-RU" dirty="0"/>
+                    </a:p>
+                  </a:txBody>
+                  <a:tcPr/>
+                </a:tc>
+                <a:tc>
+                  <a:txBody>
+                    <a:bodyPr/>
+                    <a:lstStyle/>
+                    <a:p>
+                      <a:pPr algn="ctr" fontAlgn="ctr"/>
+                      <a:endParaRPr lang="ru-RU" sz="1100" b="1" i="0" u="none" strike="noStrike">
+                        <a:solidFill>
+                          <a:srgbClr val="000000"/>
+                        </a:solidFill>
+                        <a:effectLst/>
+                        <a:latin typeface="Calibri" panose="020F0502020204030204" pitchFamily="34" charset="0"/>
+                      </a:endParaRPr>
+                    </a:p>
+                  </a:txBody>
+                  <a:tcPr marL="7620" marR="7620" marT="7620" marB="0" anchor="ctr"/>
+                </a:tc>
+                <a:tc>
+                  <a:txBody>
+                    <a:bodyPr/>
+                    <a:lstStyle/>
+                    <a:p>
+                      <a:pPr algn="ctr" fontAlgn="ctr"/>
+                      <a:r>
+                        <a:rPr lang="ru-RU" sz="1100" b="0" i="0" u="none" strike="noStrike">
+                          <a:solidFill>
+                            <a:srgbClr val="000000"/>
+                          </a:solidFill>
+                          <a:effectLst/>
+                          <a:latin typeface="Calibri" panose="020F0502020204030204" pitchFamily="34" charset="0"/>
+                        </a:rPr>
+                        <a:t>4</a:t>
+                      </a:r>
+                    </a:p>
+                  </a:txBody>
+                  <a:tcPr marL="7620" marR="7620" marT="7620" marB="0" anchor="ctr"/>
+                </a:tc>
+                <a:tc>
+                  <a:txBody>
+                    <a:bodyPr/>
+                    <a:lstStyle/>
+                    <a:p>
+                      <a:endParaRPr lang="ru-RU"/>
+                    </a:p>
+                  </a:txBody>
+                  <a:tcPr/>
+                </a:tc>
+                <a:tc>
+                  <a:txBody>
+                    <a:bodyPr/>
+                    <a:lstStyle/>
+                    <a:p>
+                      <a:endParaRPr lang="ru-RU"/>
+                    </a:p>
+                  </a:txBody>
+                  <a:tcPr/>
+                </a:tc>
+                <a:tc>
+                  <a:txBody>
+                    <a:bodyPr/>
+                    <a:lstStyle/>
+                    <a:p>
+                      <a:endParaRPr lang="ru-RU"/>
+                    </a:p>
+                  </a:txBody>
+                  <a:tcPr/>
+                </a:tc>
+                <a:tc>
+                  <a:txBody>
+                    <a:bodyPr/>
+                    <a:lstStyle/>
+                    <a:p>
+                      <a:endParaRPr lang="ru-RU"/>
+                    </a:p>
+                  </a:txBody>
+                  <a:tcPr/>
+                </a:tc>
+                <a:tc>
+                  <a:txBody>
+                    <a:bodyPr/>
+                    <a:lstStyle/>
+                    <a:p>
+                      <a:endParaRPr lang="ru-RU"/>
+                    </a:p>
+                  </a:txBody>
+                  <a:tcPr/>
+                </a:tc>
+                <a:tc>
+                  <a:txBody>
+                    <a:bodyPr/>
+                    <a:lstStyle/>
+                    <a:p>
+                      <a:endParaRPr lang="ru-RU" dirty="0"/>
+                    </a:p>
+                  </a:txBody>
+                  <a:tcPr/>
+                </a:tc>
+                <a:extLst>
+                  <a:ext uri="{0D108BD9-81ED-4DB2-BD59-A6C34878D82A}">
+                    <a16:rowId xmlns:a16="http://schemas.microsoft.com/office/drawing/2014/main" val="1240929599"/>
+                  </a:ext>
+                </a:extLst>
+              </a:tr>
+              <a:tr h="370840">
+                <a:tc>
+                  <a:txBody>
+                    <a:bodyPr/>
+                    <a:lstStyle/>
+                    <a:p>
+                      <a:endParaRPr lang="ru-RU" dirty="0"/>
+                    </a:p>
+                  </a:txBody>
+                  <a:tcPr/>
+                </a:tc>
+                <a:tc>
+                  <a:txBody>
+                    <a:bodyPr/>
+                    <a:lstStyle/>
+                    <a:p>
+                      <a:pPr algn="ctr" fontAlgn="ctr"/>
+                      <a:r>
+                        <a:rPr lang="ru-RU" sz="1100" b="1" i="0" u="none" strike="noStrike">
+                          <a:solidFill>
+                            <a:srgbClr val="000000"/>
+                          </a:solidFill>
+                          <a:effectLst/>
+                          <a:latin typeface="Calibri" panose="020F0502020204030204" pitchFamily="34" charset="0"/>
+                        </a:rPr>
+                        <a:t> </a:t>
+                      </a:r>
+                    </a:p>
+                  </a:txBody>
+                  <a:tcPr marL="7620" marR="7620" marT="7620" marB="0" anchor="ctr"/>
+                </a:tc>
+                <a:tc>
+                  <a:txBody>
+                    <a:bodyPr/>
+                    <a:lstStyle/>
+                    <a:p>
+                      <a:pPr algn="ctr" fontAlgn="ctr"/>
+                      <a:r>
+                        <a:rPr lang="ru-RU" sz="1100" b="0" i="0" u="none" strike="noStrike">
+                          <a:solidFill>
+                            <a:srgbClr val="000000"/>
+                          </a:solidFill>
+                          <a:effectLst/>
+                          <a:latin typeface="Calibri" panose="020F0502020204030204" pitchFamily="34" charset="0"/>
+                        </a:rPr>
+                        <a:t>5</a:t>
+                      </a:r>
+                    </a:p>
+                  </a:txBody>
+                  <a:tcPr marL="7620" marR="7620" marT="7620" marB="0" anchor="ctr"/>
+                </a:tc>
+                <a:tc>
+                  <a:txBody>
+                    <a:bodyPr/>
+                    <a:lstStyle/>
+                    <a:p>
+                      <a:endParaRPr lang="ru-RU"/>
+                    </a:p>
+                  </a:txBody>
+                  <a:tcPr/>
+                </a:tc>
+                <a:tc>
+                  <a:txBody>
+                    <a:bodyPr/>
+                    <a:lstStyle/>
+                    <a:p>
+                      <a:endParaRPr lang="ru-RU"/>
+                    </a:p>
+                  </a:txBody>
+                  <a:tcPr/>
+                </a:tc>
+                <a:tc>
+                  <a:txBody>
+                    <a:bodyPr/>
+                    <a:lstStyle/>
+                    <a:p>
+                      <a:endParaRPr lang="ru-RU"/>
+                    </a:p>
+                  </a:txBody>
+                  <a:tcPr/>
+                </a:tc>
+                <a:tc>
+                  <a:txBody>
+                    <a:bodyPr/>
+                    <a:lstStyle/>
+                    <a:p>
+                      <a:endParaRPr lang="ru-RU"/>
+                    </a:p>
+                  </a:txBody>
+                  <a:tcPr/>
+                </a:tc>
+                <a:tc>
+                  <a:txBody>
+                    <a:bodyPr/>
+                    <a:lstStyle/>
+                    <a:p>
+                      <a:endParaRPr lang="ru-RU"/>
+                    </a:p>
+                  </a:txBody>
+                  <a:tcPr/>
+                </a:tc>
+                <a:tc>
+                  <a:txBody>
+                    <a:bodyPr/>
+                    <a:lstStyle/>
+                    <a:p>
+                      <a:endParaRPr lang="ru-RU" dirty="0"/>
+                    </a:p>
+                  </a:txBody>
+                  <a:tcPr/>
+                </a:tc>
+                <a:extLst>
+                  <a:ext uri="{0D108BD9-81ED-4DB2-BD59-A6C34878D82A}">
+                    <a16:rowId xmlns:a16="http://schemas.microsoft.com/office/drawing/2014/main" val="1881273035"/>
+                  </a:ext>
+                </a:extLst>
+              </a:tr>
+              <a:tr h="370840">
+                <a:tc>
+                  <a:txBody>
+                    <a:bodyPr/>
+                    <a:lstStyle/>
+                    <a:p>
+                      <a:endParaRPr lang="ru-RU" dirty="0"/>
+                    </a:p>
+                  </a:txBody>
+                  <a:tcPr/>
+                </a:tc>
+                <a:tc>
+                  <a:txBody>
+                    <a:bodyPr/>
+                    <a:lstStyle/>
+                    <a:p>
+                      <a:pPr algn="ctr" fontAlgn="ctr"/>
+                      <a:r>
+                        <a:rPr lang="ru-RU" sz="1100" b="1" i="0" u="none" strike="noStrike">
+                          <a:solidFill>
+                            <a:srgbClr val="000000"/>
+                          </a:solidFill>
+                          <a:effectLst/>
+                          <a:latin typeface="Calibri" panose="020F0502020204030204" pitchFamily="34" charset="0"/>
+                        </a:rPr>
+                        <a:t>8</a:t>
+                      </a:r>
+                    </a:p>
+                  </a:txBody>
+                  <a:tcPr marL="7620" marR="7620" marT="7620" marB="0" anchor="ctr"/>
+                </a:tc>
+                <a:tc>
+                  <a:txBody>
+                    <a:bodyPr/>
+                    <a:lstStyle/>
+                    <a:p>
+                      <a:pPr algn="ctr" fontAlgn="ctr"/>
+                      <a:r>
+                        <a:rPr lang="ru-RU" sz="1100" b="0" i="0" u="none" strike="noStrike">
+                          <a:solidFill>
+                            <a:srgbClr val="000000"/>
+                          </a:solidFill>
+                          <a:effectLst/>
+                          <a:latin typeface="Calibri" panose="020F0502020204030204" pitchFamily="34" charset="0"/>
+                        </a:rPr>
+                        <a:t>1</a:t>
+                      </a:r>
+                    </a:p>
+                  </a:txBody>
+                  <a:tcPr marL="7620" marR="7620" marT="7620" marB="0" anchor="ctr"/>
+                </a:tc>
+                <a:tc>
+                  <a:txBody>
+                    <a:bodyPr/>
+                    <a:lstStyle/>
+                    <a:p>
+                      <a:endParaRPr lang="ru-RU"/>
+                    </a:p>
+                  </a:txBody>
+                  <a:tcPr/>
+                </a:tc>
+                <a:tc>
+                  <a:txBody>
+                    <a:bodyPr/>
+                    <a:lstStyle/>
+                    <a:p>
+                      <a:endParaRPr lang="ru-RU"/>
+                    </a:p>
+                  </a:txBody>
+                  <a:tcPr/>
+                </a:tc>
+                <a:tc>
+                  <a:txBody>
+                    <a:bodyPr/>
+                    <a:lstStyle/>
+                    <a:p>
+                      <a:endParaRPr lang="ru-RU"/>
+                    </a:p>
+                  </a:txBody>
+                  <a:tcPr/>
+                </a:tc>
+                <a:tc>
+                  <a:txBody>
+                    <a:bodyPr/>
+                    <a:lstStyle/>
+                    <a:p>
+                      <a:endParaRPr lang="ru-RU"/>
+                    </a:p>
+                  </a:txBody>
+                  <a:tcPr/>
+                </a:tc>
+                <a:tc>
+                  <a:txBody>
+                    <a:bodyPr/>
+                    <a:lstStyle/>
+                    <a:p>
+                      <a:endParaRPr lang="ru-RU"/>
+                    </a:p>
+                  </a:txBody>
+                  <a:tcPr/>
+                </a:tc>
+                <a:tc>
+                  <a:txBody>
+                    <a:bodyPr/>
+                    <a:lstStyle/>
+                    <a:p>
+                      <a:endParaRPr lang="ru-RU" dirty="0"/>
+                    </a:p>
+                  </a:txBody>
+                  <a:tcPr/>
+                </a:tc>
+                <a:extLst>
+                  <a:ext uri="{0D108BD9-81ED-4DB2-BD59-A6C34878D82A}">
+                    <a16:rowId xmlns:a16="http://schemas.microsoft.com/office/drawing/2014/main" val="2601314691"/>
+                  </a:ext>
+                </a:extLst>
+              </a:tr>
+              <a:tr h="370840">
+                <a:tc>
+                  <a:txBody>
+                    <a:bodyPr/>
+                    <a:lstStyle/>
+                    <a:p>
+                      <a:endParaRPr lang="ru-RU" dirty="0"/>
+                    </a:p>
+                  </a:txBody>
+                  <a:tcPr/>
+                </a:tc>
+                <a:tc>
+                  <a:txBody>
+                    <a:bodyPr/>
+                    <a:lstStyle/>
+                    <a:p>
+                      <a:pPr algn="ctr" fontAlgn="ctr"/>
+                      <a:r>
+                        <a:rPr lang="ru-RU" sz="1100" b="1" i="0" u="none" strike="noStrike">
+                          <a:solidFill>
+                            <a:srgbClr val="000000"/>
+                          </a:solidFill>
+                          <a:effectLst/>
+                          <a:latin typeface="Calibri" panose="020F0502020204030204" pitchFamily="34" charset="0"/>
+                        </a:rPr>
+                        <a:t>9</a:t>
+                      </a:r>
+                    </a:p>
+                  </a:txBody>
+                  <a:tcPr marL="7620" marR="7620" marT="7620" marB="0" anchor="ctr"/>
+                </a:tc>
+                <a:tc>
+                  <a:txBody>
+                    <a:bodyPr/>
+                    <a:lstStyle/>
+                    <a:p>
+                      <a:pPr algn="ctr" fontAlgn="ctr"/>
+                      <a:r>
+                        <a:rPr lang="ru-RU" sz="1100" b="0" i="0" u="none" strike="noStrike">
+                          <a:solidFill>
+                            <a:srgbClr val="000000"/>
+                          </a:solidFill>
+                          <a:effectLst/>
+                          <a:latin typeface="Calibri" panose="020F0502020204030204" pitchFamily="34" charset="0"/>
+                        </a:rPr>
+                        <a:t>2</a:t>
+                      </a:r>
+                    </a:p>
+                  </a:txBody>
+                  <a:tcPr marL="7620" marR="7620" marT="7620" marB="0" anchor="ctr"/>
+                </a:tc>
+                <a:tc>
+                  <a:txBody>
+                    <a:bodyPr/>
+                    <a:lstStyle/>
+                    <a:p>
+                      <a:endParaRPr lang="ru-RU"/>
+                    </a:p>
+                  </a:txBody>
+                  <a:tcPr/>
+                </a:tc>
+                <a:tc>
+                  <a:txBody>
+                    <a:bodyPr/>
+                    <a:lstStyle/>
+                    <a:p>
+                      <a:endParaRPr lang="ru-RU"/>
+                    </a:p>
+                  </a:txBody>
+                  <a:tcPr/>
+                </a:tc>
+                <a:tc>
+                  <a:txBody>
+                    <a:bodyPr/>
+                    <a:lstStyle/>
+                    <a:p>
+                      <a:endParaRPr lang="ru-RU"/>
+                    </a:p>
+                  </a:txBody>
+                  <a:tcPr/>
+                </a:tc>
+                <a:tc>
+                  <a:txBody>
+                    <a:bodyPr/>
+                    <a:lstStyle/>
+                    <a:p>
+                      <a:endParaRPr lang="ru-RU"/>
+                    </a:p>
+                  </a:txBody>
+                  <a:tcPr/>
+                </a:tc>
+                <a:tc>
+                  <a:txBody>
+                    <a:bodyPr/>
+                    <a:lstStyle/>
+                    <a:p>
+                      <a:endParaRPr lang="ru-RU"/>
+                    </a:p>
+                  </a:txBody>
+                  <a:tcPr/>
+                </a:tc>
+                <a:tc>
+                  <a:txBody>
+                    <a:bodyPr/>
+                    <a:lstStyle/>
+                    <a:p>
+                      <a:endParaRPr lang="ru-RU" dirty="0"/>
+                    </a:p>
+                  </a:txBody>
+                  <a:tcPr/>
+                </a:tc>
+                <a:extLst>
+                  <a:ext uri="{0D108BD9-81ED-4DB2-BD59-A6C34878D82A}">
+                    <a16:rowId xmlns:a16="http://schemas.microsoft.com/office/drawing/2014/main" val="1494297606"/>
+                  </a:ext>
+                </a:extLst>
+              </a:tr>
+              <a:tr h="370840">
+                <a:tc>
+                  <a:txBody>
+                    <a:bodyPr/>
+                    <a:lstStyle/>
+                    <a:p>
+                      <a:endParaRPr lang="ru-RU" dirty="0"/>
+                    </a:p>
+                  </a:txBody>
+                  <a:tcPr/>
+                </a:tc>
+                <a:tc>
+                  <a:txBody>
+                    <a:bodyPr/>
+                    <a:lstStyle/>
+                    <a:p>
+                      <a:pPr algn="ctr" fontAlgn="ctr"/>
+                      <a:r>
+                        <a:rPr lang="ru-RU" sz="1100" b="1" i="0" u="none" strike="noStrike">
+                          <a:solidFill>
+                            <a:srgbClr val="000000"/>
+                          </a:solidFill>
+                          <a:effectLst/>
+                          <a:latin typeface="Calibri" panose="020F0502020204030204" pitchFamily="34" charset="0"/>
+                        </a:rPr>
+                        <a:t> </a:t>
+                      </a:r>
+                    </a:p>
+                  </a:txBody>
+                  <a:tcPr marL="7620" marR="7620" marT="7620" marB="0" anchor="ctr"/>
+                </a:tc>
+                <a:tc>
+                  <a:txBody>
+                    <a:bodyPr/>
+                    <a:lstStyle/>
+                    <a:p>
+                      <a:pPr algn="ctr" fontAlgn="ctr"/>
+                      <a:r>
+                        <a:rPr lang="ru-RU" sz="1100" b="0" i="0" u="none" strike="noStrike">
+                          <a:solidFill>
+                            <a:srgbClr val="000000"/>
+                          </a:solidFill>
+                          <a:effectLst/>
+                          <a:latin typeface="Calibri" panose="020F0502020204030204" pitchFamily="34" charset="0"/>
+                        </a:rPr>
+                        <a:t>3</a:t>
+                      </a:r>
+                    </a:p>
+                  </a:txBody>
+                  <a:tcPr marL="7620" marR="7620" marT="7620" marB="0" anchor="ctr"/>
+                </a:tc>
+                <a:tc>
+                  <a:txBody>
+                    <a:bodyPr/>
+                    <a:lstStyle/>
+                    <a:p>
+                      <a:endParaRPr lang="ru-RU"/>
+                    </a:p>
+                  </a:txBody>
+                  <a:tcPr/>
+                </a:tc>
+                <a:tc>
+                  <a:txBody>
+                    <a:bodyPr/>
+                    <a:lstStyle/>
+                    <a:p>
+                      <a:endParaRPr lang="ru-RU"/>
+                    </a:p>
+                  </a:txBody>
+                  <a:tcPr/>
+                </a:tc>
+                <a:tc>
+                  <a:txBody>
+                    <a:bodyPr/>
+                    <a:lstStyle/>
+                    <a:p>
+                      <a:endParaRPr lang="ru-RU"/>
+                    </a:p>
+                  </a:txBody>
+                  <a:tcPr/>
+                </a:tc>
+                <a:tc>
+                  <a:txBody>
+                    <a:bodyPr/>
+                    <a:lstStyle/>
+                    <a:p>
+                      <a:endParaRPr lang="ru-RU"/>
+                    </a:p>
+                  </a:txBody>
+                  <a:tcPr/>
+                </a:tc>
+                <a:tc>
+                  <a:txBody>
+                    <a:bodyPr/>
+                    <a:lstStyle/>
+                    <a:p>
+                      <a:endParaRPr lang="ru-RU"/>
+                    </a:p>
+                  </a:txBody>
+                  <a:tcPr/>
+                </a:tc>
+                <a:tc>
+                  <a:txBody>
+                    <a:bodyPr/>
+                    <a:lstStyle/>
+                    <a:p>
+                      <a:endParaRPr lang="ru-RU" dirty="0"/>
+                    </a:p>
+                  </a:txBody>
+                  <a:tcPr/>
+                </a:tc>
+                <a:extLst>
+                  <a:ext uri="{0D108BD9-81ED-4DB2-BD59-A6C34878D82A}">
+                    <a16:rowId xmlns:a16="http://schemas.microsoft.com/office/drawing/2014/main" val="26432622"/>
+                  </a:ext>
+                </a:extLst>
+              </a:tr>
+              <a:tr h="370840">
+                <a:tc>
+                  <a:txBody>
+                    <a:bodyPr/>
+                    <a:lstStyle/>
+                    <a:p>
+                      <a:endParaRPr lang="ru-RU" dirty="0"/>
+                    </a:p>
+                  </a:txBody>
+                  <a:tcPr/>
+                </a:tc>
+                <a:tc>
+                  <a:txBody>
+                    <a:bodyPr/>
+                    <a:lstStyle/>
+                    <a:p>
+                      <a:pPr algn="ctr" fontAlgn="ctr"/>
+                      <a:r>
+                        <a:rPr lang="ru-RU" sz="1100" b="1" i="0" u="none" strike="noStrike">
+                          <a:solidFill>
+                            <a:srgbClr val="000000"/>
+                          </a:solidFill>
+                          <a:effectLst/>
+                          <a:latin typeface="Calibri" panose="020F0502020204030204" pitchFamily="34" charset="0"/>
+                        </a:rPr>
+                        <a:t>10</a:t>
+                      </a:r>
+                    </a:p>
+                  </a:txBody>
+                  <a:tcPr marL="7620" marR="7620" marT="7620" marB="0" anchor="ctr"/>
+                </a:tc>
+                <a:tc>
+                  <a:txBody>
+                    <a:bodyPr/>
+                    <a:lstStyle/>
+                    <a:p>
+                      <a:pPr algn="ctr" fontAlgn="ctr"/>
+                      <a:r>
+                        <a:rPr lang="ru-RU" sz="1100" b="0" i="0" u="none" strike="noStrike">
+                          <a:solidFill>
+                            <a:srgbClr val="000000"/>
+                          </a:solidFill>
+                          <a:effectLst/>
+                          <a:latin typeface="Calibri" panose="020F0502020204030204" pitchFamily="34" charset="0"/>
+                        </a:rPr>
+                        <a:t>1</a:t>
+                      </a:r>
+                    </a:p>
+                  </a:txBody>
+                  <a:tcPr marL="7620" marR="7620" marT="7620" marB="0" anchor="ctr"/>
+                </a:tc>
+                <a:tc>
+                  <a:txBody>
+                    <a:bodyPr/>
+                    <a:lstStyle/>
+                    <a:p>
+                      <a:endParaRPr lang="ru-RU"/>
+                    </a:p>
+                  </a:txBody>
+                  <a:tcPr/>
+                </a:tc>
+                <a:tc>
+                  <a:txBody>
+                    <a:bodyPr/>
+                    <a:lstStyle/>
+                    <a:p>
+                      <a:endParaRPr lang="ru-RU"/>
+                    </a:p>
+                  </a:txBody>
+                  <a:tcPr/>
+                </a:tc>
+                <a:tc>
+                  <a:txBody>
+                    <a:bodyPr/>
+                    <a:lstStyle/>
+                    <a:p>
+                      <a:endParaRPr lang="ru-RU"/>
+                    </a:p>
+                  </a:txBody>
+                  <a:tcPr/>
+                </a:tc>
+                <a:tc>
+                  <a:txBody>
+                    <a:bodyPr/>
+                    <a:lstStyle/>
+                    <a:p>
+                      <a:endParaRPr lang="ru-RU"/>
+                    </a:p>
+                  </a:txBody>
+                  <a:tcPr/>
+                </a:tc>
+                <a:tc>
+                  <a:txBody>
+                    <a:bodyPr/>
+                    <a:lstStyle/>
+                    <a:p>
+                      <a:endParaRPr lang="ru-RU"/>
+                    </a:p>
+                  </a:txBody>
+                  <a:tcPr/>
+                </a:tc>
+                <a:tc>
+                  <a:txBody>
+                    <a:bodyPr/>
+                    <a:lstStyle/>
+                    <a:p>
+                      <a:endParaRPr lang="ru-RU" dirty="0"/>
+                    </a:p>
+                  </a:txBody>
+                  <a:tcPr/>
+                </a:tc>
+                <a:extLst>
+                  <a:ext uri="{0D108BD9-81ED-4DB2-BD59-A6C34878D82A}">
+                    <a16:rowId xmlns:a16="http://schemas.microsoft.com/office/drawing/2014/main" val="393442632"/>
+                  </a:ext>
+                </a:extLst>
+              </a:tr>
+              <a:tr h="370840">
+                <a:tc>
+                  <a:txBody>
+                    <a:bodyPr/>
+                    <a:lstStyle/>
+                    <a:p>
+                      <a:endParaRPr lang="ru-RU" dirty="0"/>
+                    </a:p>
+                  </a:txBody>
+                  <a:tcPr/>
+                </a:tc>
+                <a:tc>
+                  <a:txBody>
+                    <a:bodyPr/>
+                    <a:lstStyle/>
+                    <a:p>
+                      <a:pPr algn="ctr" fontAlgn="ctr"/>
+                      <a:endParaRPr lang="ru-RU" sz="1100" b="1" i="0" u="none" strike="noStrike">
+                        <a:solidFill>
+                          <a:srgbClr val="000000"/>
+                        </a:solidFill>
+                        <a:effectLst/>
+                        <a:latin typeface="Calibri" panose="020F0502020204030204" pitchFamily="34" charset="0"/>
+                      </a:endParaRPr>
+                    </a:p>
+                  </a:txBody>
+                  <a:tcPr marL="7620" marR="7620" marT="7620" marB="0" anchor="ctr"/>
+                </a:tc>
+                <a:tc>
+                  <a:txBody>
+                    <a:bodyPr/>
+                    <a:lstStyle/>
+                    <a:p>
+                      <a:pPr algn="ctr" fontAlgn="ctr"/>
+                      <a:r>
+                        <a:rPr lang="ru-RU" sz="1100" b="0" i="0" u="none" strike="noStrike">
+                          <a:solidFill>
+                            <a:srgbClr val="000000"/>
+                          </a:solidFill>
+                          <a:effectLst/>
+                          <a:latin typeface="Calibri" panose="020F0502020204030204" pitchFamily="34" charset="0"/>
+                        </a:rPr>
+                        <a:t>2</a:t>
+                      </a:r>
+                    </a:p>
+                  </a:txBody>
+                  <a:tcPr marL="7620" marR="7620" marT="7620" marB="0" anchor="ctr"/>
+                </a:tc>
+                <a:tc>
+                  <a:txBody>
+                    <a:bodyPr/>
+                    <a:lstStyle/>
+                    <a:p>
+                      <a:endParaRPr lang="ru-RU"/>
+                    </a:p>
+                  </a:txBody>
+                  <a:tcPr/>
+                </a:tc>
+                <a:tc>
+                  <a:txBody>
+                    <a:bodyPr/>
+                    <a:lstStyle/>
+                    <a:p>
+                      <a:endParaRPr lang="ru-RU"/>
+                    </a:p>
+                  </a:txBody>
+                  <a:tcPr/>
+                </a:tc>
+                <a:tc>
+                  <a:txBody>
+                    <a:bodyPr/>
+                    <a:lstStyle/>
+                    <a:p>
+                      <a:endParaRPr lang="ru-RU"/>
+                    </a:p>
+                  </a:txBody>
+                  <a:tcPr/>
+                </a:tc>
+                <a:tc>
+                  <a:txBody>
+                    <a:bodyPr/>
+                    <a:lstStyle/>
+                    <a:p>
+                      <a:endParaRPr lang="ru-RU"/>
+                    </a:p>
+                  </a:txBody>
+                  <a:tcPr/>
+                </a:tc>
+                <a:tc>
+                  <a:txBody>
+                    <a:bodyPr/>
+                    <a:lstStyle/>
+                    <a:p>
+                      <a:endParaRPr lang="ru-RU"/>
+                    </a:p>
+                  </a:txBody>
+                  <a:tcPr/>
+                </a:tc>
+                <a:tc>
+                  <a:txBody>
+                    <a:bodyPr/>
+                    <a:lstStyle/>
+                    <a:p>
+                      <a:endParaRPr lang="ru-RU" dirty="0"/>
+                    </a:p>
+                  </a:txBody>
+                  <a:tcPr/>
+                </a:tc>
+                <a:extLst>
+                  <a:ext uri="{0D108BD9-81ED-4DB2-BD59-A6C34878D82A}">
+                    <a16:rowId xmlns:a16="http://schemas.microsoft.com/office/drawing/2014/main" val="404849830"/>
+                  </a:ext>
+                </a:extLst>
+              </a:tr>
+              <a:tr h="370840">
+                <a:tc>
+                  <a:txBody>
+                    <a:bodyPr/>
+                    <a:lstStyle/>
+                    <a:p>
+                      <a:endParaRPr lang="ru-RU" dirty="0"/>
+                    </a:p>
+                  </a:txBody>
+                  <a:tcPr/>
+                </a:tc>
+                <a:tc>
+                  <a:txBody>
+                    <a:bodyPr/>
+                    <a:lstStyle/>
+                    <a:p>
+                      <a:pPr algn="ctr" fontAlgn="ctr"/>
+                      <a:endParaRPr lang="ru-RU" sz="1100" b="1" i="0" u="none" strike="noStrike">
+                        <a:solidFill>
+                          <a:srgbClr val="000000"/>
+                        </a:solidFill>
+                        <a:effectLst/>
+                        <a:latin typeface="Calibri" panose="020F0502020204030204" pitchFamily="34" charset="0"/>
+                      </a:endParaRPr>
+                    </a:p>
+                  </a:txBody>
+                  <a:tcPr marL="7620" marR="7620" marT="7620" marB="0" anchor="ctr"/>
+                </a:tc>
+                <a:tc>
+                  <a:txBody>
+                    <a:bodyPr/>
+                    <a:lstStyle/>
+                    <a:p>
+                      <a:pPr algn="ctr" fontAlgn="ctr"/>
+                      <a:r>
+                        <a:rPr lang="ru-RU" sz="1100" b="0" i="0" u="none" strike="noStrike">
+                          <a:solidFill>
+                            <a:srgbClr val="000000"/>
+                          </a:solidFill>
+                          <a:effectLst/>
+                          <a:latin typeface="Calibri" panose="020F0502020204030204" pitchFamily="34" charset="0"/>
+                        </a:rPr>
+                        <a:t>3</a:t>
+                      </a:r>
+                    </a:p>
+                  </a:txBody>
+                  <a:tcPr marL="7620" marR="7620" marT="7620" marB="0" anchor="ctr"/>
+                </a:tc>
+                <a:tc>
+                  <a:txBody>
+                    <a:bodyPr/>
+                    <a:lstStyle/>
+                    <a:p>
+                      <a:endParaRPr lang="ru-RU"/>
+                    </a:p>
+                  </a:txBody>
+                  <a:tcPr/>
+                </a:tc>
+                <a:tc>
+                  <a:txBody>
+                    <a:bodyPr/>
+                    <a:lstStyle/>
+                    <a:p>
+                      <a:endParaRPr lang="ru-RU"/>
+                    </a:p>
+                  </a:txBody>
+                  <a:tcPr/>
+                </a:tc>
+                <a:tc>
+                  <a:txBody>
+                    <a:bodyPr/>
+                    <a:lstStyle/>
+                    <a:p>
+                      <a:endParaRPr lang="ru-RU"/>
+                    </a:p>
+                  </a:txBody>
+                  <a:tcPr/>
+                </a:tc>
+                <a:tc>
+                  <a:txBody>
+                    <a:bodyPr/>
+                    <a:lstStyle/>
+                    <a:p>
+                      <a:endParaRPr lang="ru-RU"/>
+                    </a:p>
+                  </a:txBody>
+                  <a:tcPr/>
+                </a:tc>
+                <a:tc>
+                  <a:txBody>
+                    <a:bodyPr/>
+                    <a:lstStyle/>
+                    <a:p>
+                      <a:endParaRPr lang="ru-RU"/>
+                    </a:p>
+                  </a:txBody>
+                  <a:tcPr/>
+                </a:tc>
+                <a:tc>
+                  <a:txBody>
+                    <a:bodyPr/>
+                    <a:lstStyle/>
+                    <a:p>
+                      <a:endParaRPr lang="ru-RU" dirty="0"/>
+                    </a:p>
+                  </a:txBody>
+                  <a:tcPr/>
+                </a:tc>
+                <a:extLst>
+                  <a:ext uri="{0D108BD9-81ED-4DB2-BD59-A6C34878D82A}">
+                    <a16:rowId xmlns:a16="http://schemas.microsoft.com/office/drawing/2014/main" val="356951054"/>
+                  </a:ext>
+                </a:extLst>
+              </a:tr>
+              <a:tr h="370840">
+                <a:tc>
+                  <a:txBody>
+                    <a:bodyPr/>
+                    <a:lstStyle/>
+                    <a:p>
+                      <a:endParaRPr lang="ru-RU" dirty="0"/>
+                    </a:p>
+                  </a:txBody>
+                  <a:tcPr/>
+                </a:tc>
+                <a:tc>
+                  <a:txBody>
+                    <a:bodyPr/>
+                    <a:lstStyle/>
+                    <a:p>
+                      <a:pPr algn="ctr" fontAlgn="ctr"/>
+                      <a:endParaRPr lang="ru-RU" sz="1100" b="1" i="0" u="none" strike="noStrike">
+                        <a:solidFill>
+                          <a:srgbClr val="000000"/>
+                        </a:solidFill>
+                        <a:effectLst/>
+                        <a:latin typeface="Calibri" panose="020F0502020204030204" pitchFamily="34" charset="0"/>
+                      </a:endParaRPr>
+                    </a:p>
+                  </a:txBody>
+                  <a:tcPr marL="7620" marR="7620" marT="7620" marB="0" anchor="ctr"/>
+                </a:tc>
+                <a:tc>
+                  <a:txBody>
+                    <a:bodyPr/>
+                    <a:lstStyle/>
+                    <a:p>
+                      <a:pPr algn="ctr" fontAlgn="ctr"/>
+                      <a:r>
+                        <a:rPr lang="ru-RU" sz="1100" b="0" i="0" u="none" strike="noStrike">
+                          <a:solidFill>
+                            <a:srgbClr val="000000"/>
+                          </a:solidFill>
+                          <a:effectLst/>
+                          <a:latin typeface="Calibri" panose="020F0502020204030204" pitchFamily="34" charset="0"/>
+                        </a:rPr>
+                        <a:t>5</a:t>
+                      </a:r>
+                    </a:p>
+                  </a:txBody>
+                  <a:tcPr marL="7620" marR="7620" marT="7620" marB="0" anchor="ctr"/>
+                </a:tc>
+                <a:tc>
+                  <a:txBody>
+                    <a:bodyPr/>
+                    <a:lstStyle/>
+                    <a:p>
+                      <a:endParaRPr lang="ru-RU"/>
+                    </a:p>
+                  </a:txBody>
+                  <a:tcPr/>
+                </a:tc>
+                <a:tc>
+                  <a:txBody>
+                    <a:bodyPr/>
+                    <a:lstStyle/>
+                    <a:p>
+                      <a:endParaRPr lang="ru-RU"/>
+                    </a:p>
+                  </a:txBody>
+                  <a:tcPr/>
+                </a:tc>
+                <a:tc>
+                  <a:txBody>
+                    <a:bodyPr/>
+                    <a:lstStyle/>
+                    <a:p>
+                      <a:endParaRPr lang="ru-RU"/>
+                    </a:p>
+                  </a:txBody>
+                  <a:tcPr/>
+                </a:tc>
+                <a:tc>
+                  <a:txBody>
+                    <a:bodyPr/>
+                    <a:lstStyle/>
+                    <a:p>
+                      <a:endParaRPr lang="ru-RU"/>
+                    </a:p>
+                  </a:txBody>
+                  <a:tcPr/>
+                </a:tc>
+                <a:tc>
+                  <a:txBody>
+                    <a:bodyPr/>
+                    <a:lstStyle/>
+                    <a:p>
+                      <a:endParaRPr lang="ru-RU"/>
+                    </a:p>
+                  </a:txBody>
+                  <a:tcPr/>
+                </a:tc>
+                <a:tc>
+                  <a:txBody>
+                    <a:bodyPr/>
+                    <a:lstStyle/>
+                    <a:p>
+                      <a:endParaRPr lang="ru-RU" dirty="0"/>
+                    </a:p>
+                  </a:txBody>
+                  <a:tcPr/>
+                </a:tc>
+                <a:extLst>
+                  <a:ext uri="{0D108BD9-81ED-4DB2-BD59-A6C34878D82A}">
+                    <a16:rowId xmlns:a16="http://schemas.microsoft.com/office/drawing/2014/main" val="3116955266"/>
+                  </a:ext>
+                </a:extLst>
+              </a:tr>
+              <a:tr h="370840">
+                <a:tc>
+                  <a:txBody>
+                    <a:bodyPr/>
+                    <a:lstStyle/>
+                    <a:p>
+                      <a:endParaRPr lang="ru-RU" dirty="0"/>
+                    </a:p>
+                  </a:txBody>
+                  <a:tcPr/>
+                </a:tc>
+                <a:tc>
+                  <a:txBody>
+                    <a:bodyPr/>
+                    <a:lstStyle/>
+                    <a:p>
+                      <a:pPr algn="ctr" fontAlgn="ctr"/>
+                      <a:r>
+                        <a:rPr lang="ru-RU" sz="1100" b="1" i="0" u="none" strike="noStrike">
+                          <a:solidFill>
+                            <a:srgbClr val="000000"/>
+                          </a:solidFill>
+                          <a:effectLst/>
+                          <a:latin typeface="Calibri" panose="020F0502020204030204" pitchFamily="34" charset="0"/>
+                        </a:rPr>
+                        <a:t> </a:t>
+                      </a:r>
+                    </a:p>
+                  </a:txBody>
+                  <a:tcPr marL="7620" marR="7620" marT="7620" marB="0" anchor="ctr"/>
+                </a:tc>
+                <a:tc>
+                  <a:txBody>
+                    <a:bodyPr/>
+                    <a:lstStyle/>
+                    <a:p>
+                      <a:pPr algn="ctr" fontAlgn="ctr"/>
+                      <a:r>
+                        <a:rPr lang="ru-RU" sz="1100" b="0" i="0" u="none" strike="noStrike">
+                          <a:solidFill>
+                            <a:srgbClr val="000000"/>
+                          </a:solidFill>
+                          <a:effectLst/>
+                          <a:latin typeface="Calibri" panose="020F0502020204030204" pitchFamily="34" charset="0"/>
+                        </a:rPr>
+                        <a:t>6</a:t>
+                      </a:r>
+                    </a:p>
+                  </a:txBody>
+                  <a:tcPr marL="7620" marR="7620" marT="7620" marB="0" anchor="ctr"/>
+                </a:tc>
+                <a:tc>
+                  <a:txBody>
+                    <a:bodyPr/>
+                    <a:lstStyle/>
+                    <a:p>
+                      <a:endParaRPr lang="ru-RU"/>
+                    </a:p>
+                  </a:txBody>
+                  <a:tcPr/>
+                </a:tc>
+                <a:tc>
+                  <a:txBody>
+                    <a:bodyPr/>
+                    <a:lstStyle/>
+                    <a:p>
+                      <a:endParaRPr lang="ru-RU"/>
+                    </a:p>
+                  </a:txBody>
+                  <a:tcPr/>
+                </a:tc>
+                <a:tc>
+                  <a:txBody>
+                    <a:bodyPr/>
+                    <a:lstStyle/>
+                    <a:p>
+                      <a:endParaRPr lang="ru-RU"/>
+                    </a:p>
+                  </a:txBody>
+                  <a:tcPr/>
+                </a:tc>
+                <a:tc>
+                  <a:txBody>
+                    <a:bodyPr/>
+                    <a:lstStyle/>
+                    <a:p>
+                      <a:endParaRPr lang="ru-RU"/>
+                    </a:p>
+                  </a:txBody>
+                  <a:tcPr/>
+                </a:tc>
+                <a:tc>
+                  <a:txBody>
+                    <a:bodyPr/>
+                    <a:lstStyle/>
+                    <a:p>
+                      <a:endParaRPr lang="ru-RU"/>
+                    </a:p>
+                  </a:txBody>
+                  <a:tcPr/>
+                </a:tc>
+                <a:tc>
+                  <a:txBody>
+                    <a:bodyPr/>
+                    <a:lstStyle/>
+                    <a:p>
+                      <a:endParaRPr lang="ru-RU" dirty="0"/>
+                    </a:p>
+                  </a:txBody>
+                  <a:tcPr/>
+                </a:tc>
+                <a:extLst>
+                  <a:ext uri="{0D108BD9-81ED-4DB2-BD59-A6C34878D82A}">
+                    <a16:rowId xmlns:a16="http://schemas.microsoft.com/office/drawing/2014/main" val="4266392731"/>
+                  </a:ext>
+                </a:extLst>
+              </a:tr>
+              <a:tr h="370840">
+                <a:tc>
+                  <a:txBody>
+                    <a:bodyPr/>
+                    <a:lstStyle/>
+                    <a:p>
+                      <a:endParaRPr lang="ru-RU" dirty="0"/>
+                    </a:p>
+                  </a:txBody>
+                  <a:tcPr/>
+                </a:tc>
+                <a:tc>
+                  <a:txBody>
+                    <a:bodyPr/>
+                    <a:lstStyle/>
+                    <a:p>
+                      <a:pPr algn="ctr" fontAlgn="ctr"/>
+                      <a:r>
+                        <a:rPr lang="ru-RU" sz="1100" b="1" i="0" u="none" strike="noStrike">
+                          <a:solidFill>
+                            <a:srgbClr val="000000"/>
+                          </a:solidFill>
+                          <a:effectLst/>
+                          <a:latin typeface="Calibri" panose="020F0502020204030204" pitchFamily="34" charset="0"/>
+                        </a:rPr>
+                        <a:t>11</a:t>
+                      </a:r>
+                    </a:p>
+                  </a:txBody>
+                  <a:tcPr marL="7620" marR="7620" marT="7620" marB="0" anchor="ctr"/>
+                </a:tc>
+                <a:tc>
+                  <a:txBody>
+                    <a:bodyPr/>
+                    <a:lstStyle/>
+                    <a:p>
+                      <a:pPr algn="ctr" fontAlgn="ctr"/>
+                      <a:r>
+                        <a:rPr lang="ru-RU" sz="1100" b="0" i="0" u="none" strike="noStrike">
+                          <a:solidFill>
+                            <a:srgbClr val="000000"/>
+                          </a:solidFill>
+                          <a:effectLst/>
+                          <a:latin typeface="Calibri" panose="020F0502020204030204" pitchFamily="34" charset="0"/>
+                        </a:rPr>
+                        <a:t>1</a:t>
+                      </a:r>
+                    </a:p>
+                  </a:txBody>
+                  <a:tcPr marL="7620" marR="7620" marT="7620" marB="0" anchor="ctr"/>
+                </a:tc>
+                <a:tc>
+                  <a:txBody>
+                    <a:bodyPr/>
+                    <a:lstStyle/>
+                    <a:p>
+                      <a:endParaRPr lang="ru-RU"/>
+                    </a:p>
+                  </a:txBody>
+                  <a:tcPr/>
+                </a:tc>
+                <a:tc>
+                  <a:txBody>
+                    <a:bodyPr/>
+                    <a:lstStyle/>
+                    <a:p>
+                      <a:endParaRPr lang="ru-RU"/>
+                    </a:p>
+                  </a:txBody>
+                  <a:tcPr/>
+                </a:tc>
+                <a:tc>
+                  <a:txBody>
+                    <a:bodyPr/>
+                    <a:lstStyle/>
+                    <a:p>
+                      <a:endParaRPr lang="ru-RU"/>
+                    </a:p>
+                  </a:txBody>
+                  <a:tcPr/>
+                </a:tc>
+                <a:tc>
+                  <a:txBody>
+                    <a:bodyPr/>
+                    <a:lstStyle/>
+                    <a:p>
+                      <a:endParaRPr lang="ru-RU"/>
+                    </a:p>
+                  </a:txBody>
+                  <a:tcPr/>
+                </a:tc>
+                <a:tc>
+                  <a:txBody>
+                    <a:bodyPr/>
+                    <a:lstStyle/>
+                    <a:p>
+                      <a:endParaRPr lang="ru-RU"/>
+                    </a:p>
+                  </a:txBody>
+                  <a:tcPr/>
+                </a:tc>
+                <a:tc>
+                  <a:txBody>
+                    <a:bodyPr/>
+                    <a:lstStyle/>
+                    <a:p>
+                      <a:endParaRPr lang="ru-RU" dirty="0"/>
+                    </a:p>
+                  </a:txBody>
+                  <a:tcPr/>
+                </a:tc>
+                <a:extLst>
+                  <a:ext uri="{0D108BD9-81ED-4DB2-BD59-A6C34878D82A}">
+                    <a16:rowId xmlns:a16="http://schemas.microsoft.com/office/drawing/2014/main" val="1884775058"/>
+                  </a:ext>
+                </a:extLst>
+              </a:tr>
+              <a:tr h="370840">
+                <a:tc>
+                  <a:txBody>
+                    <a:bodyPr/>
+                    <a:lstStyle/>
+                    <a:p>
+                      <a:endParaRPr lang="ru-RU" dirty="0"/>
+                    </a:p>
+                  </a:txBody>
+                  <a:tcPr/>
+                </a:tc>
+                <a:tc>
+                  <a:txBody>
+                    <a:bodyPr/>
+                    <a:lstStyle/>
+                    <a:p>
+                      <a:pPr algn="ctr" fontAlgn="ctr"/>
+                      <a:r>
+                        <a:rPr lang="ru-RU" sz="1100" b="1" i="0" u="none" strike="noStrike">
+                          <a:solidFill>
+                            <a:srgbClr val="000000"/>
+                          </a:solidFill>
+                          <a:effectLst/>
+                          <a:latin typeface="Calibri" panose="020F0502020204030204" pitchFamily="34" charset="0"/>
+                        </a:rPr>
+                        <a:t> </a:t>
+                      </a:r>
+                    </a:p>
+                  </a:txBody>
+                  <a:tcPr marL="7620" marR="7620" marT="7620" marB="0" anchor="ctr"/>
+                </a:tc>
+                <a:tc>
+                  <a:txBody>
+                    <a:bodyPr/>
+                    <a:lstStyle/>
+                    <a:p>
+                      <a:pPr algn="ctr" fontAlgn="ctr"/>
+                      <a:r>
+                        <a:rPr lang="ru-RU" sz="1100" b="0" i="0" u="none" strike="noStrike">
+                          <a:solidFill>
+                            <a:srgbClr val="000000"/>
+                          </a:solidFill>
+                          <a:effectLst/>
+                          <a:latin typeface="Calibri" panose="020F0502020204030204" pitchFamily="34" charset="0"/>
+                        </a:rPr>
+                        <a:t>3</a:t>
+                      </a:r>
+                    </a:p>
+                  </a:txBody>
+                  <a:tcPr marL="7620" marR="7620" marT="7620" marB="0" anchor="ctr"/>
+                </a:tc>
+                <a:tc>
+                  <a:txBody>
+                    <a:bodyPr/>
+                    <a:lstStyle/>
+                    <a:p>
+                      <a:endParaRPr lang="ru-RU"/>
+                    </a:p>
+                  </a:txBody>
+                  <a:tcPr/>
+                </a:tc>
+                <a:tc>
+                  <a:txBody>
+                    <a:bodyPr/>
+                    <a:lstStyle/>
+                    <a:p>
+                      <a:endParaRPr lang="ru-RU"/>
+                    </a:p>
+                  </a:txBody>
+                  <a:tcPr/>
+                </a:tc>
+                <a:tc>
+                  <a:txBody>
+                    <a:bodyPr/>
+                    <a:lstStyle/>
+                    <a:p>
+                      <a:endParaRPr lang="ru-RU"/>
+                    </a:p>
+                  </a:txBody>
+                  <a:tcPr/>
+                </a:tc>
+                <a:tc>
+                  <a:txBody>
+                    <a:bodyPr/>
+                    <a:lstStyle/>
+                    <a:p>
+                      <a:endParaRPr lang="ru-RU"/>
+                    </a:p>
+                  </a:txBody>
+                  <a:tcPr/>
+                </a:tc>
+                <a:tc>
+                  <a:txBody>
+                    <a:bodyPr/>
+                    <a:lstStyle/>
+                    <a:p>
+                      <a:endParaRPr lang="ru-RU"/>
+                    </a:p>
+                  </a:txBody>
+                  <a:tcPr/>
+                </a:tc>
+                <a:tc>
+                  <a:txBody>
+                    <a:bodyPr/>
+                    <a:lstStyle/>
+                    <a:p>
+                      <a:endParaRPr lang="ru-RU" dirty="0"/>
+                    </a:p>
+                  </a:txBody>
+                  <a:tcPr/>
+                </a:tc>
+                <a:extLst>
+                  <a:ext uri="{0D108BD9-81ED-4DB2-BD59-A6C34878D82A}">
+                    <a16:rowId xmlns:a16="http://schemas.microsoft.com/office/drawing/2014/main" val="902565803"/>
+                  </a:ext>
+                </a:extLst>
+              </a:tr>
+              <a:tr h="370840">
+                <a:tc>
+                  <a:txBody>
+                    <a:bodyPr/>
+                    <a:lstStyle/>
+                    <a:p>
+                      <a:endParaRPr lang="ru-RU" dirty="0"/>
+                    </a:p>
+                  </a:txBody>
+                  <a:tcPr/>
+                </a:tc>
+                <a:tc>
+                  <a:txBody>
+                    <a:bodyPr/>
+                    <a:lstStyle/>
+                    <a:p>
+                      <a:pPr algn="ctr" fontAlgn="ctr"/>
+                      <a:r>
+                        <a:rPr lang="ru-RU" sz="1100" b="1" i="0" u="none" strike="noStrike">
+                          <a:solidFill>
+                            <a:srgbClr val="000000"/>
+                          </a:solidFill>
+                          <a:effectLst/>
+                          <a:latin typeface="Calibri" panose="020F0502020204030204" pitchFamily="34" charset="0"/>
+                        </a:rPr>
+                        <a:t>12</a:t>
+                      </a:r>
+                    </a:p>
+                  </a:txBody>
+                  <a:tcPr marL="7620" marR="7620" marT="7620" marB="0" anchor="ctr"/>
+                </a:tc>
+                <a:tc>
+                  <a:txBody>
+                    <a:bodyPr/>
+                    <a:lstStyle/>
+                    <a:p>
+                      <a:pPr algn="ctr" fontAlgn="ctr"/>
+                      <a:r>
+                        <a:rPr lang="ru-RU" sz="1100" b="0" i="0" u="none" strike="noStrike">
+                          <a:solidFill>
+                            <a:srgbClr val="000000"/>
+                          </a:solidFill>
+                          <a:effectLst/>
+                          <a:latin typeface="Calibri" panose="020F0502020204030204" pitchFamily="34" charset="0"/>
+                        </a:rPr>
+                        <a:t>1</a:t>
+                      </a:r>
+                    </a:p>
+                  </a:txBody>
+                  <a:tcPr marL="7620" marR="7620" marT="7620" marB="0" anchor="ctr"/>
+                </a:tc>
+                <a:tc>
+                  <a:txBody>
+                    <a:bodyPr/>
+                    <a:lstStyle/>
+                    <a:p>
+                      <a:endParaRPr lang="ru-RU"/>
+                    </a:p>
+                  </a:txBody>
+                  <a:tcPr/>
+                </a:tc>
+                <a:tc>
+                  <a:txBody>
+                    <a:bodyPr/>
+                    <a:lstStyle/>
+                    <a:p>
+                      <a:endParaRPr lang="ru-RU"/>
+                    </a:p>
+                  </a:txBody>
+                  <a:tcPr/>
+                </a:tc>
+                <a:tc>
+                  <a:txBody>
+                    <a:bodyPr/>
+                    <a:lstStyle/>
+                    <a:p>
+                      <a:endParaRPr lang="ru-RU"/>
+                    </a:p>
+                  </a:txBody>
+                  <a:tcPr/>
+                </a:tc>
+                <a:tc>
+                  <a:txBody>
+                    <a:bodyPr/>
+                    <a:lstStyle/>
+                    <a:p>
+                      <a:endParaRPr lang="ru-RU"/>
+                    </a:p>
+                  </a:txBody>
+                  <a:tcPr/>
+                </a:tc>
+                <a:tc>
+                  <a:txBody>
+                    <a:bodyPr/>
+                    <a:lstStyle/>
+                    <a:p>
+                      <a:endParaRPr lang="ru-RU"/>
+                    </a:p>
+                  </a:txBody>
+                  <a:tcPr/>
+                </a:tc>
+                <a:tc>
+                  <a:txBody>
+                    <a:bodyPr/>
+                    <a:lstStyle/>
+                    <a:p>
+                      <a:endParaRPr lang="ru-RU" dirty="0"/>
+                    </a:p>
+                  </a:txBody>
+                  <a:tcPr/>
+                </a:tc>
+                <a:extLst>
+                  <a:ext uri="{0D108BD9-81ED-4DB2-BD59-A6C34878D82A}">
+                    <a16:rowId xmlns:a16="http://schemas.microsoft.com/office/drawing/2014/main" val="2765545167"/>
+                  </a:ext>
+                </a:extLst>
+              </a:tr>
+              <a:tr h="370840">
+                <a:tc>
+                  <a:txBody>
+                    <a:bodyPr/>
+                    <a:lstStyle/>
+                    <a:p>
+                      <a:endParaRPr lang="ru-RU" dirty="0"/>
+                    </a:p>
+                  </a:txBody>
+                  <a:tcPr/>
+                </a:tc>
+                <a:tc>
+                  <a:txBody>
+                    <a:bodyPr/>
+                    <a:lstStyle/>
+                    <a:p>
+                      <a:pPr algn="ctr" fontAlgn="ctr"/>
+                      <a:endParaRPr lang="ru-RU" sz="1100" b="1" i="0" u="none" strike="noStrike">
+                        <a:solidFill>
+                          <a:srgbClr val="000000"/>
+                        </a:solidFill>
+                        <a:effectLst/>
+                        <a:latin typeface="Calibri" panose="020F0502020204030204" pitchFamily="34" charset="0"/>
+                      </a:endParaRPr>
+                    </a:p>
+                  </a:txBody>
+                  <a:tcPr marL="7620" marR="7620" marT="7620" marB="0" anchor="ctr"/>
+                </a:tc>
+                <a:tc>
+                  <a:txBody>
+                    <a:bodyPr/>
+                    <a:lstStyle/>
+                    <a:p>
+                      <a:pPr algn="ctr" fontAlgn="ctr"/>
+                      <a:r>
+                        <a:rPr lang="ru-RU" sz="1100" b="0" i="0" u="none" strike="noStrike">
+                          <a:solidFill>
+                            <a:srgbClr val="000000"/>
+                          </a:solidFill>
+                          <a:effectLst/>
+                          <a:latin typeface="Calibri" panose="020F0502020204030204" pitchFamily="34" charset="0"/>
+                        </a:rPr>
+                        <a:t>2</a:t>
+                      </a:r>
+                    </a:p>
+                  </a:txBody>
+                  <a:tcPr marL="7620" marR="7620" marT="7620" marB="0" anchor="ctr"/>
+                </a:tc>
+                <a:tc>
+                  <a:txBody>
+                    <a:bodyPr/>
+                    <a:lstStyle/>
+                    <a:p>
+                      <a:endParaRPr lang="ru-RU"/>
+                    </a:p>
+                  </a:txBody>
+                  <a:tcPr/>
+                </a:tc>
+                <a:tc>
+                  <a:txBody>
+                    <a:bodyPr/>
+                    <a:lstStyle/>
+                    <a:p>
+                      <a:endParaRPr lang="ru-RU"/>
+                    </a:p>
+                  </a:txBody>
+                  <a:tcPr/>
+                </a:tc>
+                <a:tc>
+                  <a:txBody>
+                    <a:bodyPr/>
+                    <a:lstStyle/>
+                    <a:p>
+                      <a:endParaRPr lang="ru-RU"/>
+                    </a:p>
+                  </a:txBody>
+                  <a:tcPr/>
+                </a:tc>
+                <a:tc>
+                  <a:txBody>
+                    <a:bodyPr/>
+                    <a:lstStyle/>
+                    <a:p>
+                      <a:endParaRPr lang="ru-RU"/>
+                    </a:p>
+                  </a:txBody>
+                  <a:tcPr/>
+                </a:tc>
+                <a:tc>
+                  <a:txBody>
+                    <a:bodyPr/>
+                    <a:lstStyle/>
+                    <a:p>
+                      <a:endParaRPr lang="ru-RU"/>
+                    </a:p>
+                  </a:txBody>
+                  <a:tcPr/>
+                </a:tc>
+                <a:tc>
+                  <a:txBody>
+                    <a:bodyPr/>
+                    <a:lstStyle/>
+                    <a:p>
+                      <a:endParaRPr lang="ru-RU" dirty="0"/>
+                    </a:p>
+                  </a:txBody>
+                  <a:tcPr/>
+                </a:tc>
+                <a:extLst>
+                  <a:ext uri="{0D108BD9-81ED-4DB2-BD59-A6C34878D82A}">
+                    <a16:rowId xmlns:a16="http://schemas.microsoft.com/office/drawing/2014/main" val="3236712946"/>
+                  </a:ext>
+                </a:extLst>
+              </a:tr>
+              <a:tr h="370840">
+                <a:tc>
+                  <a:txBody>
+                    <a:bodyPr/>
+                    <a:lstStyle/>
+                    <a:p>
+                      <a:endParaRPr lang="ru-RU" dirty="0"/>
+                    </a:p>
+                  </a:txBody>
+                  <a:tcPr/>
+                </a:tc>
+                <a:tc>
+                  <a:txBody>
+                    <a:bodyPr/>
+                    <a:lstStyle/>
+                    <a:p>
+                      <a:pPr algn="ctr" fontAlgn="ctr"/>
+                      <a:endParaRPr lang="ru-RU" sz="1100" b="1" i="0" u="none" strike="noStrike">
+                        <a:solidFill>
+                          <a:srgbClr val="000000"/>
+                        </a:solidFill>
+                        <a:effectLst/>
+                        <a:latin typeface="Calibri" panose="020F0502020204030204" pitchFamily="34" charset="0"/>
+                      </a:endParaRPr>
+                    </a:p>
+                  </a:txBody>
+                  <a:tcPr marL="7620" marR="7620" marT="7620" marB="0" anchor="ctr"/>
+                </a:tc>
+                <a:tc>
+                  <a:txBody>
+                    <a:bodyPr/>
+                    <a:lstStyle/>
+                    <a:p>
+                      <a:pPr algn="ctr" fontAlgn="ctr"/>
+                      <a:r>
+                        <a:rPr lang="ru-RU" sz="1100" b="0" i="0" u="none" strike="noStrike">
+                          <a:solidFill>
+                            <a:srgbClr val="000000"/>
+                          </a:solidFill>
+                          <a:effectLst/>
+                          <a:latin typeface="Calibri" panose="020F0502020204030204" pitchFamily="34" charset="0"/>
+                        </a:rPr>
+                        <a:t>3</a:t>
+                      </a:r>
+                    </a:p>
+                  </a:txBody>
+                  <a:tcPr marL="7620" marR="7620" marT="7620" marB="0" anchor="ctr"/>
+                </a:tc>
+                <a:tc>
+                  <a:txBody>
+                    <a:bodyPr/>
+                    <a:lstStyle/>
+                    <a:p>
+                      <a:endParaRPr lang="ru-RU"/>
+                    </a:p>
+                  </a:txBody>
+                  <a:tcPr/>
+                </a:tc>
+                <a:tc>
+                  <a:txBody>
+                    <a:bodyPr/>
+                    <a:lstStyle/>
+                    <a:p>
+                      <a:endParaRPr lang="ru-RU"/>
+                    </a:p>
+                  </a:txBody>
+                  <a:tcPr/>
+                </a:tc>
+                <a:tc>
+                  <a:txBody>
+                    <a:bodyPr/>
+                    <a:lstStyle/>
+                    <a:p>
+                      <a:endParaRPr lang="ru-RU"/>
+                    </a:p>
+                  </a:txBody>
+                  <a:tcPr/>
+                </a:tc>
+                <a:tc>
+                  <a:txBody>
+                    <a:bodyPr/>
+                    <a:lstStyle/>
+                    <a:p>
+                      <a:endParaRPr lang="ru-RU"/>
+                    </a:p>
+                  </a:txBody>
+                  <a:tcPr/>
+                </a:tc>
+                <a:tc>
+                  <a:txBody>
+                    <a:bodyPr/>
+                    <a:lstStyle/>
+                    <a:p>
+                      <a:endParaRPr lang="ru-RU"/>
+                    </a:p>
+                  </a:txBody>
+                  <a:tcPr/>
+                </a:tc>
+                <a:tc>
+                  <a:txBody>
+                    <a:bodyPr/>
+                    <a:lstStyle/>
+                    <a:p>
+                      <a:endParaRPr lang="ru-RU" dirty="0"/>
+                    </a:p>
+                  </a:txBody>
+                  <a:tcPr/>
+                </a:tc>
+                <a:extLst>
+                  <a:ext uri="{0D108BD9-81ED-4DB2-BD59-A6C34878D82A}">
+                    <a16:rowId xmlns:a16="http://schemas.microsoft.com/office/drawing/2014/main" val="1251197996"/>
+                  </a:ext>
+                </a:extLst>
+              </a:tr>
+              <a:tr h="370840">
+                <a:tc>
+                  <a:txBody>
+                    <a:bodyPr/>
+                    <a:lstStyle/>
+                    <a:p>
+                      <a:endParaRPr lang="ru-RU" dirty="0"/>
+                    </a:p>
+                  </a:txBody>
+                  <a:tcPr/>
+                </a:tc>
+                <a:tc>
+                  <a:txBody>
+                    <a:bodyPr/>
+                    <a:lstStyle/>
+                    <a:p>
+                      <a:pPr algn="ctr" fontAlgn="ctr"/>
+                      <a:r>
+                        <a:rPr lang="ru-RU" sz="1100" b="1" i="0" u="none" strike="noStrike">
+                          <a:solidFill>
+                            <a:srgbClr val="000000"/>
+                          </a:solidFill>
+                          <a:effectLst/>
+                          <a:latin typeface="Calibri" panose="020F0502020204030204" pitchFamily="34" charset="0"/>
+                        </a:rPr>
+                        <a:t> </a:t>
+                      </a:r>
+                    </a:p>
+                  </a:txBody>
+                  <a:tcPr marL="7620" marR="7620" marT="7620" marB="0" anchor="ctr"/>
+                </a:tc>
+                <a:tc>
+                  <a:txBody>
+                    <a:bodyPr/>
+                    <a:lstStyle/>
+                    <a:p>
+                      <a:pPr algn="ctr" fontAlgn="ctr"/>
+                      <a:r>
+                        <a:rPr lang="ru-RU" sz="1100" b="0" i="0" u="none" strike="noStrike">
+                          <a:solidFill>
+                            <a:srgbClr val="000000"/>
+                          </a:solidFill>
+                          <a:effectLst/>
+                          <a:latin typeface="Calibri" panose="020F0502020204030204" pitchFamily="34" charset="0"/>
+                        </a:rPr>
+                        <a:t>4</a:t>
+                      </a:r>
+                    </a:p>
+                  </a:txBody>
+                  <a:tcPr marL="7620" marR="7620" marT="7620" marB="0" anchor="ctr"/>
+                </a:tc>
+                <a:tc>
+                  <a:txBody>
+                    <a:bodyPr/>
+                    <a:lstStyle/>
+                    <a:p>
+                      <a:endParaRPr lang="ru-RU"/>
+                    </a:p>
+                  </a:txBody>
+                  <a:tcPr/>
+                </a:tc>
+                <a:tc>
+                  <a:txBody>
+                    <a:bodyPr/>
+                    <a:lstStyle/>
+                    <a:p>
+                      <a:endParaRPr lang="ru-RU"/>
+                    </a:p>
+                  </a:txBody>
+                  <a:tcPr/>
+                </a:tc>
+                <a:tc>
+                  <a:txBody>
+                    <a:bodyPr/>
+                    <a:lstStyle/>
+                    <a:p>
+                      <a:endParaRPr lang="ru-RU"/>
+                    </a:p>
+                  </a:txBody>
+                  <a:tcPr/>
+                </a:tc>
+                <a:tc>
+                  <a:txBody>
+                    <a:bodyPr/>
+                    <a:lstStyle/>
+                    <a:p>
+                      <a:endParaRPr lang="ru-RU"/>
+                    </a:p>
+                  </a:txBody>
+                  <a:tcPr/>
+                </a:tc>
+                <a:tc>
+                  <a:txBody>
+                    <a:bodyPr/>
+                    <a:lstStyle/>
+                    <a:p>
+                      <a:endParaRPr lang="ru-RU"/>
+                    </a:p>
+                  </a:txBody>
+                  <a:tcPr/>
+                </a:tc>
+                <a:tc>
+                  <a:txBody>
+                    <a:bodyPr/>
+                    <a:lstStyle/>
+                    <a:p>
+                      <a:endParaRPr lang="ru-RU" dirty="0"/>
+                    </a:p>
+                  </a:txBody>
+                  <a:tcPr/>
+                </a:tc>
+                <a:extLst>
+                  <a:ext uri="{0D108BD9-81ED-4DB2-BD59-A6C34878D82A}">
+                    <a16:rowId xmlns:a16="http://schemas.microsoft.com/office/drawing/2014/main" val="795147921"/>
+                  </a:ext>
+                </a:extLst>
+              </a:tr>
+              <a:tr h="370840">
+                <a:tc>
+                  <a:txBody>
+                    <a:bodyPr/>
+                    <a:lstStyle/>
+                    <a:p>
+                      <a:endParaRPr lang="ru-RU" dirty="0"/>
+                    </a:p>
+                  </a:txBody>
+                  <a:tcPr/>
+                </a:tc>
+                <a:tc>
+                  <a:txBody>
+                    <a:bodyPr/>
+                    <a:lstStyle/>
+                    <a:p>
+                      <a:pPr algn="ctr" fontAlgn="ctr"/>
+                      <a:r>
+                        <a:rPr lang="ru-RU" sz="1100" b="1" i="0" u="none" strike="noStrike">
+                          <a:solidFill>
+                            <a:srgbClr val="000000"/>
+                          </a:solidFill>
+                          <a:effectLst/>
+                          <a:latin typeface="Calibri" panose="020F0502020204030204" pitchFamily="34" charset="0"/>
+                        </a:rPr>
+                        <a:t>14</a:t>
+                      </a:r>
+                    </a:p>
+                  </a:txBody>
+                  <a:tcPr marL="7620" marR="7620" marT="7620" marB="0" anchor="ctr"/>
+                </a:tc>
+                <a:tc>
+                  <a:txBody>
+                    <a:bodyPr/>
+                    <a:lstStyle/>
+                    <a:p>
+                      <a:pPr algn="ctr" fontAlgn="ctr"/>
+                      <a:r>
+                        <a:rPr lang="ru-RU" sz="1100" b="0" i="0" u="none" strike="noStrike">
+                          <a:solidFill>
+                            <a:srgbClr val="000000"/>
+                          </a:solidFill>
+                          <a:effectLst/>
+                          <a:latin typeface="Calibri" panose="020F0502020204030204" pitchFamily="34" charset="0"/>
+                        </a:rPr>
+                        <a:t>1</a:t>
+                      </a:r>
+                    </a:p>
+                  </a:txBody>
+                  <a:tcPr marL="7620" marR="7620" marT="7620" marB="0" anchor="ctr"/>
+                </a:tc>
+                <a:tc>
+                  <a:txBody>
+                    <a:bodyPr/>
+                    <a:lstStyle/>
+                    <a:p>
+                      <a:endParaRPr lang="ru-RU"/>
+                    </a:p>
+                  </a:txBody>
+                  <a:tcPr/>
+                </a:tc>
+                <a:tc>
+                  <a:txBody>
+                    <a:bodyPr/>
+                    <a:lstStyle/>
+                    <a:p>
+                      <a:endParaRPr lang="ru-RU"/>
+                    </a:p>
+                  </a:txBody>
+                  <a:tcPr/>
+                </a:tc>
+                <a:tc>
+                  <a:txBody>
+                    <a:bodyPr/>
+                    <a:lstStyle/>
+                    <a:p>
+                      <a:endParaRPr lang="ru-RU"/>
+                    </a:p>
+                  </a:txBody>
+                  <a:tcPr/>
+                </a:tc>
+                <a:tc>
+                  <a:txBody>
+                    <a:bodyPr/>
+                    <a:lstStyle/>
+                    <a:p>
+                      <a:endParaRPr lang="ru-RU"/>
+                    </a:p>
+                  </a:txBody>
+                  <a:tcPr/>
+                </a:tc>
+                <a:tc>
+                  <a:txBody>
+                    <a:bodyPr/>
+                    <a:lstStyle/>
+                    <a:p>
+                      <a:endParaRPr lang="ru-RU"/>
+                    </a:p>
+                  </a:txBody>
+                  <a:tcPr/>
+                </a:tc>
+                <a:tc>
+                  <a:txBody>
+                    <a:bodyPr/>
+                    <a:lstStyle/>
+                    <a:p>
+                      <a:endParaRPr lang="ru-RU" dirty="0"/>
+                    </a:p>
+                  </a:txBody>
+                  <a:tcPr/>
+                </a:tc>
+                <a:extLst>
+                  <a:ext uri="{0D108BD9-81ED-4DB2-BD59-A6C34878D82A}">
+                    <a16:rowId xmlns:a16="http://schemas.microsoft.com/office/drawing/2014/main" val="3843128792"/>
+                  </a:ext>
+                </a:extLst>
+              </a:tr>
+              <a:tr h="370840">
+                <a:tc>
+                  <a:txBody>
+                    <a:bodyPr/>
+                    <a:lstStyle/>
+                    <a:p>
+                      <a:endParaRPr lang="ru-RU" dirty="0"/>
+                    </a:p>
+                  </a:txBody>
+                  <a:tcPr/>
+                </a:tc>
+                <a:tc>
+                  <a:txBody>
+                    <a:bodyPr/>
+                    <a:lstStyle/>
+                    <a:p>
+                      <a:pPr algn="ctr" fontAlgn="ctr"/>
+                      <a:endParaRPr lang="ru-RU" sz="1100" b="1" i="0" u="none" strike="noStrike">
+                        <a:solidFill>
+                          <a:srgbClr val="000000"/>
+                        </a:solidFill>
+                        <a:effectLst/>
+                        <a:latin typeface="Calibri" panose="020F0502020204030204" pitchFamily="34" charset="0"/>
+                      </a:endParaRPr>
+                    </a:p>
+                  </a:txBody>
+                  <a:tcPr marL="7620" marR="7620" marT="7620" marB="0" anchor="ctr"/>
+                </a:tc>
+                <a:tc>
+                  <a:txBody>
+                    <a:bodyPr/>
+                    <a:lstStyle/>
+                    <a:p>
+                      <a:pPr algn="ctr" fontAlgn="ctr"/>
+                      <a:r>
+                        <a:rPr lang="ru-RU" sz="1100" b="0" i="0" u="none" strike="noStrike">
+                          <a:solidFill>
+                            <a:srgbClr val="000000"/>
+                          </a:solidFill>
+                          <a:effectLst/>
+                          <a:latin typeface="Calibri" panose="020F0502020204030204" pitchFamily="34" charset="0"/>
+                        </a:rPr>
+                        <a:t>2</a:t>
+                      </a:r>
+                    </a:p>
+                  </a:txBody>
+                  <a:tcPr marL="7620" marR="7620" marT="7620" marB="0" anchor="ctr"/>
+                </a:tc>
+                <a:tc>
+                  <a:txBody>
+                    <a:bodyPr/>
+                    <a:lstStyle/>
+                    <a:p>
+                      <a:endParaRPr lang="ru-RU"/>
+                    </a:p>
+                  </a:txBody>
+                  <a:tcPr/>
+                </a:tc>
+                <a:tc>
+                  <a:txBody>
+                    <a:bodyPr/>
+                    <a:lstStyle/>
+                    <a:p>
+                      <a:endParaRPr lang="ru-RU"/>
+                    </a:p>
+                  </a:txBody>
+                  <a:tcPr/>
+                </a:tc>
+                <a:tc>
+                  <a:txBody>
+                    <a:bodyPr/>
+                    <a:lstStyle/>
+                    <a:p>
+                      <a:endParaRPr lang="ru-RU"/>
+                    </a:p>
+                  </a:txBody>
+                  <a:tcPr/>
+                </a:tc>
+                <a:tc>
+                  <a:txBody>
+                    <a:bodyPr/>
+                    <a:lstStyle/>
+                    <a:p>
+                      <a:endParaRPr lang="ru-RU"/>
+                    </a:p>
+                  </a:txBody>
+                  <a:tcPr/>
+                </a:tc>
+                <a:tc>
+                  <a:txBody>
+                    <a:bodyPr/>
+                    <a:lstStyle/>
+                    <a:p>
+                      <a:endParaRPr lang="ru-RU"/>
+                    </a:p>
+                  </a:txBody>
+                  <a:tcPr/>
+                </a:tc>
+                <a:tc>
+                  <a:txBody>
+                    <a:bodyPr/>
+                    <a:lstStyle/>
+                    <a:p>
+                      <a:endParaRPr lang="ru-RU" dirty="0"/>
+                    </a:p>
+                  </a:txBody>
+                  <a:tcPr/>
+                </a:tc>
+                <a:extLst>
+                  <a:ext uri="{0D108BD9-81ED-4DB2-BD59-A6C34878D82A}">
+                    <a16:rowId xmlns:a16="http://schemas.microsoft.com/office/drawing/2014/main" val="30986302"/>
+                  </a:ext>
+                </a:extLst>
+              </a:tr>
+              <a:tr h="370840">
+                <a:tc>
+                  <a:txBody>
+                    <a:bodyPr/>
+                    <a:lstStyle/>
+                    <a:p>
+                      <a:endParaRPr lang="ru-RU" dirty="0"/>
+                    </a:p>
+                  </a:txBody>
+                  <a:tcPr/>
+                </a:tc>
+                <a:tc>
+                  <a:txBody>
+                    <a:bodyPr/>
+                    <a:lstStyle/>
+                    <a:p>
+                      <a:pPr algn="ctr" fontAlgn="ctr"/>
+                      <a:endParaRPr lang="ru-RU" sz="1100" b="1" i="0" u="none" strike="noStrike">
+                        <a:solidFill>
+                          <a:srgbClr val="000000"/>
+                        </a:solidFill>
+                        <a:effectLst/>
+                        <a:latin typeface="Calibri" panose="020F0502020204030204" pitchFamily="34" charset="0"/>
+                      </a:endParaRPr>
+                    </a:p>
+                  </a:txBody>
+                  <a:tcPr marL="7620" marR="7620" marT="7620" marB="0" anchor="ctr"/>
+                </a:tc>
+                <a:tc>
+                  <a:txBody>
+                    <a:bodyPr/>
+                    <a:lstStyle/>
+                    <a:p>
+                      <a:pPr algn="ctr" fontAlgn="ctr"/>
+                      <a:r>
+                        <a:rPr lang="ru-RU" sz="1100" b="0" i="0" u="none" strike="noStrike">
+                          <a:solidFill>
+                            <a:srgbClr val="000000"/>
+                          </a:solidFill>
+                          <a:effectLst/>
+                          <a:latin typeface="Calibri" panose="020F0502020204030204" pitchFamily="34" charset="0"/>
+                        </a:rPr>
+                        <a:t>3</a:t>
+                      </a:r>
+                    </a:p>
+                  </a:txBody>
+                  <a:tcPr marL="7620" marR="7620" marT="7620" marB="0" anchor="ctr"/>
+                </a:tc>
+                <a:tc>
+                  <a:txBody>
+                    <a:bodyPr/>
+                    <a:lstStyle/>
+                    <a:p>
+                      <a:endParaRPr lang="ru-RU"/>
+                    </a:p>
+                  </a:txBody>
+                  <a:tcPr/>
+                </a:tc>
+                <a:tc>
+                  <a:txBody>
+                    <a:bodyPr/>
+                    <a:lstStyle/>
+                    <a:p>
+                      <a:endParaRPr lang="ru-RU"/>
+                    </a:p>
+                  </a:txBody>
+                  <a:tcPr/>
+                </a:tc>
+                <a:tc>
+                  <a:txBody>
+                    <a:bodyPr/>
+                    <a:lstStyle/>
+                    <a:p>
+                      <a:endParaRPr lang="ru-RU"/>
+                    </a:p>
+                  </a:txBody>
+                  <a:tcPr/>
+                </a:tc>
+                <a:tc>
+                  <a:txBody>
+                    <a:bodyPr/>
+                    <a:lstStyle/>
+                    <a:p>
+                      <a:endParaRPr lang="ru-RU"/>
+                    </a:p>
+                  </a:txBody>
+                  <a:tcPr/>
+                </a:tc>
+                <a:tc>
+                  <a:txBody>
+                    <a:bodyPr/>
+                    <a:lstStyle/>
+                    <a:p>
+                      <a:endParaRPr lang="ru-RU"/>
+                    </a:p>
+                  </a:txBody>
+                  <a:tcPr/>
+                </a:tc>
+                <a:tc>
+                  <a:txBody>
+                    <a:bodyPr/>
+                    <a:lstStyle/>
+                    <a:p>
+                      <a:endParaRPr lang="ru-RU" dirty="0"/>
+                    </a:p>
+                  </a:txBody>
+                  <a:tcPr/>
+                </a:tc>
+                <a:extLst>
+                  <a:ext uri="{0D108BD9-81ED-4DB2-BD59-A6C34878D82A}">
+                    <a16:rowId xmlns:a16="http://schemas.microsoft.com/office/drawing/2014/main" val="2947641873"/>
+                  </a:ext>
+                </a:extLst>
+              </a:tr>
+              <a:tr h="370840">
+                <a:tc>
+                  <a:txBody>
+                    <a:bodyPr/>
+                    <a:lstStyle/>
+                    <a:p>
+                      <a:endParaRPr lang="ru-RU" dirty="0"/>
+                    </a:p>
+                  </a:txBody>
+                  <a:tcPr/>
+                </a:tc>
+                <a:tc>
+                  <a:txBody>
+                    <a:bodyPr/>
+                    <a:lstStyle/>
+                    <a:p>
+                      <a:pPr algn="ctr" fontAlgn="ctr"/>
+                      <a:r>
+                        <a:rPr lang="ru-RU" sz="1100" b="1" i="0" u="none" strike="noStrike">
+                          <a:solidFill>
+                            <a:srgbClr val="000000"/>
+                          </a:solidFill>
+                          <a:effectLst/>
+                          <a:latin typeface="Calibri" panose="020F0502020204030204" pitchFamily="34" charset="0"/>
+                        </a:rPr>
+                        <a:t> </a:t>
+                      </a:r>
+                    </a:p>
+                  </a:txBody>
+                  <a:tcPr marL="7620" marR="7620" marT="7620" marB="0" anchor="ctr"/>
+                </a:tc>
+                <a:tc>
+                  <a:txBody>
+                    <a:bodyPr/>
+                    <a:lstStyle/>
+                    <a:p>
+                      <a:pPr algn="ctr" fontAlgn="ctr"/>
+                      <a:r>
+                        <a:rPr lang="ru-RU" sz="1100" b="0" i="0" u="none" strike="noStrike" dirty="0">
+                          <a:solidFill>
+                            <a:srgbClr val="000000"/>
+                          </a:solidFill>
+                          <a:effectLst/>
+                          <a:latin typeface="Calibri" panose="020F0502020204030204" pitchFamily="34" charset="0"/>
+                        </a:rPr>
+                        <a:t>4</a:t>
+                      </a:r>
+                    </a:p>
+                  </a:txBody>
+                  <a:tcPr marL="7620" marR="7620" marT="7620" marB="0" anchor="ctr"/>
+                </a:tc>
+                <a:tc>
+                  <a:txBody>
+                    <a:bodyPr/>
+                    <a:lstStyle/>
+                    <a:p>
+                      <a:endParaRPr lang="ru-RU"/>
+                    </a:p>
+                  </a:txBody>
+                  <a:tcPr/>
+                </a:tc>
+                <a:tc>
+                  <a:txBody>
+                    <a:bodyPr/>
+                    <a:lstStyle/>
+                    <a:p>
+                      <a:endParaRPr lang="ru-RU"/>
+                    </a:p>
+                  </a:txBody>
+                  <a:tcPr/>
+                </a:tc>
+                <a:tc>
+                  <a:txBody>
+                    <a:bodyPr/>
+                    <a:lstStyle/>
+                    <a:p>
+                      <a:endParaRPr lang="ru-RU"/>
+                    </a:p>
+                  </a:txBody>
+                  <a:tcPr/>
+                </a:tc>
+                <a:tc>
+                  <a:txBody>
+                    <a:bodyPr/>
+                    <a:lstStyle/>
+                    <a:p>
+                      <a:endParaRPr lang="ru-RU"/>
+                    </a:p>
+                  </a:txBody>
+                  <a:tcPr/>
+                </a:tc>
+                <a:tc>
+                  <a:txBody>
+                    <a:bodyPr/>
+                    <a:lstStyle/>
+                    <a:p>
+                      <a:endParaRPr lang="ru-RU"/>
+                    </a:p>
+                  </a:txBody>
+                  <a:tcPr/>
+                </a:tc>
+                <a:tc>
+                  <a:txBody>
+                    <a:bodyPr/>
+                    <a:lstStyle/>
+                    <a:p>
+                      <a:endParaRPr lang="ru-RU" dirty="0"/>
+                    </a:p>
+                  </a:txBody>
+                  <a:tcPr/>
+                </a:tc>
+                <a:extLst>
+                  <a:ext uri="{0D108BD9-81ED-4DB2-BD59-A6C34878D82A}">
+                    <a16:rowId xmlns:a16="http://schemas.microsoft.com/office/drawing/2014/main" val="1885478100"/>
+                  </a:ext>
+                </a:extLst>
+              </a:tr>
+            </a:tbl>
+          </a:graphicData>
+        </a:graphic>
+      </p:graphicFrame>
     </p:spTree>
     <p:extLst>
       <p:ext uri="{BB962C8B-B14F-4D97-AF65-F5344CB8AC3E}">
@@ -6286,10 +10535,10 @@
       </p:grpSpPr>
       <p:sp>
         <p:nvSpPr>
-          <p:cNvPr id="3" name="Title 2">
-            <a:extLst>
-              <a:ext uri="{FF2B5EF4-FFF2-40B4-BE49-F238E27FC236}">
-                <a16:creationId xmlns:a16="http://schemas.microsoft.com/office/drawing/2014/main" id="{2EE90448-580C-863B-979C-693C73C9DC42}"/>
+          <p:cNvPr id="2" name="Title 1">
+            <a:extLst>
+              <a:ext uri="{FF2B5EF4-FFF2-40B4-BE49-F238E27FC236}">
+                <a16:creationId xmlns:a16="http://schemas.microsoft.com/office/drawing/2014/main" id="{226E9E41-08FA-40E3-7F8E-D9F52A99DCFD}"/>
               </a:ext>
             </a:extLst>
           </p:cNvPr>
@@ -6297,7 +10546,7 @@
             <a:spLocks noGrp="1"/>
           </p:cNvSpPr>
           <p:nvPr>
-            <p:ph type="ctrTitle"/>
+            <p:ph type="title"/>
           </p:nvPr>
         </p:nvSpPr>
         <p:spPr/>
@@ -6305,35 +10554,77 @@
           <a:bodyPr/>
           <a:lstStyle/>
           <a:p>
+            <a:r>
+              <a:rPr lang="en-US" dirty="0"/>
+              <a:t>Calibration Plot (distance 32 cm from the chassis)</a:t>
+            </a:r>
             <a:endParaRPr lang="ru-RU" dirty="0"/>
           </a:p>
         </p:txBody>
       </p:sp>
-      <p:sp>
-        <p:nvSpPr>
-          <p:cNvPr id="4" name="Subtitle 3">
-            <a:extLst>
-              <a:ext uri="{FF2B5EF4-FFF2-40B4-BE49-F238E27FC236}">
-                <a16:creationId xmlns:a16="http://schemas.microsoft.com/office/drawing/2014/main" id="{5042392F-1A8C-D1DC-48A2-3747CF2249FB}"/>
-              </a:ext>
-            </a:extLst>
-          </p:cNvPr>
-          <p:cNvSpPr>
-            <a:spLocks noGrp="1"/>
-          </p:cNvSpPr>
-          <p:nvPr>
-            <p:ph type="subTitle" idx="1"/>
-          </p:nvPr>
-        </p:nvSpPr>
-        <p:spPr/>
-        <p:txBody>
-          <a:bodyPr/>
-          <a:lstStyle/>
-          <a:p>
-            <a:endParaRPr lang="ru-RU"/>
-          </a:p>
-        </p:txBody>
-      </p:sp>
+      <p:graphicFrame>
+        <p:nvGraphicFramePr>
+          <p:cNvPr id="5" name="Object 4">
+            <a:extLst>
+              <a:ext uri="{FF2B5EF4-FFF2-40B4-BE49-F238E27FC236}">
+                <a16:creationId xmlns:a16="http://schemas.microsoft.com/office/drawing/2014/main" id="{2C388C08-355E-9F40-A87C-47054BC3FE00}"/>
+              </a:ext>
+            </a:extLst>
+          </p:cNvPr>
+          <p:cNvGraphicFramePr>
+            <a:graphicFrameLocks noChangeAspect="1"/>
+          </p:cNvGraphicFramePr>
+          <p:nvPr>
+            <p:extLst>
+              <p:ext uri="{D42A27DB-BD31-4B8C-83A1-F6EECF244321}">
+                <p14:modId xmlns:p14="http://schemas.microsoft.com/office/powerpoint/2010/main" val="1341688856"/>
+              </p:ext>
+            </p:extLst>
+          </p:nvPr>
+        </p:nvGraphicFramePr>
+        <p:xfrm>
+          <a:off x="2031335" y="1268463"/>
+          <a:ext cx="7527619" cy="5760000"/>
+        </p:xfrm>
+        <a:graphic>
+          <a:graphicData uri="http://schemas.openxmlformats.org/presentationml/2006/ole">
+            <mc:AlternateContent xmlns:mc="http://schemas.openxmlformats.org/markup-compatibility/2006">
+              <mc:Choice xmlns:v="urn:schemas-microsoft-com:vml" Requires="v">
+                <p:oleObj name="Graph" r:id="rId2" imgW="3920760" imgH="3000960" progId="Origin95.Graph">
+                  <p:embed/>
+                </p:oleObj>
+              </mc:Choice>
+              <mc:Fallback>
+                <p:oleObj name="Graph" r:id="rId2" imgW="3920760" imgH="3000960" progId="Origin95.Graph">
+                  <p:embed/>
+                  <p:pic>
+                    <p:nvPicPr>
+                      <p:cNvPr id="0" name=""/>
+                      <p:cNvPicPr/>
+                      <p:nvPr/>
+                    </p:nvPicPr>
+                    <p:blipFill>
+                      <a:blip r:embed="rId3"/>
+                      <a:stretch>
+                        <a:fillRect/>
+                      </a:stretch>
+                    </p:blipFill>
+                    <p:spPr>
+                      <a:xfrm>
+                        <a:off x="2031335" y="1268463"/>
+                        <a:ext cx="7527619" cy="5760000"/>
+                      </a:xfrm>
+                      <a:prstGeom prst="rect">
+                        <a:avLst/>
+                      </a:prstGeom>
+                    </p:spPr>
+                  </p:pic>
+                </p:oleObj>
+              </mc:Fallback>
+            </mc:AlternateContent>
+          </a:graphicData>
+        </a:graphic>
+      </p:graphicFrame>
     </p:spTree>
     <p:extLst>
       <p:ext uri="{BB962C8B-B14F-4D97-AF65-F5344CB8AC3E}">
@@ -7180,7 +11471,7 @@
         </p:nvGraphicFramePr>
         <p:xfrm>
           <a:off x="0" y="1690688"/>
-          <a:ext cx="6116190" cy="4680000"/>
+          <a:ext cx="6116638" cy="4679950"/>
         </p:xfrm>
         <a:graphic>
           <a:graphicData uri="http://schemas.openxmlformats.org/presentationml/2006/ole">
@@ -7208,7 +11499,7 @@
                     <p:spPr>
                       <a:xfrm>
                         <a:off x="0" y="1690688"/>
-                        <a:ext cx="6116190" cy="4680000"/>
+                        <a:ext cx="6116638" cy="4679950"/>
                       </a:xfrm>
                       <a:prstGeom prst="rect">
                         <a:avLst/>
@@ -9018,7 +13309,7 @@
           <p:nvPr>
             <p:extLst>
               <p:ext uri="{D42A27DB-BD31-4B8C-83A1-F6EECF244321}">
-                <p14:modId xmlns:p14="http://schemas.microsoft.com/office/powerpoint/2010/main" val="107432726"/>
+                <p14:modId xmlns:p14="http://schemas.microsoft.com/office/powerpoint/2010/main" val="2842412857"/>
               </p:ext>
             </p:extLst>
           </p:nvPr>
@@ -9472,14 +13763,14 @@
           <p:nvPr>
             <p:extLst>
               <p:ext uri="{D42A27DB-BD31-4B8C-83A1-F6EECF244321}">
-                <p14:modId xmlns:p14="http://schemas.microsoft.com/office/powerpoint/2010/main" val="2652982864"/>
+                <p14:modId xmlns:p14="http://schemas.microsoft.com/office/powerpoint/2010/main" val="597128587"/>
               </p:ext>
             </p:extLst>
           </p:nvPr>
         </p:nvGraphicFramePr>
         <p:xfrm>
           <a:off x="6096000" y="1690688"/>
-          <a:ext cx="6116190" cy="4680000"/>
+          <a:ext cx="6116638" cy="4679950"/>
         </p:xfrm>
         <a:graphic>
           <a:graphicData uri="http://schemas.openxmlformats.org/presentationml/2006/ole">
@@ -9507,7 +13798,7 @@
                     <p:spPr>
                       <a:xfrm>
                         <a:off x="6096000" y="1690688"/>
-                        <a:ext cx="6116190" cy="4680000"/>
+                        <a:ext cx="6116638" cy="4679950"/>
                       </a:xfrm>
                       <a:prstGeom prst="rect">
                         <a:avLst/>
@@ -10428,7 +14719,7 @@
           <a:p>
             <a:r>
               <a:rPr lang="en-US" dirty="0"/>
-              <a:t>Sample10_device3</a:t>
+              <a:t>Sample1_device3</a:t>
             </a:r>
             <a:endParaRPr lang="ru-RU" dirty="0"/>
           </a:p>

</xml_diff>

<commit_message>
07/12/2023 Started X-ray measurement report
</commit_message>
<xml_diff>
--- a/Mikhail Bandurist Transistors/X-Ray Measurements (22-11-2023)/X-Ray Measurements Report Batch2.pptx
+++ b/Mikhail Bandurist Transistors/X-Ray Measurements (22-11-2023)/X-Ray Measurements Report Batch2.pptx
@@ -315,7 +315,7 @@
           <a:p>
             <a:fld id="{0D7AF3D4-FDB7-43B0-AE16-F3D25963A771}" type="datetimeFigureOut">
               <a:rPr lang="ru-RU" smtClean="0"/>
-              <a:t>03.12.2023</a:t>
+              <a:t>07.12.2023</a:t>
             </a:fld>
             <a:endParaRPr lang="ru-RU"/>
           </a:p>
@@ -515,7 +515,7 @@
           <a:p>
             <a:fld id="{0D7AF3D4-FDB7-43B0-AE16-F3D25963A771}" type="datetimeFigureOut">
               <a:rPr lang="ru-RU" smtClean="0"/>
-              <a:t>03.12.2023</a:t>
+              <a:t>07.12.2023</a:t>
             </a:fld>
             <a:endParaRPr lang="ru-RU"/>
           </a:p>
@@ -725,7 +725,7 @@
           <a:p>
             <a:fld id="{0D7AF3D4-FDB7-43B0-AE16-F3D25963A771}" type="datetimeFigureOut">
               <a:rPr lang="ru-RU" smtClean="0"/>
-              <a:t>03.12.2023</a:t>
+              <a:t>07.12.2023</a:t>
             </a:fld>
             <a:endParaRPr lang="ru-RU"/>
           </a:p>
@@ -925,7 +925,7 @@
           <a:p>
             <a:fld id="{0D7AF3D4-FDB7-43B0-AE16-F3D25963A771}" type="datetimeFigureOut">
               <a:rPr lang="ru-RU" smtClean="0"/>
-              <a:t>03.12.2023</a:t>
+              <a:t>07.12.2023</a:t>
             </a:fld>
             <a:endParaRPr lang="ru-RU"/>
           </a:p>
@@ -1201,7 +1201,7 @@
           <a:p>
             <a:fld id="{0D7AF3D4-FDB7-43B0-AE16-F3D25963A771}" type="datetimeFigureOut">
               <a:rPr lang="ru-RU" smtClean="0"/>
-              <a:t>03.12.2023</a:t>
+              <a:t>07.12.2023</a:t>
             </a:fld>
             <a:endParaRPr lang="ru-RU"/>
           </a:p>
@@ -1469,7 +1469,7 @@
           <a:p>
             <a:fld id="{0D7AF3D4-FDB7-43B0-AE16-F3D25963A771}" type="datetimeFigureOut">
               <a:rPr lang="ru-RU" smtClean="0"/>
-              <a:t>03.12.2023</a:t>
+              <a:t>07.12.2023</a:t>
             </a:fld>
             <a:endParaRPr lang="ru-RU"/>
           </a:p>
@@ -1884,7 +1884,7 @@
           <a:p>
             <a:fld id="{0D7AF3D4-FDB7-43B0-AE16-F3D25963A771}" type="datetimeFigureOut">
               <a:rPr lang="ru-RU" smtClean="0"/>
-              <a:t>03.12.2023</a:t>
+              <a:t>07.12.2023</a:t>
             </a:fld>
             <a:endParaRPr lang="ru-RU"/>
           </a:p>
@@ -2026,7 +2026,7 @@
           <a:p>
             <a:fld id="{0D7AF3D4-FDB7-43B0-AE16-F3D25963A771}" type="datetimeFigureOut">
               <a:rPr lang="ru-RU" smtClean="0"/>
-              <a:t>03.12.2023</a:t>
+              <a:t>07.12.2023</a:t>
             </a:fld>
             <a:endParaRPr lang="ru-RU"/>
           </a:p>
@@ -2096,6 +2096,22 @@
   <p:clrMapOvr>
     <a:masterClrMapping/>
   </p:clrMapOvr>
+  <p:extLst>
+    <p:ext uri="{DCECCB84-F9BA-43D5-87BE-67443E8EF086}">
+      <p15:sldGuideLst xmlns:p15="http://schemas.microsoft.com/office/powerpoint/2012/main">
+        <p15:guide id="1" orient="horz" pos="2160" userDrawn="1">
+          <p15:clr>
+            <a:srgbClr val="FBAE40"/>
+          </p15:clr>
+        </p15:guide>
+        <p15:guide id="2" pos="3840" userDrawn="1">
+          <p15:clr>
+            <a:srgbClr val="FBAE40"/>
+          </p15:clr>
+        </p15:guide>
+      </p15:sldGuideLst>
+    </p:ext>
+  </p:extLst>
 </p:sldLayout>
 </file>
 
@@ -2139,7 +2155,7 @@
           <a:p>
             <a:fld id="{0D7AF3D4-FDB7-43B0-AE16-F3D25963A771}" type="datetimeFigureOut">
               <a:rPr lang="ru-RU" smtClean="0"/>
-              <a:t>03.12.2023</a:t>
+              <a:t>07.12.2023</a:t>
             </a:fld>
             <a:endParaRPr lang="ru-RU"/>
           </a:p>
@@ -2452,7 +2468,7 @@
           <a:p>
             <a:fld id="{0D7AF3D4-FDB7-43B0-AE16-F3D25963A771}" type="datetimeFigureOut">
               <a:rPr lang="ru-RU" smtClean="0"/>
-              <a:t>03.12.2023</a:t>
+              <a:t>07.12.2023</a:t>
             </a:fld>
             <a:endParaRPr lang="ru-RU"/>
           </a:p>
@@ -2741,7 +2757,7 @@
           <a:p>
             <a:fld id="{0D7AF3D4-FDB7-43B0-AE16-F3D25963A771}" type="datetimeFigureOut">
               <a:rPr lang="ru-RU" smtClean="0"/>
-              <a:t>03.12.2023</a:t>
+              <a:t>07.12.2023</a:t>
             </a:fld>
             <a:endParaRPr lang="ru-RU"/>
           </a:p>
@@ -2984,7 +3000,7 @@
           <a:p>
             <a:fld id="{0D7AF3D4-FDB7-43B0-AE16-F3D25963A771}" type="datetimeFigureOut">
               <a:rPr lang="ru-RU" smtClean="0"/>
-              <a:t>03.12.2023</a:t>
+              <a:t>07.12.2023</a:t>
             </a:fld>
             <a:endParaRPr lang="ru-RU"/>
           </a:p>
@@ -3586,10 +3602,10 @@
       </p:graphicFrame>
       <p:graphicFrame>
         <p:nvGraphicFramePr>
-          <p:cNvPr id="5" name="Object 4">
-            <a:extLst>
-              <a:ext uri="{FF2B5EF4-FFF2-40B4-BE49-F238E27FC236}">
-                <a16:creationId xmlns:a16="http://schemas.microsoft.com/office/drawing/2014/main" id="{FDDA2615-ED73-30F1-F048-57A5909D71D9}"/>
+          <p:cNvPr id="3" name="Object 2">
+            <a:extLst>
+              <a:ext uri="{FF2B5EF4-FFF2-40B4-BE49-F238E27FC236}">
+                <a16:creationId xmlns:a16="http://schemas.microsoft.com/office/drawing/2014/main" id="{E54C50C9-1953-5C6C-F706-85E370697986}"/>
               </a:ext>
             </a:extLst>
           </p:cNvPr>
@@ -3599,13 +3615,13 @@
           <p:nvPr>
             <p:extLst>
               <p:ext uri="{D42A27DB-BD31-4B8C-83A1-F6EECF244321}">
-                <p14:modId xmlns:p14="http://schemas.microsoft.com/office/powerpoint/2010/main" val="527468006"/>
+                <p14:modId xmlns:p14="http://schemas.microsoft.com/office/powerpoint/2010/main" val="2983433632"/>
               </p:ext>
             </p:extLst>
           </p:nvPr>
         </p:nvGraphicFramePr>
         <p:xfrm>
-          <a:off x="5973568" y="2178000"/>
+          <a:off x="6075810" y="2178000"/>
           <a:ext cx="6116190" cy="4680000"/>
         </p:xfrm>
         <a:graphic>
@@ -3633,7 +3649,7 @@
                     </p:blipFill>
                     <p:spPr>
                       <a:xfrm>
-                        <a:off x="5973568" y="2178000"/>
+                        <a:off x="6075810" y="2178000"/>
                         <a:ext cx="6116190" cy="4680000"/>
                       </a:xfrm>
                       <a:prstGeom prst="rect">
@@ -13565,10 +13581,10 @@
       </p:sp>
       <p:graphicFrame>
         <p:nvGraphicFramePr>
-          <p:cNvPr id="3" name="Object 2">
-            <a:extLst>
-              <a:ext uri="{FF2B5EF4-FFF2-40B4-BE49-F238E27FC236}">
-                <a16:creationId xmlns:a16="http://schemas.microsoft.com/office/drawing/2014/main" id="{65607B19-ADF2-3945-D8DC-B137E93ADB15}"/>
+          <p:cNvPr id="4" name="Object 3">
+            <a:extLst>
+              <a:ext uri="{FF2B5EF4-FFF2-40B4-BE49-F238E27FC236}">
+                <a16:creationId xmlns:a16="http://schemas.microsoft.com/office/drawing/2014/main" id="{2F4E2094-4059-DC34-67E6-FCBFF4FC2DB9}"/>
               </a:ext>
             </a:extLst>
           </p:cNvPr>
@@ -13578,13 +13594,13 @@
           <p:nvPr>
             <p:extLst>
               <p:ext uri="{D42A27DB-BD31-4B8C-83A1-F6EECF244321}">
-                <p14:modId xmlns:p14="http://schemas.microsoft.com/office/powerpoint/2010/main" val="3755124850"/>
+                <p14:modId xmlns:p14="http://schemas.microsoft.com/office/powerpoint/2010/main" val="2448913899"/>
               </p:ext>
             </p:extLst>
           </p:nvPr>
         </p:nvGraphicFramePr>
         <p:xfrm>
-          <a:off x="838200" y="1452875"/>
+          <a:off x="1028556" y="1532369"/>
           <a:ext cx="6586667" cy="5040000"/>
         </p:xfrm>
         <a:graphic>
@@ -13612,7 +13628,7 @@
                     </p:blipFill>
                     <p:spPr>
                       <a:xfrm>
-                        <a:off x="838200" y="1452875"/>
+                        <a:off x="1028556" y="1532369"/>
                         <a:ext cx="6586667" cy="5040000"/>
                       </a:xfrm>
                       <a:prstGeom prst="rect">
@@ -13763,7 +13779,7 @@
           <p:nvPr>
             <p:extLst>
               <p:ext uri="{D42A27DB-BD31-4B8C-83A1-F6EECF244321}">
-                <p14:modId xmlns:p14="http://schemas.microsoft.com/office/powerpoint/2010/main" val="597128587"/>
+                <p14:modId xmlns:p14="http://schemas.microsoft.com/office/powerpoint/2010/main" val="1130812149"/>
               </p:ext>
             </p:extLst>
           </p:nvPr>
@@ -14727,10 +14743,10 @@
       </p:sp>
       <p:graphicFrame>
         <p:nvGraphicFramePr>
-          <p:cNvPr id="3" name="Object 2">
-            <a:extLst>
-              <a:ext uri="{FF2B5EF4-FFF2-40B4-BE49-F238E27FC236}">
-                <a16:creationId xmlns:a16="http://schemas.microsoft.com/office/drawing/2014/main" id="{FF4060B2-0B48-76F5-52E1-C02DCD7E7A2E}"/>
+          <p:cNvPr id="4" name="Object 3">
+            <a:extLst>
+              <a:ext uri="{FF2B5EF4-FFF2-40B4-BE49-F238E27FC236}">
+                <a16:creationId xmlns:a16="http://schemas.microsoft.com/office/drawing/2014/main" id="{DCD503AB-F6F6-2893-37D6-3AA1BC985373}"/>
               </a:ext>
             </a:extLst>
           </p:cNvPr>
@@ -14740,14 +14756,14 @@
           <p:nvPr>
             <p:extLst>
               <p:ext uri="{D42A27DB-BD31-4B8C-83A1-F6EECF244321}">
-                <p14:modId xmlns:p14="http://schemas.microsoft.com/office/powerpoint/2010/main" val="3969207110"/>
+                <p14:modId xmlns:p14="http://schemas.microsoft.com/office/powerpoint/2010/main" val="1199697591"/>
               </p:ext>
             </p:extLst>
           </p:nvPr>
         </p:nvGraphicFramePr>
         <p:xfrm>
-          <a:off x="1101012" y="1690688"/>
-          <a:ext cx="6586666" cy="5040000"/>
+          <a:off x="155719" y="1452875"/>
+          <a:ext cx="6586667" cy="5040000"/>
         </p:xfrm>
         <a:graphic>
           <a:graphicData uri="http://schemas.openxmlformats.org/presentationml/2006/ole">
@@ -14774,8 +14790,8 @@
                     </p:blipFill>
                     <p:spPr>
                       <a:xfrm>
-                        <a:off x="1101012" y="1690688"/>
-                        <a:ext cx="6586666" cy="5040000"/>
+                        <a:off x="155719" y="1452875"/>
+                        <a:ext cx="6586667" cy="5040000"/>
                       </a:xfrm>
                       <a:prstGeom prst="rect">
                         <a:avLst/>
@@ -14834,25 +14850,32 @@
             <p:ph type="title"/>
           </p:nvPr>
         </p:nvSpPr>
-        <p:spPr/>
+        <p:spPr>
+          <a:xfrm>
+            <a:off x="0" y="0"/>
+            <a:ext cx="9770918" cy="1358179"/>
+          </a:xfrm>
+        </p:spPr>
         <p:txBody>
-          <a:bodyPr/>
+          <a:bodyPr anchor="t">
+            <a:normAutofit/>
+          </a:bodyPr>
           <a:lstStyle/>
           <a:p>
             <a:r>
-              <a:rPr lang="en-US" dirty="0"/>
+              <a:rPr lang="en-US" sz="2800" b="1" dirty="0"/>
               <a:t>Sample1_device3</a:t>
             </a:r>
-            <a:endParaRPr lang="ru-RU" dirty="0"/>
+            <a:endParaRPr lang="ru-RU" sz="2800" b="1" dirty="0"/>
           </a:p>
         </p:txBody>
       </p:sp>
       <p:graphicFrame>
         <p:nvGraphicFramePr>
-          <p:cNvPr id="5" name="Object 4">
-            <a:extLst>
-              <a:ext uri="{FF2B5EF4-FFF2-40B4-BE49-F238E27FC236}">
-                <a16:creationId xmlns:a16="http://schemas.microsoft.com/office/drawing/2014/main" id="{EE760FA3-1627-D941-7F2D-D3EC01254DAE}"/>
+          <p:cNvPr id="3" name="Object 2">
+            <a:extLst>
+              <a:ext uri="{FF2B5EF4-FFF2-40B4-BE49-F238E27FC236}">
+                <a16:creationId xmlns:a16="http://schemas.microsoft.com/office/drawing/2014/main" id="{1A021459-10A1-6416-882C-04DF0BA62079}"/>
               </a:ext>
             </a:extLst>
           </p:cNvPr>
@@ -14862,14 +14885,14 @@
           <p:nvPr>
             <p:extLst>
               <p:ext uri="{D42A27DB-BD31-4B8C-83A1-F6EECF244321}">
-                <p14:modId xmlns:p14="http://schemas.microsoft.com/office/powerpoint/2010/main" val="3085611088"/>
+                <p14:modId xmlns:p14="http://schemas.microsoft.com/office/powerpoint/2010/main" val="2847889996"/>
               </p:ext>
             </p:extLst>
           </p:nvPr>
         </p:nvGraphicFramePr>
         <p:xfrm>
-          <a:off x="0" y="1690688"/>
-          <a:ext cx="6116190" cy="4680000"/>
+          <a:off x="-2" y="428624"/>
+          <a:ext cx="4234286" cy="3240000"/>
         </p:xfrm>
         <a:graphic>
           <a:graphicData uri="http://schemas.openxmlformats.org/presentationml/2006/ole">
@@ -14896,8 +14919,8 @@
                     </p:blipFill>
                     <p:spPr>
                       <a:xfrm>
-                        <a:off x="0" y="1690688"/>
-                        <a:ext cx="6116190" cy="4680000"/>
+                        <a:off x="-2" y="428624"/>
+                        <a:ext cx="4234286" cy="3240000"/>
                       </a:xfrm>
                       <a:prstGeom prst="rect">
                         <a:avLst/>
@@ -14912,10 +14935,10 @@
       </p:graphicFrame>
       <p:graphicFrame>
         <p:nvGraphicFramePr>
-          <p:cNvPr id="7" name="Object 6">
-            <a:extLst>
-              <a:ext uri="{FF2B5EF4-FFF2-40B4-BE49-F238E27FC236}">
-                <a16:creationId xmlns:a16="http://schemas.microsoft.com/office/drawing/2014/main" id="{EF77D395-E876-2718-657A-4B042B964037}"/>
+          <p:cNvPr id="4" name="Object 3">
+            <a:extLst>
+              <a:ext uri="{FF2B5EF4-FFF2-40B4-BE49-F238E27FC236}">
+                <a16:creationId xmlns:a16="http://schemas.microsoft.com/office/drawing/2014/main" id="{D730D99D-A566-D396-6E03-03C1A549E397}"/>
               </a:ext>
             </a:extLst>
           </p:cNvPr>
@@ -14925,14 +14948,14 @@
           <p:nvPr>
             <p:extLst>
               <p:ext uri="{D42A27DB-BD31-4B8C-83A1-F6EECF244321}">
-                <p14:modId xmlns:p14="http://schemas.microsoft.com/office/powerpoint/2010/main" val="1214904592"/>
+                <p14:modId xmlns:p14="http://schemas.microsoft.com/office/powerpoint/2010/main" val="3746003680"/>
               </p:ext>
             </p:extLst>
           </p:nvPr>
         </p:nvGraphicFramePr>
         <p:xfrm>
-          <a:off x="6027602" y="1690688"/>
-          <a:ext cx="6116190" cy="4680000"/>
+          <a:off x="-2" y="3668624"/>
+          <a:ext cx="4234286" cy="3240000"/>
         </p:xfrm>
         <a:graphic>
           <a:graphicData uri="http://schemas.openxmlformats.org/presentationml/2006/ole">
@@ -14959,8 +14982,146 @@
                     </p:blipFill>
                     <p:spPr>
                       <a:xfrm>
-                        <a:off x="6027602" y="1690688"/>
-                        <a:ext cx="6116190" cy="4680000"/>
+                        <a:off x="-2" y="3668624"/>
+                        <a:ext cx="4234286" cy="3240000"/>
+                      </a:xfrm>
+                      <a:prstGeom prst="rect">
+                        <a:avLst/>
+                      </a:prstGeom>
+                    </p:spPr>
+                  </p:pic>
+                </p:oleObj>
+              </mc:Fallback>
+            </mc:AlternateContent>
+          </a:graphicData>
+        </a:graphic>
+      </p:graphicFrame>
+      <p:graphicFrame>
+        <p:nvGraphicFramePr>
+          <p:cNvPr id="6" name="Object 5">
+            <a:extLst>
+              <a:ext uri="{FF2B5EF4-FFF2-40B4-BE49-F238E27FC236}">
+                <a16:creationId xmlns:a16="http://schemas.microsoft.com/office/drawing/2014/main" id="{8D5B63C0-6DF4-99D2-C16A-D4C2B142FB56}"/>
+              </a:ext>
+            </a:extLst>
+          </p:cNvPr>
+          <p:cNvGraphicFramePr>
+            <a:graphicFrameLocks noChangeAspect="1"/>
+          </p:cNvGraphicFramePr>
+          <p:nvPr>
+            <p:extLst>
+              <p:ext uri="{D42A27DB-BD31-4B8C-83A1-F6EECF244321}">
+                <p14:modId xmlns:p14="http://schemas.microsoft.com/office/powerpoint/2010/main" val="3153382066"/>
+              </p:ext>
+            </p:extLst>
+          </p:nvPr>
+        </p:nvGraphicFramePr>
+        <p:xfrm>
+          <a:off x="4234284" y="428624"/>
+          <a:ext cx="4234285" cy="3240000"/>
+        </p:xfrm>
+        <a:graphic>
+          <a:graphicData uri="http://schemas.openxmlformats.org/presentationml/2006/ole">
+            <mc:AlternateContent xmlns:mc="http://schemas.openxmlformats.org/markup-compatibility/2006">
+              <mc:Choice xmlns:v="urn:schemas-microsoft-com:vml" Requires="v">
+                <p:oleObj name="Graph" r:id="rId6" imgW="3920760" imgH="3000960" progId="Origin95.Graph">
+                  <p:embed/>
+                </p:oleObj>
+              </mc:Choice>
+              <mc:Fallback>
+                <p:oleObj name="Graph" r:id="rId6" imgW="3920760" imgH="3000960" progId="Origin95.Graph">
+                  <p:embed/>
+                  <p:pic>
+                    <p:nvPicPr>
+                      <p:cNvPr id="3" name="Object 2">
+                        <a:extLst>
+                          <a:ext uri="{FF2B5EF4-FFF2-40B4-BE49-F238E27FC236}">
+                            <a16:creationId xmlns:a16="http://schemas.microsoft.com/office/drawing/2014/main" id="{34EF6FEE-196D-E74E-69FA-084C10BEECA0}"/>
+                          </a:ext>
+                        </a:extLst>
+                      </p:cNvPr>
+                      <p:cNvPicPr/>
+                      <p:nvPr/>
+                    </p:nvPicPr>
+                    <p:blipFill>
+                      <a:blip r:embed="rId7"/>
+                      <a:stretch>
+                        <a:fillRect/>
+                      </a:stretch>
+                    </p:blipFill>
+                    <p:spPr>
+                      <a:xfrm>
+                        <a:off x="4234284" y="428624"/>
+                        <a:ext cx="4234285" cy="3240000"/>
+                      </a:xfrm>
+                      <a:prstGeom prst="rect">
+                        <a:avLst/>
+                      </a:prstGeom>
+                    </p:spPr>
+                  </p:pic>
+                </p:oleObj>
+              </mc:Fallback>
+            </mc:AlternateContent>
+          </a:graphicData>
+        </a:graphic>
+      </p:graphicFrame>
+      <p:graphicFrame>
+        <p:nvGraphicFramePr>
+          <p:cNvPr id="8" name="Object 7">
+            <a:extLst>
+              <a:ext uri="{FF2B5EF4-FFF2-40B4-BE49-F238E27FC236}">
+                <a16:creationId xmlns:a16="http://schemas.microsoft.com/office/drawing/2014/main" id="{D64D1DD5-566D-FB8E-1CD9-DA9353284019}"/>
+              </a:ext>
+            </a:extLst>
+          </p:cNvPr>
+          <p:cNvGraphicFramePr>
+            <a:graphicFrameLocks noChangeAspect="1"/>
+          </p:cNvGraphicFramePr>
+          <p:nvPr>
+            <p:extLst>
+              <p:ext uri="{D42A27DB-BD31-4B8C-83A1-F6EECF244321}">
+                <p14:modId xmlns:p14="http://schemas.microsoft.com/office/powerpoint/2010/main" val="4103446941"/>
+              </p:ext>
+            </p:extLst>
+          </p:nvPr>
+        </p:nvGraphicFramePr>
+        <p:xfrm>
+          <a:off x="4234284" y="3429000"/>
+          <a:ext cx="4234285" cy="3240000"/>
+        </p:xfrm>
+        <a:graphic>
+          <a:graphicData uri="http://schemas.openxmlformats.org/presentationml/2006/ole">
+            <mc:AlternateContent xmlns:mc="http://schemas.openxmlformats.org/markup-compatibility/2006">
+              <mc:Choice xmlns:v="urn:schemas-microsoft-com:vml" Requires="v">
+                <p:oleObj name="Graph" r:id="rId8" imgW="3920760" imgH="3000960" progId="Origin95.Graph">
+                  <p:embed/>
+                </p:oleObj>
+              </mc:Choice>
+              <mc:Fallback>
+                <p:oleObj name="Graph" r:id="rId8" imgW="3920760" imgH="3000960" progId="Origin95.Graph">
+                  <p:embed/>
+                  <p:pic>
+                    <p:nvPicPr>
+                      <p:cNvPr id="4" name="Object 3">
+                        <a:extLst>
+                          <a:ext uri="{FF2B5EF4-FFF2-40B4-BE49-F238E27FC236}">
+                            <a16:creationId xmlns:a16="http://schemas.microsoft.com/office/drawing/2014/main" id="{AE296B51-27BB-B3FE-1814-2398CAA5C1FA}"/>
+                          </a:ext>
+                        </a:extLst>
+                      </p:cNvPr>
+                      <p:cNvPicPr/>
+                      <p:nvPr/>
+                    </p:nvPicPr>
+                    <p:blipFill>
+                      <a:blip r:embed="rId9"/>
+                      <a:stretch>
+                        <a:fillRect/>
+                      </a:stretch>
+                    </p:blipFill>
+                    <p:spPr>
+                      <a:xfrm>
+                        <a:off x="4234284" y="3429000"/>
+                        <a:ext cx="4234285" cy="3240000"/>
                       </a:xfrm>
                       <a:prstGeom prst="rect">
                         <a:avLst/>

</xml_diff>